<commit_message>
More restructuring and more shapes.
</commit_message>
<xml_diff>
--- a/01_overview/Introduction_To_Debugging.pptx
+++ b/01_overview/Introduction_To_Debugging.pptx
@@ -3633,7 +3633,12 @@
             <p:ph idx="1"/>
           </p:nvPr>
         </p:nvSpPr>
-        <p:spPr/>
+        <p:spPr>
+          <a:xfrm>
+            <a:off x="628650" y="1535722"/>
+            <a:ext cx="8140212" cy="4957151"/>
+          </a:xfrm>
+        </p:spPr>
         <p:txBody>
           <a:bodyPr>
             <a:normAutofit fontScale="92500" lnSpcReduction="20000"/>
@@ -3677,7 +3682,7 @@
             </a:r>
             <a:r>
               <a:rPr lang="en-US" dirty="0"/>
-              <a:t>.</a:t>
+              <a:t> file</a:t>
             </a:r>
           </a:p>
           <a:p>
@@ -3733,6 +3738,17 @@
             <a:r>
               <a:rPr lang="en-US" dirty="0"/>
               <a:t>Understand project structure</a:t>
+            </a:r>
+          </a:p>
+          <a:p>
+            <a:pPr lvl="1">
+              <a:lnSpc>
+                <a:spcPct val="150000"/>
+              </a:lnSpc>
+            </a:pPr>
+            <a:r>
+              <a:rPr lang="en-US" dirty="0"/>
+              <a:t>Set source root</a:t>
             </a:r>
           </a:p>
         </p:txBody>

</xml_diff>

<commit_message>
Code re-structure and slide updates
</commit_message>
<xml_diff>
--- a/01_overview/Introduction_To_Debugging.pptx
+++ b/01_overview/Introduction_To_Debugging.pptx
@@ -10,8 +10,11 @@
     <p:sldId id="259" r:id="rId4"/>
     <p:sldId id="260" r:id="rId5"/>
     <p:sldId id="261" r:id="rId6"/>
-    <p:sldId id="262" r:id="rId7"/>
-    <p:sldId id="263" r:id="rId8"/>
+    <p:sldId id="264" r:id="rId7"/>
+    <p:sldId id="262" r:id="rId8"/>
+    <p:sldId id="263" r:id="rId9"/>
+    <p:sldId id="265" r:id="rId10"/>
+    <p:sldId id="266" r:id="rId11"/>
   </p:sldIdLst>
   <p:sldSz cx="9144000" cy="6858000" type="screen4x3"/>
   <p:notesSz cx="6858000" cy="9144000"/>
@@ -110,6 +113,11 @@
       </a:defRPr>
     </a:lvl9pPr>
   </p:defaultTextStyle>
+  <p:extLst>
+    <p:ext uri="{EFAFB233-063F-42B5-8137-9DF3F51BA10A}">
+      <p15:sldGuideLst xmlns:p15="http://schemas.microsoft.com/office/powerpoint/2012/main"/>
+    </p:ext>
+  </p:extLst>
 </p:presentation>
 </file>
 
@@ -224,71 +232,6 @@
               <a:t>Click to edit Master subtitle style</a:t>
             </a:r>
             <a:endParaRPr lang="en-US" dirty="0"/>
-          </a:p>
-        </p:txBody>
-      </p:sp>
-      <p:sp>
-        <p:nvSpPr>
-          <p:cNvPr id="4" name="Date Placeholder 3"/>
-          <p:cNvSpPr>
-            <a:spLocks noGrp="1"/>
-          </p:cNvSpPr>
-          <p:nvPr>
-            <p:ph type="dt" sz="half" idx="10"/>
-          </p:nvPr>
-        </p:nvSpPr>
-        <p:spPr/>
-        <p:txBody>
-          <a:bodyPr/>
-          <a:lstStyle/>
-          <a:p>
-            <a:fld id="{672C8AC2-76E2-427A-8089-09F7E78DC497}" type="datetimeFigureOut">
-              <a:rPr lang="en-US" smtClean="0"/>
-              <a:t>9/26/2020</a:t>
-            </a:fld>
-            <a:endParaRPr lang="en-US"/>
-          </a:p>
-        </p:txBody>
-      </p:sp>
-      <p:sp>
-        <p:nvSpPr>
-          <p:cNvPr id="5" name="Footer Placeholder 4"/>
-          <p:cNvSpPr>
-            <a:spLocks noGrp="1"/>
-          </p:cNvSpPr>
-          <p:nvPr>
-            <p:ph type="ftr" sz="quarter" idx="11"/>
-          </p:nvPr>
-        </p:nvSpPr>
-        <p:spPr/>
-        <p:txBody>
-          <a:bodyPr/>
-          <a:lstStyle/>
-          <a:p>
-            <a:endParaRPr lang="en-US"/>
-          </a:p>
-        </p:txBody>
-      </p:sp>
-      <p:sp>
-        <p:nvSpPr>
-          <p:cNvPr id="6" name="Slide Number Placeholder 5"/>
-          <p:cNvSpPr>
-            <a:spLocks noGrp="1"/>
-          </p:cNvSpPr>
-          <p:nvPr>
-            <p:ph type="sldNum" sz="quarter" idx="12"/>
-          </p:nvPr>
-        </p:nvSpPr>
-        <p:spPr/>
-        <p:txBody>
-          <a:bodyPr/>
-          <a:lstStyle/>
-          <a:p>
-            <a:fld id="{7B161F2D-7B76-4CF3-99A3-865C555D1C4C}" type="slidenum">
-              <a:rPr lang="en-US" smtClean="0"/>
-              <a:t>‹#›</a:t>
-            </a:fld>
-            <a:endParaRPr lang="en-US"/>
           </a:p>
         </p:txBody>
       </p:sp>
@@ -414,7 +357,7 @@
           <a:p>
             <a:fld id="{672C8AC2-76E2-427A-8089-09F7E78DC497}" type="datetimeFigureOut">
               <a:rPr lang="en-US" smtClean="0"/>
-              <a:t>9/26/2020</a:t>
+              <a:t>9/28/2020</a:t>
             </a:fld>
             <a:endParaRPr lang="en-US"/>
           </a:p>
@@ -594,7 +537,7 @@
           <a:p>
             <a:fld id="{672C8AC2-76E2-427A-8089-09F7E78DC497}" type="datetimeFigureOut">
               <a:rPr lang="en-US" smtClean="0"/>
-              <a:t>9/26/2020</a:t>
+              <a:t>9/28/2020</a:t>
             </a:fld>
             <a:endParaRPr lang="en-US"/>
           </a:p>
@@ -764,7 +707,7 @@
           <a:p>
             <a:fld id="{672C8AC2-76E2-427A-8089-09F7E78DC497}" type="datetimeFigureOut">
               <a:rPr lang="en-US" smtClean="0"/>
-              <a:t>9/26/2020</a:t>
+              <a:t>9/28/2020</a:t>
             </a:fld>
             <a:endParaRPr lang="en-US"/>
           </a:p>
@@ -1008,7 +951,7 @@
           <a:p>
             <a:fld id="{672C8AC2-76E2-427A-8089-09F7E78DC497}" type="datetimeFigureOut">
               <a:rPr lang="en-US" smtClean="0"/>
-              <a:t>9/26/2020</a:t>
+              <a:t>9/28/2020</a:t>
             </a:fld>
             <a:endParaRPr lang="en-US"/>
           </a:p>
@@ -1240,7 +1183,7 @@
           <a:p>
             <a:fld id="{672C8AC2-76E2-427A-8089-09F7E78DC497}" type="datetimeFigureOut">
               <a:rPr lang="en-US" smtClean="0"/>
-              <a:t>9/26/2020</a:t>
+              <a:t>9/28/2020</a:t>
             </a:fld>
             <a:endParaRPr lang="en-US"/>
           </a:p>
@@ -1607,7 +1550,7 @@
           <a:p>
             <a:fld id="{672C8AC2-76E2-427A-8089-09F7E78DC497}" type="datetimeFigureOut">
               <a:rPr lang="en-US" smtClean="0"/>
-              <a:t>9/26/2020</a:t>
+              <a:t>9/28/2020</a:t>
             </a:fld>
             <a:endParaRPr lang="en-US"/>
           </a:p>
@@ -1725,7 +1668,7 @@
           <a:p>
             <a:fld id="{672C8AC2-76E2-427A-8089-09F7E78DC497}" type="datetimeFigureOut">
               <a:rPr lang="en-US" smtClean="0"/>
-              <a:t>9/26/2020</a:t>
+              <a:t>9/28/2020</a:t>
             </a:fld>
             <a:endParaRPr lang="en-US"/>
           </a:p>
@@ -1820,7 +1763,7 @@
           <a:p>
             <a:fld id="{672C8AC2-76E2-427A-8089-09F7E78DC497}" type="datetimeFigureOut">
               <a:rPr lang="en-US" smtClean="0"/>
-              <a:t>9/26/2020</a:t>
+              <a:t>9/28/2020</a:t>
             </a:fld>
             <a:endParaRPr lang="en-US"/>
           </a:p>
@@ -2097,7 +2040,7 @@
           <a:p>
             <a:fld id="{672C8AC2-76E2-427A-8089-09F7E78DC497}" type="datetimeFigureOut">
               <a:rPr lang="en-US" smtClean="0"/>
-              <a:t>9/26/2020</a:t>
+              <a:t>9/28/2020</a:t>
             </a:fld>
             <a:endParaRPr lang="en-US"/>
           </a:p>
@@ -2354,7 +2297,7 @@
           <a:p>
             <a:fld id="{672C8AC2-76E2-427A-8089-09F7E78DC497}" type="datetimeFigureOut">
               <a:rPr lang="en-US" smtClean="0"/>
-              <a:t>9/26/2020</a:t>
+              <a:t>9/28/2020</a:t>
             </a:fld>
             <a:endParaRPr lang="en-US"/>
           </a:p>
@@ -2419,9 +2362,15 @@
 <p:sldMaster xmlns:a="http://schemas.openxmlformats.org/drawingml/2006/main" xmlns:r="http://schemas.openxmlformats.org/officeDocument/2006/relationships" xmlns:p="http://schemas.openxmlformats.org/presentationml/2006/main">
   <p:cSld>
     <p:bg>
-      <p:bgRef idx="1001">
-        <a:schemeClr val="bg1"/>
-      </p:bgRef>
+      <p:bgPr>
+        <a:solidFill>
+          <a:schemeClr val="accent2">
+            <a:lumMod val="60000"/>
+            <a:lumOff val="40000"/>
+          </a:schemeClr>
+        </a:solidFill>
+        <a:effectLst/>
+      </p:bgPr>
     </p:bg>
     <p:spTree>
       <p:nvGrpSpPr>
@@ -2567,7 +2516,7 @@
           <a:p>
             <a:fld id="{672C8AC2-76E2-427A-8089-09F7E78DC497}" type="datetimeFigureOut">
               <a:rPr lang="en-US" smtClean="0"/>
-              <a:t>9/26/2020</a:t>
+              <a:t>9/28/2020</a:t>
             </a:fld>
             <a:endParaRPr lang="en-US"/>
           </a:p>
@@ -2988,7 +2937,12 @@
             <p:ph type="ctrTitle"/>
           </p:nvPr>
         </p:nvSpPr>
-        <p:spPr/>
+        <p:spPr>
+          <a:xfrm>
+            <a:off x="685800" y="406400"/>
+            <a:ext cx="7772400" cy="2387600"/>
+          </a:xfrm>
+        </p:spPr>
         <p:txBody>
           <a:bodyPr>
             <a:normAutofit fontScale="90000"/>
@@ -3018,16 +2972,27 @@
             <p:ph type="subTitle" idx="1"/>
           </p:nvPr>
         </p:nvSpPr>
-        <p:spPr/>
+        <p:spPr>
+          <a:xfrm>
+            <a:off x="1143000" y="3602037"/>
+            <a:ext cx="6858000" cy="2310491"/>
+          </a:xfrm>
+        </p:spPr>
         <p:txBody>
           <a:bodyPr>
-            <a:normAutofit lnSpcReduction="10000"/>
+            <a:normAutofit fontScale="92500" lnSpcReduction="20000"/>
           </a:bodyPr>
           <a:lstStyle/>
           <a:p>
             <a:r>
               <a:rPr lang="en-US" dirty="0"/>
               <a:t>Abhishek Biswas</a:t>
+            </a:r>
+          </a:p>
+          <a:p>
+            <a:r>
+              <a:rPr lang="en-US" dirty="0"/>
+              <a:t>RSE, Princeton University </a:t>
             </a:r>
           </a:p>
           <a:p>
@@ -3040,6 +3005,9 @@
             <a:endParaRPr lang="en-US" dirty="0"/>
           </a:p>
           <a:p>
+            <a:endParaRPr lang="en-US" dirty="0"/>
+          </a:p>
+          <a:p>
             <a:r>
               <a:rPr lang="en-US" dirty="0" err="1"/>
               <a:t>PICSciE</a:t>
@@ -3061,6 +3029,216 @@
     <p:extLst>
       <p:ext uri="{BB962C8B-B14F-4D97-AF65-F5344CB8AC3E}">
         <p14:creationId xmlns:p14="http://schemas.microsoft.com/office/powerpoint/2010/main" val="829114694"/>
+      </p:ext>
+    </p:extLst>
+  </p:cSld>
+  <p:clrMapOvr>
+    <a:masterClrMapping/>
+  </p:clrMapOvr>
+</p:sld>
+</file>
+
+<file path=ppt/slides/slide10.xml><?xml version="1.0" encoding="utf-8"?>
+<p:sld xmlns:a="http://schemas.openxmlformats.org/drawingml/2006/main" xmlns:r="http://schemas.openxmlformats.org/officeDocument/2006/relationships" xmlns:p="http://schemas.openxmlformats.org/presentationml/2006/main">
+  <p:cSld>
+    <p:spTree>
+      <p:nvGrpSpPr>
+        <p:cNvPr id="1" name=""/>
+        <p:cNvGrpSpPr/>
+        <p:nvPr/>
+      </p:nvGrpSpPr>
+      <p:grpSpPr>
+        <a:xfrm>
+          <a:off x="0" y="0"/>
+          <a:ext cx="0" cy="0"/>
+          <a:chOff x="0" y="0"/>
+          <a:chExt cx="0" cy="0"/>
+        </a:xfrm>
+      </p:grpSpPr>
+      <p:sp>
+        <p:nvSpPr>
+          <p:cNvPr id="2" name="Title 1">
+            <a:extLst>
+              <a:ext uri="{FF2B5EF4-FFF2-40B4-BE49-F238E27FC236}">
+                <a16:creationId xmlns:a16="http://schemas.microsoft.com/office/drawing/2014/main" id="{0A2DA531-92ED-4623-A4B8-90CE8F756834}"/>
+              </a:ext>
+            </a:extLst>
+          </p:cNvPr>
+          <p:cNvSpPr>
+            <a:spLocks noGrp="1"/>
+          </p:cNvSpPr>
+          <p:nvPr>
+            <p:ph type="title"/>
+          </p:nvPr>
+        </p:nvSpPr>
+        <p:spPr/>
+        <p:txBody>
+          <a:bodyPr/>
+          <a:lstStyle/>
+          <a:p>
+            <a:r>
+              <a:rPr lang="en-US" dirty="0"/>
+              <a:t>Exercise 3 : C++</a:t>
+            </a:r>
+          </a:p>
+        </p:txBody>
+      </p:sp>
+      <p:sp>
+        <p:nvSpPr>
+          <p:cNvPr id="3" name="Content Placeholder 2">
+            <a:extLst>
+              <a:ext uri="{FF2B5EF4-FFF2-40B4-BE49-F238E27FC236}">
+                <a16:creationId xmlns:a16="http://schemas.microsoft.com/office/drawing/2014/main" id="{D1BF4B0F-0AD3-470A-B163-9EDCD95D5A97}"/>
+              </a:ext>
+            </a:extLst>
+          </p:cNvPr>
+          <p:cNvSpPr>
+            <a:spLocks noGrp="1"/>
+          </p:cNvSpPr>
+          <p:nvPr>
+            <p:ph idx="1"/>
+          </p:nvPr>
+        </p:nvSpPr>
+        <p:spPr/>
+        <p:txBody>
+          <a:bodyPr>
+            <a:normAutofit fontScale="92500" lnSpcReduction="20000"/>
+          </a:bodyPr>
+          <a:lstStyle/>
+          <a:p>
+            <a:pPr>
+              <a:lnSpc>
+                <a:spcPct val="150000"/>
+              </a:lnSpc>
+            </a:pPr>
+            <a:r>
+              <a:rPr lang="en-US" dirty="0"/>
+              <a:t>Compile the code</a:t>
+            </a:r>
+          </a:p>
+          <a:p>
+            <a:pPr lvl="1">
+              <a:lnSpc>
+                <a:spcPct val="150000"/>
+              </a:lnSpc>
+            </a:pPr>
+            <a:r>
+              <a:rPr lang="pt-BR" dirty="0">
+                <a:latin typeface="Courier New" panose="02070309020205020404" pitchFamily="49" charset="0"/>
+                <a:cs typeface="Courier New" panose="02070309020205020404" pitchFamily="49" charset="0"/>
+              </a:rPr>
+              <a:t>g++ -g -O0 -o serial_cpp serial.cpp</a:t>
+            </a:r>
+          </a:p>
+          <a:p>
+            <a:pPr>
+              <a:lnSpc>
+                <a:spcPct val="150000"/>
+              </a:lnSpc>
+            </a:pPr>
+            <a:r>
+              <a:rPr lang="pt-BR" dirty="0"/>
+              <a:t>Request a task node on Adroit</a:t>
+            </a:r>
+          </a:p>
+          <a:p>
+            <a:pPr lvl="1">
+              <a:lnSpc>
+                <a:spcPct val="150000"/>
+              </a:lnSpc>
+            </a:pPr>
+            <a:r>
+              <a:rPr lang="en-US" dirty="0" err="1">
+                <a:latin typeface="Courier New" panose="02070309020205020404" pitchFamily="49" charset="0"/>
+                <a:cs typeface="Courier New" panose="02070309020205020404" pitchFamily="49" charset="0"/>
+              </a:rPr>
+              <a:t>salloc</a:t>
+            </a:r>
+            <a:r>
+              <a:rPr lang="en-US" dirty="0">
+                <a:latin typeface="Courier New" panose="02070309020205020404" pitchFamily="49" charset="0"/>
+                <a:cs typeface="Courier New" panose="02070309020205020404" pitchFamily="49" charset="0"/>
+              </a:rPr>
+              <a:t> --nodes=1 --</a:t>
+            </a:r>
+            <a:r>
+              <a:rPr lang="en-US" dirty="0" err="1">
+                <a:latin typeface="Courier New" panose="02070309020205020404" pitchFamily="49" charset="0"/>
+                <a:cs typeface="Courier New" panose="02070309020205020404" pitchFamily="49" charset="0"/>
+              </a:rPr>
+              <a:t>ntasks</a:t>
+            </a:r>
+            <a:r>
+              <a:rPr lang="en-US" dirty="0">
+                <a:latin typeface="Courier New" panose="02070309020205020404" pitchFamily="49" charset="0"/>
+                <a:cs typeface="Courier New" panose="02070309020205020404" pitchFamily="49" charset="0"/>
+              </a:rPr>
+              <a:t>=1 --time=05:00 --x11</a:t>
+            </a:r>
+          </a:p>
+          <a:p>
+            <a:pPr>
+              <a:lnSpc>
+                <a:spcPct val="150000"/>
+              </a:lnSpc>
+            </a:pPr>
+            <a:r>
+              <a:rPr lang="en-US" dirty="0"/>
+              <a:t>Load the Arm DDT debugger </a:t>
+            </a:r>
+          </a:p>
+          <a:p>
+            <a:pPr lvl="1">
+              <a:lnSpc>
+                <a:spcPct val="150000"/>
+              </a:lnSpc>
+            </a:pPr>
+            <a:r>
+              <a:rPr lang="en-US" dirty="0">
+                <a:latin typeface="Courier New" panose="02070309020205020404" pitchFamily="49" charset="0"/>
+                <a:cs typeface="Courier New" panose="02070309020205020404" pitchFamily="49" charset="0"/>
+              </a:rPr>
+              <a:t>module load </a:t>
+            </a:r>
+            <a:r>
+              <a:rPr lang="en-US" dirty="0" err="1">
+                <a:latin typeface="Courier New" panose="02070309020205020404" pitchFamily="49" charset="0"/>
+                <a:cs typeface="Courier New" panose="02070309020205020404" pitchFamily="49" charset="0"/>
+              </a:rPr>
+              <a:t>ddt</a:t>
+            </a:r>
+            <a:r>
+              <a:rPr lang="en-US" dirty="0">
+                <a:latin typeface="Courier New" panose="02070309020205020404" pitchFamily="49" charset="0"/>
+                <a:cs typeface="Courier New" panose="02070309020205020404" pitchFamily="49" charset="0"/>
+              </a:rPr>
+              <a:t>/20.0.1</a:t>
+            </a:r>
+          </a:p>
+          <a:p>
+            <a:pPr lvl="1">
+              <a:lnSpc>
+                <a:spcPct val="150000"/>
+              </a:lnSpc>
+            </a:pPr>
+            <a:r>
+              <a:rPr lang="en-US" dirty="0" err="1">
+                <a:latin typeface="Courier New" panose="02070309020205020404" pitchFamily="49" charset="0"/>
+                <a:cs typeface="Courier New" panose="02070309020205020404" pitchFamily="49" charset="0"/>
+              </a:rPr>
+              <a:t>ddt</a:t>
+            </a:r>
+            <a:endParaRPr lang="en-US" dirty="0">
+              <a:latin typeface="Courier New" panose="02070309020205020404" pitchFamily="49" charset="0"/>
+              <a:cs typeface="Courier New" panose="02070309020205020404" pitchFamily="49" charset="0"/>
+            </a:endParaRPr>
+          </a:p>
+        </p:txBody>
+      </p:sp>
+    </p:spTree>
+    <p:extLst>
+      <p:ext uri="{BB962C8B-B14F-4D97-AF65-F5344CB8AC3E}">
+        <p14:creationId xmlns:p14="http://schemas.microsoft.com/office/powerpoint/2010/main" val="3956143696"/>
       </p:ext>
     </p:extLst>
   </p:cSld>
@@ -3177,7 +3355,7 @@
             </a:pPr>
             <a:r>
               <a:rPr lang="en-US" dirty="0"/>
-              <a:t>Python – Jupiter and PyCharm</a:t>
+              <a:t>Python –PyCharm</a:t>
             </a:r>
           </a:p>
           <a:p>
@@ -3188,13 +3366,8 @@
             </a:pPr>
             <a:r>
               <a:rPr lang="en-US" dirty="0"/>
-              <a:t>R - </a:t>
-            </a:r>
-            <a:r>
-              <a:rPr lang="en-US" dirty="0" err="1"/>
-              <a:t>Rstudio</a:t>
-            </a:r>
-            <a:endParaRPr lang="en-US" dirty="0"/>
+              <a:t>R - RStudio</a:t>
+            </a:r>
           </a:p>
           <a:p>
             <a:pPr lvl="1">
@@ -3237,7 +3410,7 @@
             </a:pPr>
             <a:r>
               <a:rPr lang="en-US" dirty="0"/>
-              <a:t>Incorrect Output</a:t>
+              <a:t>Incorrect output</a:t>
             </a:r>
           </a:p>
           <a:p>
@@ -3248,7 +3421,7 @@
             </a:pPr>
             <a:r>
               <a:rPr lang="en-US" dirty="0"/>
-              <a:t>Unusual Resource Utilization (Time, Memory, CPU) </a:t>
+              <a:t>Unusual resource utilization (Time, Memory, CPU) </a:t>
             </a:r>
           </a:p>
         </p:txBody>
@@ -3445,7 +3618,7 @@
           <a:p>
             <a:r>
               <a:rPr lang="en-US" dirty="0"/>
-              <a:t>IDEs Help Design</a:t>
+              <a:t>IDEs Help Design and Navigate</a:t>
             </a:r>
           </a:p>
         </p:txBody>
@@ -3663,7 +3836,17 @@
             </a:pPr>
             <a:r>
               <a:rPr lang="en-US" dirty="0"/>
-              <a:t>Link:</a:t>
+              <a:t>Link: </a:t>
+            </a:r>
+            <a:r>
+              <a:rPr lang="en-US" dirty="0">
+                <a:hlinkClick r:id="rId2"/>
+              </a:rPr>
+              <a:t>https://tinyurl.com/y5vpaf7b</a:t>
+            </a:r>
+            <a:r>
+              <a:rPr lang="en-US" dirty="0"/>
+              <a:t> </a:t>
             </a:r>
           </a:p>
           <a:p>
@@ -3674,48 +3857,48 @@
             </a:pPr>
             <a:r>
               <a:rPr lang="en-US" dirty="0"/>
-              <a:t>Download and </a:t>
+              <a:t>Download and extract the project directory</a:t>
+            </a:r>
+          </a:p>
+          <a:p>
+            <a:pPr>
+              <a:lnSpc>
+                <a:spcPct val="150000"/>
+              </a:lnSpc>
+            </a:pPr>
+            <a:r>
+              <a:rPr lang="en-US" dirty="0"/>
+              <a:t>Start Anaconda Navigator and launch PyCharm</a:t>
+            </a:r>
+          </a:p>
+          <a:p>
+            <a:pPr lvl="1">
+              <a:lnSpc>
+                <a:spcPct val="150000"/>
+              </a:lnSpc>
+            </a:pPr>
+            <a:r>
+              <a:rPr lang="en-US" dirty="0"/>
+              <a:t>Go to File &gt; New Project</a:t>
+            </a:r>
+          </a:p>
+          <a:p>
+            <a:pPr lvl="1">
+              <a:lnSpc>
+                <a:spcPct val="150000"/>
+              </a:lnSpc>
+            </a:pPr>
+            <a:r>
+              <a:rPr lang="en-US" dirty="0"/>
+              <a:t>Navigate to the “</a:t>
             </a:r>
             <a:r>
               <a:rPr lang="en-US" dirty="0" err="1"/>
-              <a:t>uncompress</a:t>
-            </a:r>
-            <a:r>
-              <a:rPr lang="en-US" dirty="0"/>
-              <a:t> file</a:t>
-            </a:r>
-          </a:p>
-          <a:p>
-            <a:pPr>
-              <a:lnSpc>
-                <a:spcPct val="150000"/>
-              </a:lnSpc>
-            </a:pPr>
-            <a:r>
-              <a:rPr lang="en-US" dirty="0"/>
-              <a:t>Start Anaconda Navigator and launch PyCharm</a:t>
-            </a:r>
-          </a:p>
-          <a:p>
-            <a:pPr lvl="1">
-              <a:lnSpc>
-                <a:spcPct val="150000"/>
-              </a:lnSpc>
-            </a:pPr>
-            <a:r>
-              <a:rPr lang="en-US" dirty="0"/>
-              <a:t>Go to File &gt; New Project</a:t>
-            </a:r>
-          </a:p>
-          <a:p>
-            <a:pPr lvl="1">
-              <a:lnSpc>
-                <a:spcPct val="150000"/>
-              </a:lnSpc>
-            </a:pPr>
-            <a:r>
-              <a:rPr lang="en-US" dirty="0"/>
-              <a:t>Navigate to project directory</a:t>
+              <a:t>python_debug</a:t>
+            </a:r>
+            <a:r>
+              <a:rPr lang="en-US" dirty="0"/>
+              <a:t>” project directory</a:t>
             </a:r>
           </a:p>
           <a:p>
@@ -3788,7 +3971,7 @@
           <p:cNvPr id="2" name="Title 1">
             <a:extLst>
               <a:ext uri="{FF2B5EF4-FFF2-40B4-BE49-F238E27FC236}">
-                <a16:creationId xmlns:a16="http://schemas.microsoft.com/office/drawing/2014/main" id="{5FD78A33-15E7-4009-995F-02F3FEF2E869}"/>
+                <a16:creationId xmlns:a16="http://schemas.microsoft.com/office/drawing/2014/main" id="{2A487E68-2AB4-4828-8937-3390A9A6FDD5}"/>
               </a:ext>
             </a:extLst>
           </p:cNvPr>
@@ -3806,7 +3989,7 @@
           <a:p>
             <a:r>
               <a:rPr lang="en-US" dirty="0"/>
-              <a:t>Exercise 2 : RStudio</a:t>
+              <a:t>Exercise 1 : Fix Tests</a:t>
             </a:r>
           </a:p>
         </p:txBody>
@@ -3816,7 +3999,7 @@
           <p:cNvPr id="3" name="Content Placeholder 2">
             <a:extLst>
               <a:ext uri="{FF2B5EF4-FFF2-40B4-BE49-F238E27FC236}">
-                <a16:creationId xmlns:a16="http://schemas.microsoft.com/office/drawing/2014/main" id="{8B7DDB34-81CC-4A34-9EC4-2E3400B990B8}"/>
+                <a16:creationId xmlns:a16="http://schemas.microsoft.com/office/drawing/2014/main" id="{72CEC002-3008-4DC4-A0AF-E385D1339B6B}"/>
               </a:ext>
             </a:extLst>
           </p:cNvPr>
@@ -3827,19 +4010,63 @@
             <p:ph idx="1"/>
           </p:nvPr>
         </p:nvSpPr>
-        <p:spPr/>
-        <p:txBody>
-          <a:bodyPr/>
-          <a:lstStyle/>
-          <a:p>
-            <a:endParaRPr lang="en-US"/>
+        <p:spPr>
+          <a:xfrm>
+            <a:off x="628650" y="2728302"/>
+            <a:ext cx="7886700" cy="2183668"/>
+          </a:xfrm>
+        </p:spPr>
+        <p:txBody>
+          <a:bodyPr/>
+          <a:lstStyle/>
+          <a:p>
+            <a:r>
+              <a:rPr lang="en-US" dirty="0"/>
+              <a:t>Fix the failing test cases</a:t>
+            </a:r>
+          </a:p>
+          <a:p>
+            <a:pPr lvl="1"/>
+            <a:r>
+              <a:rPr lang="en-US" dirty="0">
+                <a:hlinkClick r:id="rId2"/>
+              </a:rPr>
+              <a:t>https://byjus.com/maths/area-of-shapes</a:t>
+            </a:r>
+            <a:endParaRPr lang="en-US" dirty="0"/>
+          </a:p>
+          <a:p>
+            <a:pPr lvl="1"/>
+            <a:r>
+              <a:rPr lang="en-US" dirty="0">
+                <a:hlinkClick r:id="rId3"/>
+              </a:rPr>
+              <a:t>https://byjus.com/volume-formulas</a:t>
+            </a:r>
+            <a:endParaRPr lang="en-US" dirty="0"/>
+          </a:p>
+          <a:p>
+            <a:pPr lvl="1"/>
+            <a:r>
+              <a:rPr lang="en-US" dirty="0">
+                <a:hlinkClick r:id="rId4"/>
+              </a:rPr>
+              <a:t>https://byjus.com/surface-area-formulas</a:t>
+            </a:r>
+            <a:r>
+              <a:rPr lang="en-US" dirty="0"/>
+              <a:t> </a:t>
+            </a:r>
+          </a:p>
+          <a:p>
+            <a:endParaRPr lang="en-US" dirty="0"/>
           </a:p>
         </p:txBody>
       </p:sp>
     </p:spTree>
     <p:extLst>
       <p:ext uri="{BB962C8B-B14F-4D97-AF65-F5344CB8AC3E}">
-        <p14:creationId xmlns:p14="http://schemas.microsoft.com/office/powerpoint/2010/main" val="3476906450"/>
+        <p14:creationId xmlns:p14="http://schemas.microsoft.com/office/powerpoint/2010/main" val="1044877323"/>
       </p:ext>
     </p:extLst>
   </p:cSld>
@@ -3871,6 +4098,166 @@
           <p:cNvPr id="2" name="Title 1">
             <a:extLst>
               <a:ext uri="{FF2B5EF4-FFF2-40B4-BE49-F238E27FC236}">
+                <a16:creationId xmlns:a16="http://schemas.microsoft.com/office/drawing/2014/main" id="{5FD78A33-15E7-4009-995F-02F3FEF2E869}"/>
+              </a:ext>
+            </a:extLst>
+          </p:cNvPr>
+          <p:cNvSpPr>
+            <a:spLocks noGrp="1"/>
+          </p:cNvSpPr>
+          <p:nvPr>
+            <p:ph type="title"/>
+          </p:nvPr>
+        </p:nvSpPr>
+        <p:spPr/>
+        <p:txBody>
+          <a:bodyPr/>
+          <a:lstStyle/>
+          <a:p>
+            <a:r>
+              <a:rPr lang="en-US" dirty="0"/>
+              <a:t>Exercise 2 : RStudio</a:t>
+            </a:r>
+          </a:p>
+        </p:txBody>
+      </p:sp>
+      <p:sp>
+        <p:nvSpPr>
+          <p:cNvPr id="3" name="Content Placeholder 2">
+            <a:extLst>
+              <a:ext uri="{FF2B5EF4-FFF2-40B4-BE49-F238E27FC236}">
+                <a16:creationId xmlns:a16="http://schemas.microsoft.com/office/drawing/2014/main" id="{8B7DDB34-81CC-4A34-9EC4-2E3400B990B8}"/>
+              </a:ext>
+            </a:extLst>
+          </p:cNvPr>
+          <p:cNvSpPr>
+            <a:spLocks noGrp="1"/>
+          </p:cNvSpPr>
+          <p:nvPr>
+            <p:ph idx="1"/>
+          </p:nvPr>
+        </p:nvSpPr>
+        <p:spPr>
+          <a:xfrm>
+            <a:off x="628650" y="1825625"/>
+            <a:ext cx="8022981" cy="4351338"/>
+          </a:xfrm>
+        </p:spPr>
+        <p:txBody>
+          <a:bodyPr>
+            <a:normAutofit/>
+          </a:bodyPr>
+          <a:lstStyle/>
+          <a:p>
+            <a:pPr>
+              <a:lnSpc>
+                <a:spcPct val="150000"/>
+              </a:lnSpc>
+            </a:pPr>
+            <a:r>
+              <a:rPr lang="en-US" dirty="0"/>
+              <a:t>Download the file:</a:t>
+            </a:r>
+          </a:p>
+          <a:p>
+            <a:pPr lvl="1">
+              <a:lnSpc>
+                <a:spcPct val="150000"/>
+              </a:lnSpc>
+            </a:pPr>
+            <a:r>
+              <a:rPr lang="en-US" dirty="0"/>
+              <a:t>Link: </a:t>
+            </a:r>
+            <a:r>
+              <a:rPr lang="en-US" dirty="0">
+                <a:hlinkClick r:id="rId2"/>
+              </a:rPr>
+              <a:t>https://tinyurl.com/y563bgo7</a:t>
+            </a:r>
+            <a:r>
+              <a:rPr lang="en-US" dirty="0"/>
+              <a:t> </a:t>
+            </a:r>
+          </a:p>
+          <a:p>
+            <a:pPr lvl="1">
+              <a:lnSpc>
+                <a:spcPct val="150000"/>
+              </a:lnSpc>
+            </a:pPr>
+            <a:r>
+              <a:rPr lang="en-US" dirty="0"/>
+              <a:t>Download and extract the scripts and navigate to the </a:t>
+            </a:r>
+            <a:r>
+              <a:rPr lang="en-US" dirty="0" err="1"/>
+              <a:t>R_debug</a:t>
+            </a:r>
+            <a:r>
+              <a:rPr lang="en-US" dirty="0"/>
+              <a:t> folder</a:t>
+            </a:r>
+          </a:p>
+          <a:p>
+            <a:pPr>
+              <a:lnSpc>
+                <a:spcPct val="150000"/>
+              </a:lnSpc>
+            </a:pPr>
+            <a:r>
+              <a:rPr lang="en-US" dirty="0"/>
+              <a:t>Click in the files to open RStudio</a:t>
+            </a:r>
+          </a:p>
+          <a:p>
+            <a:pPr>
+              <a:lnSpc>
+                <a:spcPct val="150000"/>
+              </a:lnSpc>
+            </a:pPr>
+            <a:r>
+              <a:rPr lang="en-US" dirty="0"/>
+              <a:t>Fix the bug!</a:t>
+            </a:r>
+          </a:p>
+        </p:txBody>
+      </p:sp>
+    </p:spTree>
+    <p:extLst>
+      <p:ext uri="{BB962C8B-B14F-4D97-AF65-F5344CB8AC3E}">
+        <p14:creationId xmlns:p14="http://schemas.microsoft.com/office/powerpoint/2010/main" val="3476906450"/>
+      </p:ext>
+    </p:extLst>
+  </p:cSld>
+  <p:clrMapOvr>
+    <a:masterClrMapping/>
+  </p:clrMapOvr>
+</p:sld>
+</file>
+
+<file path=ppt/slides/slide8.xml><?xml version="1.0" encoding="utf-8"?>
+<p:sld xmlns:a="http://schemas.openxmlformats.org/drawingml/2006/main" xmlns:r="http://schemas.openxmlformats.org/officeDocument/2006/relationships" xmlns:p="http://schemas.openxmlformats.org/presentationml/2006/main">
+  <p:cSld>
+    <p:spTree>
+      <p:nvGrpSpPr>
+        <p:cNvPr id="1" name=""/>
+        <p:cNvGrpSpPr/>
+        <p:nvPr/>
+      </p:nvGrpSpPr>
+      <p:grpSpPr>
+        <a:xfrm>
+          <a:off x="0" y="0"/>
+          <a:ext cx="0" cy="0"/>
+          <a:chOff x="0" y="0"/>
+          <a:chExt cx="0" cy="0"/>
+        </a:xfrm>
+      </p:grpSpPr>
+      <p:sp>
+        <p:nvSpPr>
+          <p:cNvPr id="2" name="Title 1">
+            <a:extLst>
+              <a:ext uri="{FF2B5EF4-FFF2-40B4-BE49-F238E27FC236}">
                 <a16:creationId xmlns:a16="http://schemas.microsoft.com/office/drawing/2014/main" id="{8B1EB113-6772-47FD-B086-3D873CE8642B}"/>
               </a:ext>
             </a:extLst>
@@ -3889,7 +4276,7 @@
           <a:p>
             <a:r>
               <a:rPr lang="en-US" dirty="0"/>
-              <a:t>Exercise 1 : C++</a:t>
+              <a:t>Handling C++</a:t>
             </a:r>
           </a:p>
         </p:txBody>
@@ -3912,10 +4299,86 @@
         </p:nvSpPr>
         <p:spPr/>
         <p:txBody>
-          <a:bodyPr/>
-          <a:lstStyle/>
-          <a:p>
-            <a:endParaRPr lang="en-US"/>
+          <a:bodyPr>
+            <a:normAutofit fontScale="92500" lnSpcReduction="10000"/>
+          </a:bodyPr>
+          <a:lstStyle/>
+          <a:p>
+            <a:pPr>
+              <a:lnSpc>
+                <a:spcPct val="150000"/>
+              </a:lnSpc>
+            </a:pPr>
+            <a:r>
+              <a:rPr lang="en-US" dirty="0"/>
+              <a:t>C++ is somewhat different because it is compiled </a:t>
+            </a:r>
+          </a:p>
+          <a:p>
+            <a:pPr>
+              <a:lnSpc>
+                <a:spcPct val="150000"/>
+              </a:lnSpc>
+            </a:pPr>
+            <a:r>
+              <a:rPr lang="en-US" dirty="0"/>
+              <a:t>Some errors are found much earlier </a:t>
+            </a:r>
+          </a:p>
+          <a:p>
+            <a:pPr>
+              <a:lnSpc>
+                <a:spcPct val="150000"/>
+              </a:lnSpc>
+            </a:pPr>
+            <a:r>
+              <a:rPr lang="en-US" dirty="0"/>
+              <a:t>The build process needs to be setup</a:t>
+            </a:r>
+          </a:p>
+          <a:p>
+            <a:pPr lvl="1">
+              <a:lnSpc>
+                <a:spcPct val="150000"/>
+              </a:lnSpc>
+            </a:pPr>
+            <a:r>
+              <a:rPr lang="en-US" dirty="0"/>
+              <a:t>Compiler</a:t>
+            </a:r>
+          </a:p>
+          <a:p>
+            <a:pPr lvl="1">
+              <a:lnSpc>
+                <a:spcPct val="150000"/>
+              </a:lnSpc>
+            </a:pPr>
+            <a:r>
+              <a:rPr lang="en-US" dirty="0"/>
+              <a:t>Compiler options</a:t>
+            </a:r>
+          </a:p>
+          <a:p>
+            <a:pPr lvl="1">
+              <a:lnSpc>
+                <a:spcPct val="150000"/>
+              </a:lnSpc>
+            </a:pPr>
+            <a:r>
+              <a:rPr lang="en-US" dirty="0"/>
+              <a:t>Debug/Release builds</a:t>
+            </a:r>
+          </a:p>
+          <a:p>
+            <a:pPr>
+              <a:lnSpc>
+                <a:spcPct val="150000"/>
+              </a:lnSpc>
+            </a:pPr>
+            <a:r>
+              <a:rPr lang="en-US" dirty="0"/>
+              <a:t>Errors messages can be less obvious </a:t>
+            </a:r>
           </a:p>
         </p:txBody>
       </p:sp>
@@ -3923,6 +4386,235 @@
     <p:extLst>
       <p:ext uri="{BB962C8B-B14F-4D97-AF65-F5344CB8AC3E}">
         <p14:creationId xmlns:p14="http://schemas.microsoft.com/office/powerpoint/2010/main" val="237925523"/>
+      </p:ext>
+    </p:extLst>
+  </p:cSld>
+  <p:clrMapOvr>
+    <a:masterClrMapping/>
+  </p:clrMapOvr>
+</p:sld>
+</file>
+
+<file path=ppt/slides/slide9.xml><?xml version="1.0" encoding="utf-8"?>
+<p:sld xmlns:a="http://schemas.openxmlformats.org/drawingml/2006/main" xmlns:r="http://schemas.openxmlformats.org/officeDocument/2006/relationships" xmlns:p="http://schemas.openxmlformats.org/presentationml/2006/main">
+  <p:cSld>
+    <p:spTree>
+      <p:nvGrpSpPr>
+        <p:cNvPr id="1" name=""/>
+        <p:cNvGrpSpPr/>
+        <p:nvPr/>
+      </p:nvGrpSpPr>
+      <p:grpSpPr>
+        <a:xfrm>
+          <a:off x="0" y="0"/>
+          <a:ext cx="0" cy="0"/>
+          <a:chOff x="0" y="0"/>
+          <a:chExt cx="0" cy="0"/>
+        </a:xfrm>
+      </p:grpSpPr>
+      <p:sp>
+        <p:nvSpPr>
+          <p:cNvPr id="2" name="Title 1">
+            <a:extLst>
+              <a:ext uri="{FF2B5EF4-FFF2-40B4-BE49-F238E27FC236}">
+                <a16:creationId xmlns:a16="http://schemas.microsoft.com/office/drawing/2014/main" id="{E12BE167-F6C9-4FD8-AE90-A43FAAA42A07}"/>
+              </a:ext>
+            </a:extLst>
+          </p:cNvPr>
+          <p:cNvSpPr>
+            <a:spLocks noGrp="1"/>
+          </p:cNvSpPr>
+          <p:nvPr>
+            <p:ph type="title"/>
+          </p:nvPr>
+        </p:nvSpPr>
+        <p:spPr/>
+        <p:txBody>
+          <a:bodyPr/>
+          <a:lstStyle/>
+          <a:p>
+            <a:r>
+              <a:rPr lang="en-US" dirty="0"/>
+              <a:t>Exercise 3 : C++</a:t>
+            </a:r>
+          </a:p>
+        </p:txBody>
+      </p:sp>
+      <p:sp>
+        <p:nvSpPr>
+          <p:cNvPr id="3" name="Content Placeholder 2">
+            <a:extLst>
+              <a:ext uri="{FF2B5EF4-FFF2-40B4-BE49-F238E27FC236}">
+                <a16:creationId xmlns:a16="http://schemas.microsoft.com/office/drawing/2014/main" id="{6D93E6B7-65B4-4005-895B-4CD959210943}"/>
+              </a:ext>
+            </a:extLst>
+          </p:cNvPr>
+          <p:cNvSpPr>
+            <a:spLocks noGrp="1"/>
+          </p:cNvSpPr>
+          <p:nvPr>
+            <p:ph idx="1"/>
+          </p:nvPr>
+        </p:nvSpPr>
+        <p:spPr>
+          <a:xfrm>
+            <a:off x="211015" y="1825625"/>
+            <a:ext cx="8745415" cy="4351338"/>
+          </a:xfrm>
+        </p:spPr>
+        <p:txBody>
+          <a:bodyPr>
+            <a:normAutofit/>
+          </a:bodyPr>
+          <a:lstStyle/>
+          <a:p>
+            <a:pPr>
+              <a:lnSpc>
+                <a:spcPct val="150000"/>
+              </a:lnSpc>
+            </a:pPr>
+            <a:r>
+              <a:rPr lang="en-US" dirty="0"/>
+              <a:t>Log onto Adroit </a:t>
+            </a:r>
+          </a:p>
+          <a:p>
+            <a:pPr lvl="1">
+              <a:lnSpc>
+                <a:spcPct val="150000"/>
+              </a:lnSpc>
+            </a:pPr>
+            <a:r>
+              <a:rPr lang="en-US" dirty="0" err="1">
+                <a:latin typeface="Courier New" panose="02070309020205020404" pitchFamily="49" charset="0"/>
+                <a:cs typeface="Courier New" panose="02070309020205020404" pitchFamily="49" charset="0"/>
+              </a:rPr>
+              <a:t>ssh</a:t>
+            </a:r>
+            <a:r>
+              <a:rPr lang="en-US" dirty="0">
+                <a:latin typeface="Courier New" panose="02070309020205020404" pitchFamily="49" charset="0"/>
+                <a:cs typeface="Courier New" panose="02070309020205020404" pitchFamily="49" charset="0"/>
+              </a:rPr>
+              <a:t> -X adroit.princeton.edu</a:t>
+            </a:r>
+          </a:p>
+          <a:p>
+            <a:pPr>
+              <a:lnSpc>
+                <a:spcPct val="150000"/>
+              </a:lnSpc>
+            </a:pPr>
+            <a:r>
+              <a:rPr lang="en-US" dirty="0"/>
+              <a:t>Download the C++ code</a:t>
+            </a:r>
+          </a:p>
+          <a:p>
+            <a:pPr lvl="1">
+              <a:lnSpc>
+                <a:spcPct val="150000"/>
+              </a:lnSpc>
+            </a:pPr>
+            <a:r>
+              <a:rPr lang="pt-BR" sz="1800" dirty="0">
+                <a:latin typeface="Courier New" panose="02070309020205020404" pitchFamily="49" charset="0"/>
+                <a:cs typeface="Courier New" panose="02070309020205020404" pitchFamily="49" charset="0"/>
+              </a:rPr>
+              <a:t>curl -L -o cpp_debug.zip https://tinyurl.com/y3k73w6y</a:t>
+            </a:r>
+            <a:endParaRPr lang="en-US" sz="1800" dirty="0">
+              <a:latin typeface="Courier New" panose="02070309020205020404" pitchFamily="49" charset="0"/>
+              <a:cs typeface="Courier New" panose="02070309020205020404" pitchFamily="49" charset="0"/>
+            </a:endParaRPr>
+          </a:p>
+          <a:p>
+            <a:pPr lvl="1">
+              <a:lnSpc>
+                <a:spcPct val="150000"/>
+              </a:lnSpc>
+            </a:pPr>
+            <a:r>
+              <a:rPr lang="en-US" dirty="0">
+                <a:latin typeface="Courier New" panose="02070309020205020404" pitchFamily="49" charset="0"/>
+                <a:cs typeface="Courier New" panose="02070309020205020404" pitchFamily="49" charset="0"/>
+              </a:rPr>
+              <a:t>unzip </a:t>
+            </a:r>
+            <a:r>
+              <a:rPr lang="en-US" dirty="0" err="1">
+                <a:latin typeface="Courier New" panose="02070309020205020404" pitchFamily="49" charset="0"/>
+                <a:cs typeface="Courier New" panose="02070309020205020404" pitchFamily="49" charset="0"/>
+              </a:rPr>
+              <a:t>cpp</a:t>
+            </a:r>
+            <a:r>
+              <a:rPr lang="en-US" dirty="0">
+                <a:latin typeface="Courier New" panose="02070309020205020404" pitchFamily="49" charset="0"/>
+                <a:cs typeface="Courier New" panose="02070309020205020404" pitchFamily="49" charset="0"/>
+              </a:rPr>
+              <a:t>_</a:t>
+            </a:r>
+            <a:r>
+              <a:rPr lang="pt-BR" dirty="0">
+                <a:latin typeface="Courier New" panose="02070309020205020404" pitchFamily="49" charset="0"/>
+                <a:cs typeface="Courier New" panose="02070309020205020404" pitchFamily="49" charset="0"/>
+              </a:rPr>
+              <a:t>debug</a:t>
+            </a:r>
+            <a:r>
+              <a:rPr lang="en-US" dirty="0">
+                <a:latin typeface="Courier New" panose="02070309020205020404" pitchFamily="49" charset="0"/>
+                <a:cs typeface="Courier New" panose="02070309020205020404" pitchFamily="49" charset="0"/>
+              </a:rPr>
+              <a:t>.zip </a:t>
+            </a:r>
+          </a:p>
+          <a:p>
+            <a:pPr lvl="1">
+              <a:lnSpc>
+                <a:spcPct val="150000"/>
+              </a:lnSpc>
+            </a:pPr>
+            <a:r>
+              <a:rPr lang="en-US" dirty="0">
+                <a:latin typeface="Courier New" panose="02070309020205020404" pitchFamily="49" charset="0"/>
+                <a:cs typeface="Courier New" panose="02070309020205020404" pitchFamily="49" charset="0"/>
+              </a:rPr>
+              <a:t>cd </a:t>
+            </a:r>
+            <a:r>
+              <a:rPr lang="en-US" dirty="0" err="1">
+                <a:latin typeface="Courier New" panose="02070309020205020404" pitchFamily="49" charset="0"/>
+                <a:cs typeface="Courier New" panose="02070309020205020404" pitchFamily="49" charset="0"/>
+              </a:rPr>
+              <a:t>cpp</a:t>
+            </a:r>
+            <a:r>
+              <a:rPr lang="en-US" dirty="0">
+                <a:latin typeface="Courier New" panose="02070309020205020404" pitchFamily="49" charset="0"/>
+                <a:cs typeface="Courier New" panose="02070309020205020404" pitchFamily="49" charset="0"/>
+              </a:rPr>
+              <a:t>_</a:t>
+            </a:r>
+            <a:r>
+              <a:rPr lang="pt-BR" dirty="0">
+                <a:latin typeface="Courier New" panose="02070309020205020404" pitchFamily="49" charset="0"/>
+                <a:cs typeface="Courier New" panose="02070309020205020404" pitchFamily="49" charset="0"/>
+              </a:rPr>
+              <a:t>debug</a:t>
+            </a:r>
+            <a:endParaRPr lang="en-US" dirty="0">
+              <a:latin typeface="Courier New" panose="02070309020205020404" pitchFamily="49" charset="0"/>
+              <a:cs typeface="Courier New" panose="02070309020205020404" pitchFamily="49" charset="0"/>
+            </a:endParaRPr>
+          </a:p>
+        </p:txBody>
+      </p:sp>
+    </p:spTree>
+    <p:extLst>
+      <p:ext uri="{BB962C8B-B14F-4D97-AF65-F5344CB8AC3E}">
+        <p14:creationId xmlns:p14="http://schemas.microsoft.com/office/powerpoint/2010/main" val="1010424374"/>
       </p:ext>
     </p:extLst>
   </p:cSld>

</xml_diff>

<commit_message>
Added some Python and R install instructions.
</commit_message>
<xml_diff>
--- a/01_overview/Introduction_To_Debugging.pptx
+++ b/01_overview/Introduction_To_Debugging.pptx
@@ -3355,7 +3355,7 @@
             </a:pPr>
             <a:r>
               <a:rPr lang="en-US" dirty="0"/>
-              <a:t>Python –PyCharm</a:t>
+              <a:t>Python – PyCharm</a:t>
             </a:r>
           </a:p>
           <a:p>
@@ -3366,8 +3366,13 @@
             </a:pPr>
             <a:r>
               <a:rPr lang="en-US" dirty="0"/>
-              <a:t>R - RStudio</a:t>
-            </a:r>
+              <a:t>R </a:t>
+            </a:r>
+            <a:r>
+              <a:rPr lang="en-US"/>
+              <a:t>– RStudio </a:t>
+            </a:r>
+            <a:endParaRPr lang="en-US" dirty="0"/>
           </a:p>
           <a:p>
             <a:pPr lvl="1">
@@ -3377,7 +3382,7 @@
             </a:pPr>
             <a:r>
               <a:rPr lang="en-US" dirty="0"/>
-              <a:t>C++ - DDT </a:t>
+              <a:t>C++ – DDT    </a:t>
             </a:r>
           </a:p>
           <a:p>

</xml_diff>

<commit_message>
Made edits to the python profile examples.
</commit_message>
<xml_diff>
--- a/01_overview/Introduction_To_Debugging.pptx
+++ b/01_overview/Introduction_To_Debugging.pptx
@@ -8,13 +8,19 @@
     <p:sldId id="257" r:id="rId2"/>
     <p:sldId id="258" r:id="rId3"/>
     <p:sldId id="259" r:id="rId4"/>
-    <p:sldId id="260" r:id="rId5"/>
-    <p:sldId id="261" r:id="rId6"/>
-    <p:sldId id="264" r:id="rId7"/>
-    <p:sldId id="262" r:id="rId8"/>
-    <p:sldId id="263" r:id="rId9"/>
-    <p:sldId id="265" r:id="rId10"/>
-    <p:sldId id="266" r:id="rId11"/>
+    <p:sldId id="269" r:id="rId5"/>
+    <p:sldId id="268" r:id="rId6"/>
+    <p:sldId id="270" r:id="rId7"/>
+    <p:sldId id="260" r:id="rId8"/>
+    <p:sldId id="261" r:id="rId9"/>
+    <p:sldId id="264" r:id="rId10"/>
+    <p:sldId id="271" r:id="rId11"/>
+    <p:sldId id="273" r:id="rId12"/>
+    <p:sldId id="272" r:id="rId13"/>
+    <p:sldId id="262" r:id="rId14"/>
+    <p:sldId id="263" r:id="rId15"/>
+    <p:sldId id="265" r:id="rId16"/>
+    <p:sldId id="266" r:id="rId17"/>
   </p:sldIdLst>
   <p:sldSz cx="9144000" cy="6858000" type="screen4x3"/>
   <p:notesSz cx="6858000" cy="9144000"/>
@@ -357,7 +363,7 @@
           <a:p>
             <a:fld id="{672C8AC2-76E2-427A-8089-09F7E78DC497}" type="datetimeFigureOut">
               <a:rPr lang="en-US" smtClean="0"/>
-              <a:t>9/28/2020</a:t>
+              <a:t>1/12/22</a:t>
             </a:fld>
             <a:endParaRPr lang="en-US"/>
           </a:p>
@@ -537,7 +543,7 @@
           <a:p>
             <a:fld id="{672C8AC2-76E2-427A-8089-09F7E78DC497}" type="datetimeFigureOut">
               <a:rPr lang="en-US" smtClean="0"/>
-              <a:t>9/28/2020</a:t>
+              <a:t>1/12/22</a:t>
             </a:fld>
             <a:endParaRPr lang="en-US"/>
           </a:p>
@@ -707,7 +713,7 @@
           <a:p>
             <a:fld id="{672C8AC2-76E2-427A-8089-09F7E78DC497}" type="datetimeFigureOut">
               <a:rPr lang="en-US" smtClean="0"/>
-              <a:t>9/28/2020</a:t>
+              <a:t>1/12/22</a:t>
             </a:fld>
             <a:endParaRPr lang="en-US"/>
           </a:p>
@@ -951,7 +957,7 @@
           <a:p>
             <a:fld id="{672C8AC2-76E2-427A-8089-09F7E78DC497}" type="datetimeFigureOut">
               <a:rPr lang="en-US" smtClean="0"/>
-              <a:t>9/28/2020</a:t>
+              <a:t>1/12/22</a:t>
             </a:fld>
             <a:endParaRPr lang="en-US"/>
           </a:p>
@@ -1183,7 +1189,7 @@
           <a:p>
             <a:fld id="{672C8AC2-76E2-427A-8089-09F7E78DC497}" type="datetimeFigureOut">
               <a:rPr lang="en-US" smtClean="0"/>
-              <a:t>9/28/2020</a:t>
+              <a:t>1/12/22</a:t>
             </a:fld>
             <a:endParaRPr lang="en-US"/>
           </a:p>
@@ -1550,7 +1556,7 @@
           <a:p>
             <a:fld id="{672C8AC2-76E2-427A-8089-09F7E78DC497}" type="datetimeFigureOut">
               <a:rPr lang="en-US" smtClean="0"/>
-              <a:t>9/28/2020</a:t>
+              <a:t>1/12/22</a:t>
             </a:fld>
             <a:endParaRPr lang="en-US"/>
           </a:p>
@@ -1668,7 +1674,7 @@
           <a:p>
             <a:fld id="{672C8AC2-76E2-427A-8089-09F7E78DC497}" type="datetimeFigureOut">
               <a:rPr lang="en-US" smtClean="0"/>
-              <a:t>9/28/2020</a:t>
+              <a:t>1/12/22</a:t>
             </a:fld>
             <a:endParaRPr lang="en-US"/>
           </a:p>
@@ -1763,7 +1769,7 @@
           <a:p>
             <a:fld id="{672C8AC2-76E2-427A-8089-09F7E78DC497}" type="datetimeFigureOut">
               <a:rPr lang="en-US" smtClean="0"/>
-              <a:t>9/28/2020</a:t>
+              <a:t>1/12/22</a:t>
             </a:fld>
             <a:endParaRPr lang="en-US"/>
           </a:p>
@@ -2040,7 +2046,7 @@
           <a:p>
             <a:fld id="{672C8AC2-76E2-427A-8089-09F7E78DC497}" type="datetimeFigureOut">
               <a:rPr lang="en-US" smtClean="0"/>
-              <a:t>9/28/2020</a:t>
+              <a:t>1/12/22</a:t>
             </a:fld>
             <a:endParaRPr lang="en-US"/>
           </a:p>
@@ -2297,7 +2303,7 @@
           <a:p>
             <a:fld id="{672C8AC2-76E2-427A-8089-09F7E78DC497}" type="datetimeFigureOut">
               <a:rPr lang="en-US" smtClean="0"/>
-              <a:t>9/28/2020</a:t>
+              <a:t>1/12/22</a:t>
             </a:fld>
             <a:endParaRPr lang="en-US"/>
           </a:p>
@@ -2516,7 +2522,7 @@
           <a:p>
             <a:fld id="{672C8AC2-76E2-427A-8089-09F7E78DC497}" type="datetimeFigureOut">
               <a:rPr lang="en-US" smtClean="0"/>
-              <a:t>9/28/2020</a:t>
+              <a:t>1/12/22</a:t>
             </a:fld>
             <a:endParaRPr lang="en-US"/>
           </a:p>
@@ -2945,13 +2951,13 @@
         </p:spPr>
         <p:txBody>
           <a:bodyPr>
-            <a:normAutofit fontScale="90000"/>
+            <a:normAutofit/>
           </a:bodyPr>
           <a:lstStyle/>
           <a:p>
             <a:r>
               <a:rPr lang="en-US" dirty="0"/>
-              <a:t>Introduction to Debugging (Python, R and C++)</a:t>
+              <a:t>Debugging &amp; Profiling Code, in Python and R</a:t>
             </a:r>
           </a:p>
         </p:txBody>
@@ -2992,7 +2998,7 @@
           <a:p>
             <a:r>
               <a:rPr lang="en-US" dirty="0"/>
-              <a:t>RSE, Princeton University </a:t>
+              <a:t>Research Software Engineer, Princeton University </a:t>
             </a:r>
           </a:p>
           <a:p>
@@ -3010,6 +3016,14 @@
           <a:p>
             <a:r>
               <a:rPr lang="en-US" dirty="0" err="1"/>
+              <a:t>Wintersession</a:t>
+            </a:r>
+            <a:r>
+              <a:rPr lang="en-US" dirty="0"/>
+              <a:t> / </a:t>
+            </a:r>
+            <a:r>
+              <a:rPr lang="en-US" dirty="0" err="1"/>
               <a:t>PICSciE</a:t>
             </a:r>
             <a:r>
@@ -3020,7 +3034,7 @@
           <a:p>
             <a:r>
               <a:rPr lang="en-US" dirty="0"/>
-              <a:t>September 2020</a:t>
+              <a:t>January 2022</a:t>
             </a:r>
           </a:p>
         </p:txBody>
@@ -3060,6 +3074,1004 @@
           <p:cNvPr id="2" name="Title 1">
             <a:extLst>
               <a:ext uri="{FF2B5EF4-FFF2-40B4-BE49-F238E27FC236}">
+                <a16:creationId xmlns:a16="http://schemas.microsoft.com/office/drawing/2014/main" id="{1BC26E86-427F-DB4F-9B74-EC48AE4C30A0}"/>
+              </a:ext>
+            </a:extLst>
+          </p:cNvPr>
+          <p:cNvSpPr>
+            <a:spLocks noGrp="1"/>
+          </p:cNvSpPr>
+          <p:nvPr>
+            <p:ph type="title"/>
+          </p:nvPr>
+        </p:nvSpPr>
+        <p:spPr/>
+        <p:txBody>
+          <a:bodyPr/>
+          <a:lstStyle/>
+          <a:p>
+            <a:r>
+              <a:rPr lang="en-US" dirty="0"/>
+              <a:t>Profiling Python Code</a:t>
+            </a:r>
+          </a:p>
+        </p:txBody>
+      </p:sp>
+      <p:sp>
+        <p:nvSpPr>
+          <p:cNvPr id="3" name="Content Placeholder 2">
+            <a:extLst>
+              <a:ext uri="{FF2B5EF4-FFF2-40B4-BE49-F238E27FC236}">
+                <a16:creationId xmlns:a16="http://schemas.microsoft.com/office/drawing/2014/main" id="{7C1DB76C-6788-BF4A-B321-438F8D2FA99C}"/>
+              </a:ext>
+            </a:extLst>
+          </p:cNvPr>
+          <p:cNvSpPr>
+            <a:spLocks noGrp="1"/>
+          </p:cNvSpPr>
+          <p:nvPr>
+            <p:ph idx="1"/>
+          </p:nvPr>
+        </p:nvSpPr>
+        <p:spPr>
+          <a:xfrm>
+            <a:off x="628650" y="1825625"/>
+            <a:ext cx="6132286" cy="4351338"/>
+          </a:xfrm>
+        </p:spPr>
+        <p:txBody>
+          <a:bodyPr>
+            <a:normAutofit lnSpcReduction="10000"/>
+          </a:bodyPr>
+          <a:lstStyle/>
+          <a:p>
+            <a:r>
+              <a:rPr lang="en-US" dirty="0"/>
+              <a:t>Create a new python project using  to “</a:t>
+            </a:r>
+            <a:r>
+              <a:rPr lang="en-US" b="1" dirty="0" err="1"/>
+              <a:t>python_profile</a:t>
+            </a:r>
+            <a:r>
+              <a:rPr lang="en-US" dirty="0"/>
+              <a:t>” directory</a:t>
+            </a:r>
+          </a:p>
+          <a:p>
+            <a:endParaRPr lang="en-US" dirty="0"/>
+          </a:p>
+          <a:p>
+            <a:r>
+              <a:rPr lang="en-US" dirty="0"/>
+              <a:t>python -m </a:t>
+            </a:r>
+            <a:r>
+              <a:rPr lang="en-US" dirty="0" err="1"/>
+              <a:t>cProfile</a:t>
+            </a:r>
+            <a:r>
+              <a:rPr lang="en-US" dirty="0"/>
+              <a:t> -s </a:t>
+            </a:r>
+            <a:r>
+              <a:rPr lang="en-US" b="1" dirty="0" err="1"/>
+              <a:t>tottime</a:t>
+            </a:r>
+            <a:r>
+              <a:rPr lang="en-US" dirty="0"/>
+              <a:t> </a:t>
+            </a:r>
+            <a:r>
+              <a:rPr lang="en-US" dirty="0" err="1"/>
+              <a:t>search.py</a:t>
+            </a:r>
+            <a:endParaRPr lang="en-US" dirty="0"/>
+          </a:p>
+          <a:p>
+            <a:pPr lvl="1"/>
+            <a:r>
+              <a:rPr lang="en-US" dirty="0" err="1"/>
+              <a:t>simple_search</a:t>
+            </a:r>
+            <a:endParaRPr lang="en-US" dirty="0"/>
+          </a:p>
+          <a:p>
+            <a:pPr lvl="1"/>
+            <a:r>
+              <a:rPr lang="en-US" dirty="0" err="1"/>
+              <a:t>sort_search</a:t>
+            </a:r>
+            <a:r>
+              <a:rPr lang="en-US" dirty="0"/>
+              <a:t> </a:t>
+            </a:r>
+          </a:p>
+          <a:p>
+            <a:pPr lvl="1"/>
+            <a:r>
+              <a:rPr lang="en-US" dirty="0" err="1"/>
+              <a:t>best_search</a:t>
+            </a:r>
+            <a:endParaRPr lang="en-US" dirty="0"/>
+          </a:p>
+          <a:p>
+            <a:pPr lvl="1"/>
+            <a:endParaRPr lang="en-US" dirty="0"/>
+          </a:p>
+          <a:p>
+            <a:r>
+              <a:rPr lang="en-US" dirty="0"/>
+              <a:t>Why is </a:t>
+            </a:r>
+            <a:r>
+              <a:rPr lang="en-US" dirty="0" err="1"/>
+              <a:t>simple_search</a:t>
+            </a:r>
+            <a:r>
+              <a:rPr lang="en-US" dirty="0"/>
+              <a:t> faster?</a:t>
+            </a:r>
+          </a:p>
+          <a:p>
+            <a:pPr lvl="1"/>
+            <a:r>
+              <a:rPr lang="en-US" dirty="0"/>
+              <a:t>Profile the code</a:t>
+            </a:r>
+          </a:p>
+          <a:p>
+            <a:pPr lvl="1"/>
+            <a:r>
+              <a:rPr lang="en-US" dirty="0"/>
+              <a:t>See what is taking so long? </a:t>
+            </a:r>
+          </a:p>
+          <a:p>
+            <a:endParaRPr lang="en-US" dirty="0"/>
+          </a:p>
+          <a:p>
+            <a:endParaRPr lang="en-US" dirty="0"/>
+          </a:p>
+        </p:txBody>
+      </p:sp>
+      <p:pic>
+        <p:nvPicPr>
+          <p:cNvPr id="4" name="Picture 3">
+            <a:extLst>
+              <a:ext uri="{FF2B5EF4-FFF2-40B4-BE49-F238E27FC236}">
+                <a16:creationId xmlns:a16="http://schemas.microsoft.com/office/drawing/2014/main" id="{08308E2D-5469-1F41-98C2-D0EBC0AF15EE}"/>
+              </a:ext>
+            </a:extLst>
+          </p:cNvPr>
+          <p:cNvPicPr>
+            <a:picLocks noChangeAspect="1"/>
+          </p:cNvPicPr>
+          <p:nvPr/>
+        </p:nvPicPr>
+        <p:blipFill>
+          <a:blip r:embed="rId2"/>
+          <a:stretch>
+            <a:fillRect/>
+          </a:stretch>
+        </p:blipFill>
+        <p:spPr>
+          <a:xfrm>
+            <a:off x="6869793" y="1146402"/>
+            <a:ext cx="2165350" cy="5167311"/>
+          </a:xfrm>
+          <a:prstGeom prst="rect">
+            <a:avLst/>
+          </a:prstGeom>
+        </p:spPr>
+      </p:pic>
+    </p:spTree>
+    <p:extLst>
+      <p:ext uri="{BB962C8B-B14F-4D97-AF65-F5344CB8AC3E}">
+        <p14:creationId xmlns:p14="http://schemas.microsoft.com/office/powerpoint/2010/main" val="13038767"/>
+      </p:ext>
+    </p:extLst>
+  </p:cSld>
+  <p:clrMapOvr>
+    <a:masterClrMapping/>
+  </p:clrMapOvr>
+</p:sld>
+</file>
+
+<file path=ppt/slides/slide11.xml><?xml version="1.0" encoding="utf-8"?>
+<p:sld xmlns:a="http://schemas.openxmlformats.org/drawingml/2006/main" xmlns:r="http://schemas.openxmlformats.org/officeDocument/2006/relationships" xmlns:p="http://schemas.openxmlformats.org/presentationml/2006/main">
+  <p:cSld>
+    <p:spTree>
+      <p:nvGrpSpPr>
+        <p:cNvPr id="1" name=""/>
+        <p:cNvGrpSpPr/>
+        <p:nvPr/>
+      </p:nvGrpSpPr>
+      <p:grpSpPr>
+        <a:xfrm>
+          <a:off x="0" y="0"/>
+          <a:ext cx="0" cy="0"/>
+          <a:chOff x="0" y="0"/>
+          <a:chExt cx="0" cy="0"/>
+        </a:xfrm>
+      </p:grpSpPr>
+      <p:sp>
+        <p:nvSpPr>
+          <p:cNvPr id="4" name="Title 3">
+            <a:extLst>
+              <a:ext uri="{FF2B5EF4-FFF2-40B4-BE49-F238E27FC236}">
+                <a16:creationId xmlns:a16="http://schemas.microsoft.com/office/drawing/2014/main" id="{66F91022-F868-2E44-BEC5-8C504E29AB50}"/>
+              </a:ext>
+            </a:extLst>
+          </p:cNvPr>
+          <p:cNvSpPr>
+            <a:spLocks noGrp="1"/>
+          </p:cNvSpPr>
+          <p:nvPr>
+            <p:ph type="ctrTitle"/>
+          </p:nvPr>
+        </p:nvSpPr>
+        <p:spPr/>
+        <p:txBody>
+          <a:bodyPr/>
+          <a:lstStyle/>
+          <a:p>
+            <a:r>
+              <a:rPr lang="en-US" dirty="0"/>
+              <a:t>Did anyone run the tests for search?</a:t>
+            </a:r>
+          </a:p>
+        </p:txBody>
+      </p:sp>
+      <p:sp>
+        <p:nvSpPr>
+          <p:cNvPr id="5" name="Subtitle 4">
+            <a:extLst>
+              <a:ext uri="{FF2B5EF4-FFF2-40B4-BE49-F238E27FC236}">
+                <a16:creationId xmlns:a16="http://schemas.microsoft.com/office/drawing/2014/main" id="{9BD514F3-C5AD-8940-8EDC-336DA922C490}"/>
+              </a:ext>
+            </a:extLst>
+          </p:cNvPr>
+          <p:cNvSpPr>
+            <a:spLocks noGrp="1"/>
+          </p:cNvSpPr>
+          <p:nvPr>
+            <p:ph type="subTitle" idx="1"/>
+          </p:nvPr>
+        </p:nvSpPr>
+        <p:spPr/>
+        <p:txBody>
+          <a:bodyPr/>
+          <a:lstStyle/>
+          <a:p>
+            <a:r>
+              <a:rPr lang="en-US" dirty="0"/>
+              <a:t>Check correctness before profiling!</a:t>
+            </a:r>
+          </a:p>
+        </p:txBody>
+      </p:sp>
+    </p:spTree>
+    <p:extLst>
+      <p:ext uri="{BB962C8B-B14F-4D97-AF65-F5344CB8AC3E}">
+        <p14:creationId xmlns:p14="http://schemas.microsoft.com/office/powerpoint/2010/main" val="608997426"/>
+      </p:ext>
+    </p:extLst>
+  </p:cSld>
+  <p:clrMapOvr>
+    <a:masterClrMapping/>
+  </p:clrMapOvr>
+</p:sld>
+</file>
+
+<file path=ppt/slides/slide12.xml><?xml version="1.0" encoding="utf-8"?>
+<p:sld xmlns:a="http://schemas.openxmlformats.org/drawingml/2006/main" xmlns:r="http://schemas.openxmlformats.org/officeDocument/2006/relationships" xmlns:p="http://schemas.openxmlformats.org/presentationml/2006/main">
+  <p:cSld>
+    <p:spTree>
+      <p:nvGrpSpPr>
+        <p:cNvPr id="1" name=""/>
+        <p:cNvGrpSpPr/>
+        <p:nvPr/>
+      </p:nvGrpSpPr>
+      <p:grpSpPr>
+        <a:xfrm>
+          <a:off x="0" y="0"/>
+          <a:ext cx="0" cy="0"/>
+          <a:chOff x="0" y="0"/>
+          <a:chExt cx="0" cy="0"/>
+        </a:xfrm>
+      </p:grpSpPr>
+      <p:sp>
+        <p:nvSpPr>
+          <p:cNvPr id="2" name="Title 1">
+            <a:extLst>
+              <a:ext uri="{FF2B5EF4-FFF2-40B4-BE49-F238E27FC236}">
+                <a16:creationId xmlns:a16="http://schemas.microsoft.com/office/drawing/2014/main" id="{D8C9D7F1-B9E0-C04B-8DB1-DF4836F77E66}"/>
+              </a:ext>
+            </a:extLst>
+          </p:cNvPr>
+          <p:cNvSpPr>
+            <a:spLocks noGrp="1"/>
+          </p:cNvSpPr>
+          <p:nvPr>
+            <p:ph type="title"/>
+          </p:nvPr>
+        </p:nvSpPr>
+        <p:spPr/>
+        <p:txBody>
+          <a:bodyPr/>
+          <a:lstStyle/>
+          <a:p>
+            <a:r>
+              <a:rPr lang="en-US" dirty="0"/>
+              <a:t>Generating Growth Curves</a:t>
+            </a:r>
+          </a:p>
+        </p:txBody>
+      </p:sp>
+      <p:sp>
+        <p:nvSpPr>
+          <p:cNvPr id="3" name="Content Placeholder 2">
+            <a:extLst>
+              <a:ext uri="{FF2B5EF4-FFF2-40B4-BE49-F238E27FC236}">
+                <a16:creationId xmlns:a16="http://schemas.microsoft.com/office/drawing/2014/main" id="{282425AA-7C7E-4243-AC1F-6889559A72E0}"/>
+              </a:ext>
+            </a:extLst>
+          </p:cNvPr>
+          <p:cNvSpPr>
+            <a:spLocks noGrp="1"/>
+          </p:cNvSpPr>
+          <p:nvPr>
+            <p:ph idx="1"/>
+          </p:nvPr>
+        </p:nvSpPr>
+        <p:spPr/>
+        <p:txBody>
+          <a:bodyPr>
+            <a:normAutofit lnSpcReduction="10000"/>
+          </a:bodyPr>
+          <a:lstStyle/>
+          <a:p>
+            <a:r>
+              <a:rPr lang="en-US" dirty="0"/>
+              <a:t>Profiling is used to generate growth curves</a:t>
+            </a:r>
+          </a:p>
+          <a:p>
+            <a:endParaRPr lang="en-US" dirty="0"/>
+          </a:p>
+          <a:p>
+            <a:endParaRPr lang="en-US" dirty="0"/>
+          </a:p>
+          <a:p>
+            <a:endParaRPr lang="en-US" dirty="0"/>
+          </a:p>
+          <a:p>
+            <a:endParaRPr lang="en-US" dirty="0"/>
+          </a:p>
+          <a:p>
+            <a:endParaRPr lang="en-US" dirty="0"/>
+          </a:p>
+          <a:p>
+            <a:endParaRPr lang="en-US" dirty="0"/>
+          </a:p>
+          <a:p>
+            <a:r>
+              <a:rPr lang="en-US" dirty="0"/>
+              <a:t>Let’s look at 3 sorting algorithms</a:t>
+            </a:r>
+          </a:p>
+          <a:p>
+            <a:pPr lvl="1"/>
+            <a:r>
+              <a:rPr lang="en-US" dirty="0"/>
+              <a:t>python </a:t>
+            </a:r>
+            <a:r>
+              <a:rPr lang="en-US" dirty="0" err="1"/>
+              <a:t>sort.py</a:t>
+            </a:r>
+            <a:endParaRPr lang="en-US" dirty="0"/>
+          </a:p>
+        </p:txBody>
+      </p:sp>
+      <p:pic>
+        <p:nvPicPr>
+          <p:cNvPr id="4" name="Picture 3">
+            <a:extLst>
+              <a:ext uri="{FF2B5EF4-FFF2-40B4-BE49-F238E27FC236}">
+                <a16:creationId xmlns:a16="http://schemas.microsoft.com/office/drawing/2014/main" id="{F6B4BD57-5EA9-4544-8923-6A695547EF4F}"/>
+              </a:ext>
+            </a:extLst>
+          </p:cNvPr>
+          <p:cNvPicPr>
+            <a:picLocks noChangeAspect="1"/>
+          </p:cNvPicPr>
+          <p:nvPr/>
+        </p:nvPicPr>
+        <p:blipFill>
+          <a:blip r:embed="rId2"/>
+          <a:stretch>
+            <a:fillRect/>
+          </a:stretch>
+        </p:blipFill>
+        <p:spPr>
+          <a:xfrm>
+            <a:off x="3004458" y="2340635"/>
+            <a:ext cx="2920141" cy="2525279"/>
+          </a:xfrm>
+          <a:prstGeom prst="rect">
+            <a:avLst/>
+          </a:prstGeom>
+        </p:spPr>
+      </p:pic>
+    </p:spTree>
+    <p:extLst>
+      <p:ext uri="{BB962C8B-B14F-4D97-AF65-F5344CB8AC3E}">
+        <p14:creationId xmlns:p14="http://schemas.microsoft.com/office/powerpoint/2010/main" val="3044496448"/>
+      </p:ext>
+    </p:extLst>
+  </p:cSld>
+  <p:clrMapOvr>
+    <a:masterClrMapping/>
+  </p:clrMapOvr>
+</p:sld>
+</file>
+
+<file path=ppt/slides/slide13.xml><?xml version="1.0" encoding="utf-8"?>
+<p:sld xmlns:a="http://schemas.openxmlformats.org/drawingml/2006/main" xmlns:r="http://schemas.openxmlformats.org/officeDocument/2006/relationships" xmlns:p="http://schemas.openxmlformats.org/presentationml/2006/main">
+  <p:cSld>
+    <p:spTree>
+      <p:nvGrpSpPr>
+        <p:cNvPr id="1" name=""/>
+        <p:cNvGrpSpPr/>
+        <p:nvPr/>
+      </p:nvGrpSpPr>
+      <p:grpSpPr>
+        <a:xfrm>
+          <a:off x="0" y="0"/>
+          <a:ext cx="0" cy="0"/>
+          <a:chOff x="0" y="0"/>
+          <a:chExt cx="0" cy="0"/>
+        </a:xfrm>
+      </p:grpSpPr>
+      <p:sp>
+        <p:nvSpPr>
+          <p:cNvPr id="2" name="Title 1">
+            <a:extLst>
+              <a:ext uri="{FF2B5EF4-FFF2-40B4-BE49-F238E27FC236}">
+                <a16:creationId xmlns:a16="http://schemas.microsoft.com/office/drawing/2014/main" id="{5FD78A33-15E7-4009-995F-02F3FEF2E869}"/>
+              </a:ext>
+            </a:extLst>
+          </p:cNvPr>
+          <p:cNvSpPr>
+            <a:spLocks noGrp="1"/>
+          </p:cNvSpPr>
+          <p:nvPr>
+            <p:ph type="title"/>
+          </p:nvPr>
+        </p:nvSpPr>
+        <p:spPr/>
+        <p:txBody>
+          <a:bodyPr/>
+          <a:lstStyle/>
+          <a:p>
+            <a:r>
+              <a:rPr lang="en-US" dirty="0"/>
+              <a:t>Exercise 3 : RStudio</a:t>
+            </a:r>
+          </a:p>
+        </p:txBody>
+      </p:sp>
+      <p:sp>
+        <p:nvSpPr>
+          <p:cNvPr id="3" name="Content Placeholder 2">
+            <a:extLst>
+              <a:ext uri="{FF2B5EF4-FFF2-40B4-BE49-F238E27FC236}">
+                <a16:creationId xmlns:a16="http://schemas.microsoft.com/office/drawing/2014/main" id="{8B7DDB34-81CC-4A34-9EC4-2E3400B990B8}"/>
+              </a:ext>
+            </a:extLst>
+          </p:cNvPr>
+          <p:cNvSpPr>
+            <a:spLocks noGrp="1"/>
+          </p:cNvSpPr>
+          <p:nvPr>
+            <p:ph idx="1"/>
+          </p:nvPr>
+        </p:nvSpPr>
+        <p:spPr>
+          <a:xfrm>
+            <a:off x="628650" y="1825625"/>
+            <a:ext cx="8022981" cy="4351338"/>
+          </a:xfrm>
+        </p:spPr>
+        <p:txBody>
+          <a:bodyPr>
+            <a:normAutofit/>
+          </a:bodyPr>
+          <a:lstStyle/>
+          <a:p>
+            <a:pPr>
+              <a:lnSpc>
+                <a:spcPct val="150000"/>
+              </a:lnSpc>
+            </a:pPr>
+            <a:r>
+              <a:rPr lang="en-US" dirty="0"/>
+              <a:t>Download the file:</a:t>
+            </a:r>
+          </a:p>
+          <a:p>
+            <a:pPr lvl="1">
+              <a:lnSpc>
+                <a:spcPct val="150000"/>
+              </a:lnSpc>
+            </a:pPr>
+            <a:r>
+              <a:rPr lang="en-US" dirty="0"/>
+              <a:t>Navigate to the </a:t>
+            </a:r>
+            <a:r>
+              <a:rPr lang="en-US" dirty="0" err="1"/>
+              <a:t>R_debug</a:t>
+            </a:r>
+            <a:r>
+              <a:rPr lang="en-US" dirty="0"/>
+              <a:t> folder</a:t>
+            </a:r>
+          </a:p>
+          <a:p>
+            <a:pPr>
+              <a:lnSpc>
+                <a:spcPct val="150000"/>
+              </a:lnSpc>
+            </a:pPr>
+            <a:r>
+              <a:rPr lang="en-US" dirty="0"/>
+              <a:t>Click on the files to open </a:t>
+            </a:r>
+            <a:r>
+              <a:rPr lang="en-US" dirty="0" err="1"/>
+              <a:t>Rstudio</a:t>
+            </a:r>
+            <a:endParaRPr lang="en-US" dirty="0"/>
+          </a:p>
+          <a:p>
+            <a:pPr lvl="1">
+              <a:lnSpc>
+                <a:spcPct val="150000"/>
+              </a:lnSpc>
+            </a:pPr>
+            <a:r>
+              <a:rPr lang="en-US" dirty="0"/>
+              <a:t>Click on Source to run the scripts</a:t>
+            </a:r>
+          </a:p>
+        </p:txBody>
+      </p:sp>
+    </p:spTree>
+    <p:extLst>
+      <p:ext uri="{BB962C8B-B14F-4D97-AF65-F5344CB8AC3E}">
+        <p14:creationId xmlns:p14="http://schemas.microsoft.com/office/powerpoint/2010/main" val="3476906450"/>
+      </p:ext>
+    </p:extLst>
+  </p:cSld>
+  <p:clrMapOvr>
+    <a:masterClrMapping/>
+  </p:clrMapOvr>
+</p:sld>
+</file>
+
+<file path=ppt/slides/slide14.xml><?xml version="1.0" encoding="utf-8"?>
+<p:sld xmlns:a="http://schemas.openxmlformats.org/drawingml/2006/main" xmlns:r="http://schemas.openxmlformats.org/officeDocument/2006/relationships" xmlns:p="http://schemas.openxmlformats.org/presentationml/2006/main" show="0">
+  <p:cSld>
+    <p:spTree>
+      <p:nvGrpSpPr>
+        <p:cNvPr id="1" name=""/>
+        <p:cNvGrpSpPr/>
+        <p:nvPr/>
+      </p:nvGrpSpPr>
+      <p:grpSpPr>
+        <a:xfrm>
+          <a:off x="0" y="0"/>
+          <a:ext cx="0" cy="0"/>
+          <a:chOff x="0" y="0"/>
+          <a:chExt cx="0" cy="0"/>
+        </a:xfrm>
+      </p:grpSpPr>
+      <p:sp>
+        <p:nvSpPr>
+          <p:cNvPr id="2" name="Title 1">
+            <a:extLst>
+              <a:ext uri="{FF2B5EF4-FFF2-40B4-BE49-F238E27FC236}">
+                <a16:creationId xmlns:a16="http://schemas.microsoft.com/office/drawing/2014/main" id="{8B1EB113-6772-47FD-B086-3D873CE8642B}"/>
+              </a:ext>
+            </a:extLst>
+          </p:cNvPr>
+          <p:cNvSpPr>
+            <a:spLocks noGrp="1"/>
+          </p:cNvSpPr>
+          <p:nvPr>
+            <p:ph type="title"/>
+          </p:nvPr>
+        </p:nvSpPr>
+        <p:spPr/>
+        <p:txBody>
+          <a:bodyPr/>
+          <a:lstStyle/>
+          <a:p>
+            <a:r>
+              <a:rPr lang="en-US" dirty="0"/>
+              <a:t>Handling C++</a:t>
+            </a:r>
+          </a:p>
+        </p:txBody>
+      </p:sp>
+      <p:sp>
+        <p:nvSpPr>
+          <p:cNvPr id="3" name="Content Placeholder 2">
+            <a:extLst>
+              <a:ext uri="{FF2B5EF4-FFF2-40B4-BE49-F238E27FC236}">
+                <a16:creationId xmlns:a16="http://schemas.microsoft.com/office/drawing/2014/main" id="{39D54DE9-CBB0-4FEC-AB4C-2C31E7FAC625}"/>
+              </a:ext>
+            </a:extLst>
+          </p:cNvPr>
+          <p:cNvSpPr>
+            <a:spLocks noGrp="1"/>
+          </p:cNvSpPr>
+          <p:nvPr>
+            <p:ph idx="1"/>
+          </p:nvPr>
+        </p:nvSpPr>
+        <p:spPr/>
+        <p:txBody>
+          <a:bodyPr>
+            <a:normAutofit fontScale="92500" lnSpcReduction="10000"/>
+          </a:bodyPr>
+          <a:lstStyle/>
+          <a:p>
+            <a:pPr>
+              <a:lnSpc>
+                <a:spcPct val="150000"/>
+              </a:lnSpc>
+            </a:pPr>
+            <a:r>
+              <a:rPr lang="en-US" dirty="0"/>
+              <a:t>C++ is somewhat different because it is compiled </a:t>
+            </a:r>
+          </a:p>
+          <a:p>
+            <a:pPr>
+              <a:lnSpc>
+                <a:spcPct val="150000"/>
+              </a:lnSpc>
+            </a:pPr>
+            <a:r>
+              <a:rPr lang="en-US" dirty="0"/>
+              <a:t>Some errors are found much earlier </a:t>
+            </a:r>
+          </a:p>
+          <a:p>
+            <a:pPr>
+              <a:lnSpc>
+                <a:spcPct val="150000"/>
+              </a:lnSpc>
+            </a:pPr>
+            <a:r>
+              <a:rPr lang="en-US" dirty="0"/>
+              <a:t>The build process needs to be setup</a:t>
+            </a:r>
+          </a:p>
+          <a:p>
+            <a:pPr lvl="1">
+              <a:lnSpc>
+                <a:spcPct val="150000"/>
+              </a:lnSpc>
+            </a:pPr>
+            <a:r>
+              <a:rPr lang="en-US" dirty="0"/>
+              <a:t>Compiler</a:t>
+            </a:r>
+          </a:p>
+          <a:p>
+            <a:pPr lvl="1">
+              <a:lnSpc>
+                <a:spcPct val="150000"/>
+              </a:lnSpc>
+            </a:pPr>
+            <a:r>
+              <a:rPr lang="en-US" dirty="0"/>
+              <a:t>Compiler options</a:t>
+            </a:r>
+          </a:p>
+          <a:p>
+            <a:pPr lvl="1">
+              <a:lnSpc>
+                <a:spcPct val="150000"/>
+              </a:lnSpc>
+            </a:pPr>
+            <a:r>
+              <a:rPr lang="en-US" dirty="0"/>
+              <a:t>Debug/Release builds</a:t>
+            </a:r>
+          </a:p>
+          <a:p>
+            <a:pPr>
+              <a:lnSpc>
+                <a:spcPct val="150000"/>
+              </a:lnSpc>
+            </a:pPr>
+            <a:r>
+              <a:rPr lang="en-US" dirty="0"/>
+              <a:t>Errors messages can be less obvious </a:t>
+            </a:r>
+          </a:p>
+        </p:txBody>
+      </p:sp>
+    </p:spTree>
+    <p:extLst>
+      <p:ext uri="{BB962C8B-B14F-4D97-AF65-F5344CB8AC3E}">
+        <p14:creationId xmlns:p14="http://schemas.microsoft.com/office/powerpoint/2010/main" val="237925523"/>
+      </p:ext>
+    </p:extLst>
+  </p:cSld>
+  <p:clrMapOvr>
+    <a:masterClrMapping/>
+  </p:clrMapOvr>
+</p:sld>
+</file>
+
+<file path=ppt/slides/slide15.xml><?xml version="1.0" encoding="utf-8"?>
+<p:sld xmlns:a="http://schemas.openxmlformats.org/drawingml/2006/main" xmlns:r="http://schemas.openxmlformats.org/officeDocument/2006/relationships" xmlns:p="http://schemas.openxmlformats.org/presentationml/2006/main" show="0">
+  <p:cSld>
+    <p:spTree>
+      <p:nvGrpSpPr>
+        <p:cNvPr id="1" name=""/>
+        <p:cNvGrpSpPr/>
+        <p:nvPr/>
+      </p:nvGrpSpPr>
+      <p:grpSpPr>
+        <a:xfrm>
+          <a:off x="0" y="0"/>
+          <a:ext cx="0" cy="0"/>
+          <a:chOff x="0" y="0"/>
+          <a:chExt cx="0" cy="0"/>
+        </a:xfrm>
+      </p:grpSpPr>
+      <p:sp>
+        <p:nvSpPr>
+          <p:cNvPr id="2" name="Title 1">
+            <a:extLst>
+              <a:ext uri="{FF2B5EF4-FFF2-40B4-BE49-F238E27FC236}">
+                <a16:creationId xmlns:a16="http://schemas.microsoft.com/office/drawing/2014/main" id="{E12BE167-F6C9-4FD8-AE90-A43FAAA42A07}"/>
+              </a:ext>
+            </a:extLst>
+          </p:cNvPr>
+          <p:cNvSpPr>
+            <a:spLocks noGrp="1"/>
+          </p:cNvSpPr>
+          <p:nvPr>
+            <p:ph type="title"/>
+          </p:nvPr>
+        </p:nvSpPr>
+        <p:spPr/>
+        <p:txBody>
+          <a:bodyPr/>
+          <a:lstStyle/>
+          <a:p>
+            <a:r>
+              <a:rPr lang="en-US" dirty="0"/>
+              <a:t>Exercise 4 : C++ Setup</a:t>
+            </a:r>
+          </a:p>
+        </p:txBody>
+      </p:sp>
+      <p:sp>
+        <p:nvSpPr>
+          <p:cNvPr id="3" name="Content Placeholder 2">
+            <a:extLst>
+              <a:ext uri="{FF2B5EF4-FFF2-40B4-BE49-F238E27FC236}">
+                <a16:creationId xmlns:a16="http://schemas.microsoft.com/office/drawing/2014/main" id="{6D93E6B7-65B4-4005-895B-4CD959210943}"/>
+              </a:ext>
+            </a:extLst>
+          </p:cNvPr>
+          <p:cNvSpPr>
+            <a:spLocks noGrp="1"/>
+          </p:cNvSpPr>
+          <p:nvPr>
+            <p:ph idx="1"/>
+          </p:nvPr>
+        </p:nvSpPr>
+        <p:spPr>
+          <a:xfrm>
+            <a:off x="211015" y="1825625"/>
+            <a:ext cx="8745415" cy="4351338"/>
+          </a:xfrm>
+        </p:spPr>
+        <p:txBody>
+          <a:bodyPr>
+            <a:normAutofit/>
+          </a:bodyPr>
+          <a:lstStyle/>
+          <a:p>
+            <a:pPr>
+              <a:lnSpc>
+                <a:spcPct val="150000"/>
+              </a:lnSpc>
+            </a:pPr>
+            <a:r>
+              <a:rPr lang="en-US" dirty="0"/>
+              <a:t>Log onto Adroit </a:t>
+            </a:r>
+          </a:p>
+          <a:p>
+            <a:pPr lvl="1">
+              <a:lnSpc>
+                <a:spcPct val="150000"/>
+              </a:lnSpc>
+            </a:pPr>
+            <a:r>
+              <a:rPr lang="en-US" dirty="0" err="1">
+                <a:latin typeface="Courier New" panose="02070309020205020404" pitchFamily="49" charset="0"/>
+                <a:cs typeface="Courier New" panose="02070309020205020404" pitchFamily="49" charset="0"/>
+              </a:rPr>
+              <a:t>ssh</a:t>
+            </a:r>
+            <a:r>
+              <a:rPr lang="en-US" dirty="0">
+                <a:latin typeface="Courier New" panose="02070309020205020404" pitchFamily="49" charset="0"/>
+                <a:cs typeface="Courier New" panose="02070309020205020404" pitchFamily="49" charset="0"/>
+              </a:rPr>
+              <a:t> -X adroit.princeton.edu</a:t>
+            </a:r>
+          </a:p>
+          <a:p>
+            <a:pPr>
+              <a:lnSpc>
+                <a:spcPct val="150000"/>
+              </a:lnSpc>
+            </a:pPr>
+            <a:r>
+              <a:rPr lang="en-US" dirty="0"/>
+              <a:t>Download the C++ code</a:t>
+            </a:r>
+          </a:p>
+          <a:p>
+            <a:pPr lvl="1">
+              <a:lnSpc>
+                <a:spcPct val="150000"/>
+              </a:lnSpc>
+            </a:pPr>
+            <a:r>
+              <a:rPr lang="pt-BR" sz="1800" dirty="0">
+                <a:latin typeface="Courier New" panose="02070309020205020404" pitchFamily="49" charset="0"/>
+                <a:cs typeface="Courier New" panose="02070309020205020404" pitchFamily="49" charset="0"/>
+              </a:rPr>
+              <a:t>curl -L -o cpp_debug.zip https://tinyurl.com/y3k73w6y</a:t>
+            </a:r>
+            <a:endParaRPr lang="en-US" sz="1800" dirty="0">
+              <a:latin typeface="Courier New" panose="02070309020205020404" pitchFamily="49" charset="0"/>
+              <a:cs typeface="Courier New" panose="02070309020205020404" pitchFamily="49" charset="0"/>
+            </a:endParaRPr>
+          </a:p>
+          <a:p>
+            <a:pPr lvl="1">
+              <a:lnSpc>
+                <a:spcPct val="150000"/>
+              </a:lnSpc>
+            </a:pPr>
+            <a:r>
+              <a:rPr lang="en-US" dirty="0">
+                <a:latin typeface="Courier New" panose="02070309020205020404" pitchFamily="49" charset="0"/>
+                <a:cs typeface="Courier New" panose="02070309020205020404" pitchFamily="49" charset="0"/>
+              </a:rPr>
+              <a:t>unzip </a:t>
+            </a:r>
+            <a:r>
+              <a:rPr lang="en-US" dirty="0" err="1">
+                <a:latin typeface="Courier New" panose="02070309020205020404" pitchFamily="49" charset="0"/>
+                <a:cs typeface="Courier New" panose="02070309020205020404" pitchFamily="49" charset="0"/>
+              </a:rPr>
+              <a:t>cpp</a:t>
+            </a:r>
+            <a:r>
+              <a:rPr lang="en-US" dirty="0">
+                <a:latin typeface="Courier New" panose="02070309020205020404" pitchFamily="49" charset="0"/>
+                <a:cs typeface="Courier New" panose="02070309020205020404" pitchFamily="49" charset="0"/>
+              </a:rPr>
+              <a:t>_</a:t>
+            </a:r>
+            <a:r>
+              <a:rPr lang="pt-BR" dirty="0">
+                <a:latin typeface="Courier New" panose="02070309020205020404" pitchFamily="49" charset="0"/>
+                <a:cs typeface="Courier New" panose="02070309020205020404" pitchFamily="49" charset="0"/>
+              </a:rPr>
+              <a:t>debug</a:t>
+            </a:r>
+            <a:r>
+              <a:rPr lang="en-US" dirty="0">
+                <a:latin typeface="Courier New" panose="02070309020205020404" pitchFamily="49" charset="0"/>
+                <a:cs typeface="Courier New" panose="02070309020205020404" pitchFamily="49" charset="0"/>
+              </a:rPr>
+              <a:t>.zip </a:t>
+            </a:r>
+          </a:p>
+          <a:p>
+            <a:pPr lvl="1">
+              <a:lnSpc>
+                <a:spcPct val="150000"/>
+              </a:lnSpc>
+            </a:pPr>
+            <a:r>
+              <a:rPr lang="en-US" dirty="0">
+                <a:latin typeface="Courier New" panose="02070309020205020404" pitchFamily="49" charset="0"/>
+                <a:cs typeface="Courier New" panose="02070309020205020404" pitchFamily="49" charset="0"/>
+              </a:rPr>
+              <a:t>cd </a:t>
+            </a:r>
+            <a:r>
+              <a:rPr lang="en-US" dirty="0" err="1">
+                <a:latin typeface="Courier New" panose="02070309020205020404" pitchFamily="49" charset="0"/>
+                <a:cs typeface="Courier New" panose="02070309020205020404" pitchFamily="49" charset="0"/>
+              </a:rPr>
+              <a:t>cpp</a:t>
+            </a:r>
+            <a:r>
+              <a:rPr lang="en-US" dirty="0">
+                <a:latin typeface="Courier New" panose="02070309020205020404" pitchFamily="49" charset="0"/>
+                <a:cs typeface="Courier New" panose="02070309020205020404" pitchFamily="49" charset="0"/>
+              </a:rPr>
+              <a:t>_</a:t>
+            </a:r>
+            <a:r>
+              <a:rPr lang="pt-BR" dirty="0">
+                <a:latin typeface="Courier New" panose="02070309020205020404" pitchFamily="49" charset="0"/>
+                <a:cs typeface="Courier New" panose="02070309020205020404" pitchFamily="49" charset="0"/>
+              </a:rPr>
+              <a:t>debug</a:t>
+            </a:r>
+            <a:endParaRPr lang="en-US" dirty="0">
+              <a:latin typeface="Courier New" panose="02070309020205020404" pitchFamily="49" charset="0"/>
+              <a:cs typeface="Courier New" panose="02070309020205020404" pitchFamily="49" charset="0"/>
+            </a:endParaRPr>
+          </a:p>
+        </p:txBody>
+      </p:sp>
+    </p:spTree>
+    <p:extLst>
+      <p:ext uri="{BB962C8B-B14F-4D97-AF65-F5344CB8AC3E}">
+        <p14:creationId xmlns:p14="http://schemas.microsoft.com/office/powerpoint/2010/main" val="1010424374"/>
+      </p:ext>
+    </p:extLst>
+  </p:cSld>
+  <p:clrMapOvr>
+    <a:masterClrMapping/>
+  </p:clrMapOvr>
+</p:sld>
+</file>
+
+<file path=ppt/slides/slide16.xml><?xml version="1.0" encoding="utf-8"?>
+<p:sld xmlns:a="http://schemas.openxmlformats.org/drawingml/2006/main" xmlns:r="http://schemas.openxmlformats.org/officeDocument/2006/relationships" xmlns:p="http://schemas.openxmlformats.org/presentationml/2006/main" show="0">
+  <p:cSld>
+    <p:spTree>
+      <p:nvGrpSpPr>
+        <p:cNvPr id="1" name=""/>
+        <p:cNvGrpSpPr/>
+        <p:nvPr/>
+      </p:nvGrpSpPr>
+      <p:grpSpPr>
+        <a:xfrm>
+          <a:off x="0" y="0"/>
+          <a:ext cx="0" cy="0"/>
+          <a:chOff x="0" y="0"/>
+          <a:chExt cx="0" cy="0"/>
+        </a:xfrm>
+      </p:grpSpPr>
+      <p:sp>
+        <p:nvSpPr>
+          <p:cNvPr id="2" name="Title 1">
+            <a:extLst>
+              <a:ext uri="{FF2B5EF4-FFF2-40B4-BE49-F238E27FC236}">
                 <a16:creationId xmlns:a16="http://schemas.microsoft.com/office/drawing/2014/main" id="{0A2DA531-92ED-4623-A4B8-90CE8F756834}"/>
               </a:ext>
             </a:extLst>
@@ -3322,7 +4334,7 @@
         </p:spPr>
         <p:txBody>
           <a:bodyPr>
-            <a:normAutofit fontScale="92500" lnSpcReduction="20000"/>
+            <a:normAutofit fontScale="92500"/>
           </a:bodyPr>
           <a:lstStyle/>
           <a:p>
@@ -3366,13 +4378,19 @@
             </a:pPr>
             <a:r>
               <a:rPr lang="en-US" dirty="0"/>
-              <a:t>R </a:t>
-            </a:r>
-            <a:r>
-              <a:rPr lang="en-US"/>
-              <a:t>– RStudio </a:t>
-            </a:r>
-            <a:endParaRPr lang="en-US" dirty="0"/>
+              <a:t>R – RStudio </a:t>
+            </a:r>
+          </a:p>
+          <a:p>
+            <a:pPr>
+              <a:lnSpc>
+                <a:spcPct val="150000"/>
+              </a:lnSpc>
+            </a:pPr>
+            <a:r>
+              <a:rPr lang="en-US" dirty="0"/>
+              <a:t>Debugging typical software errors </a:t>
+            </a:r>
           </a:p>
           <a:p>
             <a:pPr lvl="1">
@@ -3382,7 +4400,7 @@
             </a:pPr>
             <a:r>
               <a:rPr lang="en-US" dirty="0"/>
-              <a:t>C++ – DDT    </a:t>
+              <a:t>Program crashes, Incorrect output</a:t>
             </a:r>
           </a:p>
           <a:p>
@@ -3393,7 +4411,7 @@
             </a:pPr>
             <a:r>
               <a:rPr lang="en-US" dirty="0"/>
-              <a:t>Debugging typical software errors </a:t>
+              <a:t>Profiling </a:t>
             </a:r>
           </a:p>
           <a:p>
@@ -3404,29 +4422,7 @@
             </a:pPr>
             <a:r>
               <a:rPr lang="en-US" dirty="0"/>
-              <a:t>Program crashes </a:t>
-            </a:r>
-          </a:p>
-          <a:p>
-            <a:pPr lvl="1">
-              <a:lnSpc>
-                <a:spcPct val="150000"/>
-              </a:lnSpc>
-            </a:pPr>
-            <a:r>
-              <a:rPr lang="en-US" dirty="0"/>
-              <a:t>Incorrect output</a:t>
-            </a:r>
-          </a:p>
-          <a:p>
-            <a:pPr lvl="1">
-              <a:lnSpc>
-                <a:spcPct val="150000"/>
-              </a:lnSpc>
-            </a:pPr>
-            <a:r>
-              <a:rPr lang="en-US" dirty="0"/>
-              <a:t>Unusual resource utilization (Time, Memory, CPU) </a:t>
+              <a:t>Inefficient resource utilization (Time, Memory, CPU) </a:t>
             </a:r>
           </a:p>
         </p:txBody>
@@ -3605,7 +4601,7 @@
           <p:cNvPr id="2" name="Title 1">
             <a:extLst>
               <a:ext uri="{FF2B5EF4-FFF2-40B4-BE49-F238E27FC236}">
-                <a16:creationId xmlns:a16="http://schemas.microsoft.com/office/drawing/2014/main" id="{105607B3-A023-4E2D-ACA0-F3A2EC054348}"/>
+                <a16:creationId xmlns:a16="http://schemas.microsoft.com/office/drawing/2014/main" id="{46F2E928-CE04-8A4B-BDCA-FA6A9C1DF8BE}"/>
               </a:ext>
             </a:extLst>
           </p:cNvPr>
@@ -3623,7 +4619,7 @@
           <a:p>
             <a:r>
               <a:rPr lang="en-US" dirty="0"/>
-              <a:t>IDEs Help Design and Navigate</a:t>
+              <a:t>Print Statements and Comments</a:t>
             </a:r>
           </a:p>
         </p:txBody>
@@ -3633,7 +4629,7 @@
           <p:cNvPr id="3" name="Content Placeholder 2">
             <a:extLst>
               <a:ext uri="{FF2B5EF4-FFF2-40B4-BE49-F238E27FC236}">
-                <a16:creationId xmlns:a16="http://schemas.microsoft.com/office/drawing/2014/main" id="{88346229-6D85-41E2-BAD1-9DEE9F7753F8}"/>
+                <a16:creationId xmlns:a16="http://schemas.microsoft.com/office/drawing/2014/main" id="{224A2A6E-B2C9-4740-9238-6AD0AA3F8A7F}"/>
               </a:ext>
             </a:extLst>
           </p:cNvPr>
@@ -3647,7 +4643,7 @@
         <p:spPr/>
         <p:txBody>
           <a:bodyPr>
-            <a:normAutofit fontScale="92500" lnSpcReduction="10000"/>
+            <a:normAutofit fontScale="92500" lnSpcReduction="20000"/>
           </a:bodyPr>
           <a:lstStyle/>
           <a:p>
@@ -3658,7 +4654,7 @@
             </a:pPr>
             <a:r>
               <a:rPr lang="en-US" dirty="0"/>
-              <a:t>Help you manage your files</a:t>
+              <a:t>Printing and logging messages are the most basic and useful tool</a:t>
             </a:r>
           </a:p>
           <a:p>
@@ -3669,7 +4665,7 @@
             </a:pPr>
             <a:r>
               <a:rPr lang="en-US" dirty="0"/>
-              <a:t>Separate out modules </a:t>
+              <a:t>Can’t figure out how to setup a debugger</a:t>
             </a:r>
           </a:p>
           <a:p>
@@ -3680,15 +4676,18 @@
             </a:pPr>
             <a:r>
               <a:rPr lang="en-US" dirty="0"/>
-              <a:t>Clearly save </a:t>
-            </a:r>
-            <a:r>
-              <a:rPr lang="en-US" dirty="0" err="1"/>
-              <a:t>src</a:t>
-            </a:r>
-            <a:r>
-              <a:rPr lang="en-US" dirty="0"/>
-              <a:t>, test and metadata files</a:t>
+              <a:t>Parallel execution</a:t>
+            </a:r>
+          </a:p>
+          <a:p>
+            <a:pPr lvl="1">
+              <a:lnSpc>
+                <a:spcPct val="150000"/>
+              </a:lnSpc>
+            </a:pPr>
+            <a:r>
+              <a:rPr lang="en-US" dirty="0"/>
+              <a:t>Help isolate the portion of the code</a:t>
             </a:r>
           </a:p>
           <a:p>
@@ -3699,7 +4698,7 @@
             </a:pPr>
             <a:r>
               <a:rPr lang="en-US" dirty="0"/>
-              <a:t>They help you navigate through your code</a:t>
+              <a:t>Commenting out code</a:t>
             </a:r>
           </a:p>
           <a:p>
@@ -3710,29 +4709,18 @@
             </a:pPr>
             <a:r>
               <a:rPr lang="en-US" dirty="0"/>
-              <a:t>Learn the shortcuts</a:t>
-            </a:r>
-          </a:p>
-          <a:p>
-            <a:pPr>
-              <a:lnSpc>
-                <a:spcPct val="150000"/>
-              </a:lnSpc>
-            </a:pPr>
-            <a:r>
-              <a:rPr lang="en-US" dirty="0"/>
-              <a:t>Help you setup debugging environment </a:t>
-            </a:r>
-          </a:p>
-          <a:p>
-            <a:pPr>
-              <a:lnSpc>
-                <a:spcPct val="150000"/>
-              </a:lnSpc>
-            </a:pPr>
-            <a:r>
-              <a:rPr lang="en-US" dirty="0"/>
-              <a:t>Help you setup build and release processes</a:t>
+              <a:t>Comment out portions of code and see if it runs</a:t>
+            </a:r>
+          </a:p>
+          <a:p>
+            <a:pPr lvl="1">
+              <a:lnSpc>
+                <a:spcPct val="150000"/>
+              </a:lnSpc>
+            </a:pPr>
+            <a:r>
+              <a:rPr lang="en-US" dirty="0"/>
+              <a:t>Again, helps isolate the problem  </a:t>
             </a:r>
           </a:p>
         </p:txBody>
@@ -3740,7 +4728,7 @@
     </p:spTree>
     <p:extLst>
       <p:ext uri="{BB962C8B-B14F-4D97-AF65-F5344CB8AC3E}">
-        <p14:creationId xmlns:p14="http://schemas.microsoft.com/office/powerpoint/2010/main" val="3237551668"/>
+        <p14:creationId xmlns:p14="http://schemas.microsoft.com/office/powerpoint/2010/main" val="4118618577"/>
       </p:ext>
     </p:extLst>
   </p:cSld>
@@ -3772,7 +4760,7 @@
           <p:cNvPr id="2" name="Title 1">
             <a:extLst>
               <a:ext uri="{FF2B5EF4-FFF2-40B4-BE49-F238E27FC236}">
-                <a16:creationId xmlns:a16="http://schemas.microsoft.com/office/drawing/2014/main" id="{A379E64E-A465-4CB2-89C3-BFA874E0AF25}"/>
+                <a16:creationId xmlns:a16="http://schemas.microsoft.com/office/drawing/2014/main" id="{EDDD0CC8-CB5C-3B45-A858-58A60F3DE6C1}"/>
               </a:ext>
             </a:extLst>
           </p:cNvPr>
@@ -3790,7 +4778,15 @@
           <a:p>
             <a:r>
               <a:rPr lang="en-US" dirty="0"/>
-              <a:t>Exercise 1 : PyCharm Setup</a:t>
+              <a:t>PDB – </a:t>
+            </a:r>
+            <a:r>
+              <a:rPr lang="en-US" dirty="0" err="1"/>
+              <a:t>commandline</a:t>
+            </a:r>
+            <a:r>
+              <a:rPr lang="en-US" dirty="0"/>
+              <a:t> debugging </a:t>
             </a:r>
           </a:p>
         </p:txBody>
@@ -3800,7 +4796,7 @@
           <p:cNvPr id="3" name="Content Placeholder 2">
             <a:extLst>
               <a:ext uri="{FF2B5EF4-FFF2-40B4-BE49-F238E27FC236}">
-                <a16:creationId xmlns:a16="http://schemas.microsoft.com/office/drawing/2014/main" id="{7A72F666-C529-471D-BCC3-7CE9B9DE1FB3}"/>
+                <a16:creationId xmlns:a16="http://schemas.microsoft.com/office/drawing/2014/main" id="{F9FB39CA-BB17-564D-8D4D-45C720267876}"/>
               </a:ext>
             </a:extLst>
           </p:cNvPr>
@@ -3811,140 +4807,184 @@
             <p:ph idx="1"/>
           </p:nvPr>
         </p:nvSpPr>
+        <p:spPr/>
+        <p:txBody>
+          <a:bodyPr/>
+          <a:lstStyle/>
+          <a:p>
+            <a:r>
+              <a:rPr lang="en-US" dirty="0"/>
+              <a:t>Program crashes produce a stack trace with line numbers</a:t>
+            </a:r>
+          </a:p>
+          <a:p>
+            <a:pPr marL="0" indent="0">
+              <a:buNone/>
+            </a:pPr>
+            <a:endParaRPr lang="en-US" dirty="0"/>
+          </a:p>
+          <a:p>
+            <a:endParaRPr lang="en-US" dirty="0"/>
+          </a:p>
+          <a:p>
+            <a:endParaRPr lang="en-US" dirty="0"/>
+          </a:p>
+          <a:p>
+            <a:r>
+              <a:rPr lang="en-US" dirty="0"/>
+              <a:t>Python provides a command like debugger too</a:t>
+            </a:r>
+          </a:p>
+          <a:p>
+            <a:pPr lvl="1"/>
+            <a:r>
+              <a:rPr lang="en-US" dirty="0" err="1"/>
+              <a:t>pdbpp</a:t>
+            </a:r>
+            <a:r>
+              <a:rPr lang="en-US" dirty="0"/>
+              <a:t> is a more user-friendly version</a:t>
+            </a:r>
+          </a:p>
+          <a:p>
+            <a:pPr lvl="1"/>
+            <a:endParaRPr lang="en-US" dirty="0"/>
+          </a:p>
+          <a:p>
+            <a:r>
+              <a:rPr lang="en-US" dirty="0"/>
+              <a:t>  Let’s do the first demo!</a:t>
+            </a:r>
+          </a:p>
+        </p:txBody>
+      </p:sp>
+      <p:sp>
+        <p:nvSpPr>
+          <p:cNvPr id="4" name="TextBox 3">
+            <a:extLst>
+              <a:ext uri="{FF2B5EF4-FFF2-40B4-BE49-F238E27FC236}">
+                <a16:creationId xmlns:a16="http://schemas.microsoft.com/office/drawing/2014/main" id="{A7ABB931-E115-EF41-8A64-9B690656B091}"/>
+              </a:ext>
+            </a:extLst>
+          </p:cNvPr>
+          <p:cNvSpPr txBox="1"/>
+          <p:nvPr/>
+        </p:nvSpPr>
         <p:spPr>
           <a:xfrm>
-            <a:off x="628650" y="1535722"/>
-            <a:ext cx="8140212" cy="4957151"/>
+            <a:off x="1066800" y="2830285"/>
+            <a:ext cx="7448550" cy="1477328"/>
           </a:xfrm>
+          <a:prstGeom prst="rect">
+            <a:avLst/>
+          </a:prstGeom>
+          <a:noFill/>
         </p:spPr>
         <p:txBody>
-          <a:bodyPr>
-            <a:normAutofit fontScale="92500" lnSpcReduction="20000"/>
+          <a:bodyPr wrap="square" rtlCol="0">
+            <a:spAutoFit/>
           </a:bodyPr>
           <a:lstStyle/>
           <a:p>
-            <a:pPr>
-              <a:lnSpc>
-                <a:spcPct val="150000"/>
-              </a:lnSpc>
-            </a:pPr>
-            <a:r>
-              <a:rPr lang="en-US" dirty="0"/>
-              <a:t>Download Python Project:</a:t>
-            </a:r>
-          </a:p>
-          <a:p>
-            <a:pPr lvl="1">
-              <a:lnSpc>
-                <a:spcPct val="150000"/>
-              </a:lnSpc>
-            </a:pPr>
-            <a:r>
-              <a:rPr lang="en-US" dirty="0"/>
-              <a:t>Link: </a:t>
-            </a:r>
             <a:r>
               <a:rPr lang="en-US" dirty="0">
-                <a:hlinkClick r:id="rId2"/>
+                <a:latin typeface="Courier" pitchFamily="2" charset="0"/>
               </a:rPr>
-              <a:t>https://tinyurl.com/y5vpaf7b</a:t>
-            </a:r>
-            <a:r>
-              <a:rPr lang="en-US" dirty="0"/>
+              <a:t>Traceback (most recent call last): </a:t>
+            </a:r>
+          </a:p>
+          <a:p>
+            <a:r>
+              <a:rPr lang="en-US" dirty="0">
+                <a:latin typeface="Courier" pitchFamily="2" charset="0"/>
+              </a:rPr>
+              <a:t> File "</a:t>
+            </a:r>
+            <a:r>
+              <a:rPr lang="en-US" dirty="0" err="1">
+                <a:latin typeface="Courier" pitchFamily="2" charset="0"/>
+              </a:rPr>
+              <a:t>no_furniture.py</a:t>
+            </a:r>
+            <a:r>
+              <a:rPr lang="en-US" dirty="0">
+                <a:latin typeface="Courier" pitchFamily="2" charset="0"/>
+              </a:rPr>
+              <a:t>", line 16, in &lt;module&gt; </a:t>
+            </a:r>
+          </a:p>
+          <a:p>
+            <a:r>
+              <a:rPr lang="en-US" dirty="0">
+                <a:latin typeface="Courier" pitchFamily="2" charset="0"/>
+              </a:rPr>
+              <a:t>	for item in </a:t>
+            </a:r>
+            <a:r>
+              <a:rPr lang="en-US" dirty="0" err="1">
+                <a:latin typeface="Courier" pitchFamily="2" charset="0"/>
+              </a:rPr>
+              <a:t>items.sort</a:t>
+            </a:r>
+            <a:r>
+              <a:rPr lang="en-US" dirty="0">
+                <a:latin typeface="Courier" pitchFamily="2" charset="0"/>
+              </a:rPr>
+              <a:t>(): </a:t>
+            </a:r>
+          </a:p>
+          <a:p>
+            <a:r>
+              <a:rPr lang="en-US" dirty="0" err="1">
+                <a:latin typeface="Courier" pitchFamily="2" charset="0"/>
+              </a:rPr>
+              <a:t>TypeError</a:t>
+            </a:r>
+            <a:r>
+              <a:rPr lang="en-US" dirty="0">
+                <a:latin typeface="Courier" pitchFamily="2" charset="0"/>
+              </a:rPr>
+              <a:t>: '</a:t>
+            </a:r>
+            <a:r>
+              <a:rPr lang="en-US" dirty="0" err="1">
+                <a:latin typeface="Courier" pitchFamily="2" charset="0"/>
+              </a:rPr>
+              <a:t>NoneType</a:t>
+            </a:r>
+            <a:r>
+              <a:rPr lang="en-US" dirty="0">
+                <a:latin typeface="Courier" pitchFamily="2" charset="0"/>
+              </a:rPr>
+              <a:t>' object is not </a:t>
+            </a:r>
+            <a:r>
+              <a:rPr lang="en-US" dirty="0" err="1">
+                <a:latin typeface="Courier" pitchFamily="2" charset="0"/>
+              </a:rPr>
+              <a:t>iterable</a:t>
+            </a:r>
+            <a:r>
+              <a:rPr lang="en-US" dirty="0">
+                <a:latin typeface="Courier" pitchFamily="2" charset="0"/>
+              </a:rPr>
               <a:t> </a:t>
             </a:r>
-          </a:p>
-          <a:p>
-            <a:pPr lvl="1">
-              <a:lnSpc>
-                <a:spcPct val="150000"/>
-              </a:lnSpc>
-            </a:pPr>
-            <a:r>
-              <a:rPr lang="en-US" dirty="0"/>
-              <a:t>Download and extract the project directory</a:t>
-            </a:r>
-          </a:p>
-          <a:p>
-            <a:pPr>
-              <a:lnSpc>
-                <a:spcPct val="150000"/>
-              </a:lnSpc>
-            </a:pPr>
-            <a:r>
-              <a:rPr lang="en-US" dirty="0"/>
-              <a:t>Start Anaconda Navigator and launch PyCharm</a:t>
-            </a:r>
-          </a:p>
-          <a:p>
-            <a:pPr lvl="1">
-              <a:lnSpc>
-                <a:spcPct val="150000"/>
-              </a:lnSpc>
-            </a:pPr>
-            <a:r>
-              <a:rPr lang="en-US" dirty="0"/>
-              <a:t>Go to File &gt; New Project</a:t>
-            </a:r>
-          </a:p>
-          <a:p>
-            <a:pPr lvl="1">
-              <a:lnSpc>
-                <a:spcPct val="150000"/>
-              </a:lnSpc>
-            </a:pPr>
-            <a:r>
-              <a:rPr lang="en-US" dirty="0"/>
-              <a:t>Navigate to the “</a:t>
-            </a:r>
-            <a:r>
-              <a:rPr lang="en-US" dirty="0" err="1"/>
-              <a:t>python_debug</a:t>
-            </a:r>
-            <a:r>
-              <a:rPr lang="en-US" dirty="0"/>
-              <a:t>” project directory</a:t>
-            </a:r>
-          </a:p>
-          <a:p>
-            <a:pPr lvl="1">
-              <a:lnSpc>
-                <a:spcPct val="150000"/>
-              </a:lnSpc>
-            </a:pPr>
-            <a:r>
-              <a:rPr lang="en-US" b="1" dirty="0"/>
-              <a:t>Create project using existing files</a:t>
-            </a:r>
-          </a:p>
-          <a:p>
-            <a:pPr>
-              <a:lnSpc>
-                <a:spcPct val="150000"/>
-              </a:lnSpc>
-            </a:pPr>
-            <a:r>
-              <a:rPr lang="en-US" dirty="0"/>
-              <a:t>Understand project structure</a:t>
-            </a:r>
-          </a:p>
-          <a:p>
-            <a:pPr lvl="1">
-              <a:lnSpc>
-                <a:spcPct val="150000"/>
-              </a:lnSpc>
-            </a:pPr>
-            <a:r>
-              <a:rPr lang="en-US" dirty="0"/>
-              <a:t>Set source root</a:t>
-            </a:r>
+            <a:br>
+              <a:rPr lang="en-US" dirty="0">
+                <a:latin typeface="Courier" pitchFamily="2" charset="0"/>
+              </a:rPr>
+            </a:br>
+            <a:endParaRPr lang="en-US" dirty="0">
+              <a:latin typeface="Courier" pitchFamily="2" charset="0"/>
+            </a:endParaRPr>
           </a:p>
         </p:txBody>
       </p:sp>
     </p:spTree>
     <p:extLst>
       <p:ext uri="{BB962C8B-B14F-4D97-AF65-F5344CB8AC3E}">
-        <p14:creationId xmlns:p14="http://schemas.microsoft.com/office/powerpoint/2010/main" val="3287837250"/>
+        <p14:creationId xmlns:p14="http://schemas.microsoft.com/office/powerpoint/2010/main" val="1702313866"/>
       </p:ext>
     </p:extLst>
   </p:cSld>
@@ -3976,7 +5016,7 @@
           <p:cNvPr id="2" name="Title 1">
             <a:extLst>
               <a:ext uri="{FF2B5EF4-FFF2-40B4-BE49-F238E27FC236}">
-                <a16:creationId xmlns:a16="http://schemas.microsoft.com/office/drawing/2014/main" id="{2A487E68-2AB4-4828-8937-3390A9A6FDD5}"/>
+                <a16:creationId xmlns:a16="http://schemas.microsoft.com/office/drawing/2014/main" id="{839BCD76-31EE-874C-81B9-A945EFE816BB}"/>
               </a:ext>
             </a:extLst>
           </p:cNvPr>
@@ -3989,12 +5029,14 @@
         </p:nvSpPr>
         <p:spPr/>
         <p:txBody>
-          <a:bodyPr/>
-          <a:lstStyle/>
-          <a:p>
-            <a:r>
-              <a:rPr lang="en-US" dirty="0"/>
-              <a:t>Exercise 2 : Fix Tests</a:t>
+          <a:bodyPr>
+            <a:normAutofit/>
+          </a:bodyPr>
+          <a:lstStyle/>
+          <a:p>
+            <a:r>
+              <a:rPr lang="en-US" sz="4000" dirty="0"/>
+              <a:t>Breakpoints, Watches and Evaluation </a:t>
             </a:r>
           </a:p>
         </p:txBody>
@@ -4004,7 +5046,7 @@
           <p:cNvPr id="3" name="Content Placeholder 2">
             <a:extLst>
               <a:ext uri="{FF2B5EF4-FFF2-40B4-BE49-F238E27FC236}">
-                <a16:creationId xmlns:a16="http://schemas.microsoft.com/office/drawing/2014/main" id="{72CEC002-3008-4DC4-A0AF-E385D1339B6B}"/>
+                <a16:creationId xmlns:a16="http://schemas.microsoft.com/office/drawing/2014/main" id="{7A823D54-C8A7-3843-94F4-D018703F7316}"/>
               </a:ext>
             </a:extLst>
           </p:cNvPr>
@@ -4015,69 +5057,60 @@
             <p:ph idx="1"/>
           </p:nvPr>
         </p:nvSpPr>
-        <p:spPr>
-          <a:xfrm>
-            <a:off x="628650" y="2728302"/>
-            <a:ext cx="7886700" cy="2183668"/>
-          </a:xfrm>
-        </p:spPr>
-        <p:txBody>
-          <a:bodyPr/>
-          <a:lstStyle/>
-          <a:p>
-            <a:r>
-              <a:rPr lang="en-US" dirty="0"/>
-              <a:t>Fix the failing test cases…</a:t>
-            </a:r>
-          </a:p>
-          <a:p>
-            <a:r>
-              <a:rPr lang="en-US" dirty="0"/>
-              <a:t>Useful links</a:t>
+        <p:spPr/>
+        <p:txBody>
+          <a:bodyPr/>
+          <a:lstStyle/>
+          <a:p>
+            <a:r>
+              <a:rPr lang="en-US" dirty="0"/>
+              <a:t>Breakpoints allow you to halt the flow of execution </a:t>
             </a:r>
           </a:p>
           <a:p>
             <a:pPr lvl="1"/>
             <a:r>
-              <a:rPr lang="en-US" dirty="0">
-                <a:hlinkClick r:id="rId2"/>
-              </a:rPr>
-              <a:t>https://byjus.com/maths/area-of-shapes</a:t>
-            </a:r>
+              <a:rPr lang="en-US" dirty="0"/>
+              <a:t>Stop a few lines before the error</a:t>
+            </a:r>
+          </a:p>
+          <a:p>
+            <a:pPr lvl="1"/>
+            <a:r>
+              <a:rPr lang="en-US" dirty="0"/>
+              <a:t>The error in most cases happens before the line that triggers it</a:t>
+            </a:r>
+          </a:p>
+          <a:p>
+            <a:pPr marL="457200" lvl="1" indent="0">
+              <a:buNone/>
+            </a:pPr>
             <a:endParaRPr lang="en-US" dirty="0"/>
           </a:p>
           <a:p>
-            <a:pPr lvl="1"/>
-            <a:r>
-              <a:rPr lang="en-US" dirty="0">
-                <a:hlinkClick r:id="rId3"/>
-              </a:rPr>
-              <a:t>https://byjus.com/volume-formulas</a:t>
-            </a:r>
+            <a:r>
+              <a:rPr lang="en-US" dirty="0"/>
+              <a:t>Watches allow you to look at the values of the variables</a:t>
+            </a:r>
+          </a:p>
+          <a:p>
+            <a:pPr marL="0" indent="0">
+              <a:buNone/>
+            </a:pPr>
             <a:endParaRPr lang="en-US" dirty="0"/>
           </a:p>
           <a:p>
-            <a:pPr lvl="1"/>
-            <a:r>
-              <a:rPr lang="en-US" dirty="0">
-                <a:hlinkClick r:id="rId4"/>
-              </a:rPr>
-              <a:t>https://byjus.com/surface-area-formulas</a:t>
-            </a:r>
-            <a:r>
-              <a:rPr lang="en-US" dirty="0"/>
-              <a:t> </a:t>
-            </a:r>
-          </a:p>
-          <a:p>
-            <a:endParaRPr lang="en-US" dirty="0"/>
+            <a:r>
+              <a:rPr lang="en-US" dirty="0"/>
+              <a:t>Evaluate allows you to insert and run new code to check things </a:t>
+            </a:r>
           </a:p>
         </p:txBody>
       </p:sp>
     </p:spTree>
     <p:extLst>
       <p:ext uri="{BB962C8B-B14F-4D97-AF65-F5344CB8AC3E}">
-        <p14:creationId xmlns:p14="http://schemas.microsoft.com/office/powerpoint/2010/main" val="1044877323"/>
+        <p14:creationId xmlns:p14="http://schemas.microsoft.com/office/powerpoint/2010/main" val="3994764207"/>
       </p:ext>
     </p:extLst>
   </p:cSld>
@@ -4109,7 +5142,7 @@
           <p:cNvPr id="2" name="Title 1">
             <a:extLst>
               <a:ext uri="{FF2B5EF4-FFF2-40B4-BE49-F238E27FC236}">
-                <a16:creationId xmlns:a16="http://schemas.microsoft.com/office/drawing/2014/main" id="{5FD78A33-15E7-4009-995F-02F3FEF2E869}"/>
+                <a16:creationId xmlns:a16="http://schemas.microsoft.com/office/drawing/2014/main" id="{105607B3-A023-4E2D-ACA0-F3A2EC054348}"/>
               </a:ext>
             </a:extLst>
           </p:cNvPr>
@@ -4127,7 +5160,7 @@
           <a:p>
             <a:r>
               <a:rPr lang="en-US" dirty="0"/>
-              <a:t>Exercise 3 : RStudio</a:t>
+              <a:t>IDEs Help Design and Navigate</a:t>
             </a:r>
           </a:p>
         </p:txBody>
@@ -4137,7 +5170,7 @@
           <p:cNvPr id="3" name="Content Placeholder 2">
             <a:extLst>
               <a:ext uri="{FF2B5EF4-FFF2-40B4-BE49-F238E27FC236}">
-                <a16:creationId xmlns:a16="http://schemas.microsoft.com/office/drawing/2014/main" id="{8B7DDB34-81CC-4A34-9EC4-2E3400B990B8}"/>
+                <a16:creationId xmlns:a16="http://schemas.microsoft.com/office/drawing/2014/main" id="{88346229-6D85-41E2-BAD1-9DEE9F7753F8}"/>
               </a:ext>
             </a:extLst>
           </p:cNvPr>
@@ -4148,15 +5181,10 @@
             <p:ph idx="1"/>
           </p:nvPr>
         </p:nvSpPr>
-        <p:spPr>
-          <a:xfrm>
-            <a:off x="628650" y="1825625"/>
-            <a:ext cx="8022981" cy="4351338"/>
-          </a:xfrm>
-        </p:spPr>
+        <p:spPr/>
         <p:txBody>
           <a:bodyPr>
-            <a:normAutofit/>
+            <a:normAutofit fontScale="92500" lnSpcReduction="10000"/>
           </a:bodyPr>
           <a:lstStyle/>
           <a:p>
@@ -4167,7 +5195,7 @@
             </a:pPr>
             <a:r>
               <a:rPr lang="en-US" dirty="0"/>
-              <a:t>Download the file:</a:t>
+              <a:t>Help you manage your files</a:t>
             </a:r>
           </a:p>
           <a:p>
@@ -4178,17 +5206,7 @@
             </a:pPr>
             <a:r>
               <a:rPr lang="en-US" dirty="0"/>
-              <a:t>Link: </a:t>
-            </a:r>
-            <a:r>
-              <a:rPr lang="en-US" dirty="0">
-                <a:hlinkClick r:id="rId2"/>
-              </a:rPr>
-              <a:t>https://tinyurl.com/y563bgo7</a:t>
-            </a:r>
-            <a:r>
-              <a:rPr lang="en-US" dirty="0"/>
-              <a:t> </a:t>
+              <a:t>Separate out modules </a:t>
             </a:r>
           </a:p>
           <a:p>
@@ -4199,15 +5217,15 @@
             </a:pPr>
             <a:r>
               <a:rPr lang="en-US" dirty="0"/>
-              <a:t>Download and extract the scripts and navigate to the </a:t>
+              <a:t>Clearly save </a:t>
             </a:r>
             <a:r>
               <a:rPr lang="en-US" dirty="0" err="1"/>
-              <a:t>R_debug</a:t>
-            </a:r>
-            <a:r>
-              <a:rPr lang="en-US" dirty="0"/>
-              <a:t> folder</a:t>
+              <a:t>src</a:t>
+            </a:r>
+            <a:r>
+              <a:rPr lang="en-US" dirty="0"/>
+              <a:t>, test and metadata files</a:t>
             </a:r>
           </a:p>
           <a:p>
@@ -4218,13 +5236,8 @@
             </a:pPr>
             <a:r>
               <a:rPr lang="en-US" dirty="0"/>
-              <a:t>Click on the files to open </a:t>
-            </a:r>
-            <a:r>
-              <a:rPr lang="en-US" dirty="0" err="1"/>
-              <a:t>Rstudio</a:t>
-            </a:r>
-            <a:endParaRPr lang="en-US" dirty="0"/>
+              <a:t>They help you navigate through your code</a:t>
+            </a:r>
           </a:p>
           <a:p>
             <a:pPr lvl="1">
@@ -4234,7 +5247,29 @@
             </a:pPr>
             <a:r>
               <a:rPr lang="en-US" dirty="0"/>
-              <a:t>Click on Source to run the scripts</a:t>
+              <a:t>Learn the shortcuts</a:t>
+            </a:r>
+          </a:p>
+          <a:p>
+            <a:pPr>
+              <a:lnSpc>
+                <a:spcPct val="150000"/>
+              </a:lnSpc>
+            </a:pPr>
+            <a:r>
+              <a:rPr lang="en-US" dirty="0"/>
+              <a:t>Help you setup debugging environment </a:t>
+            </a:r>
+          </a:p>
+          <a:p>
+            <a:pPr>
+              <a:lnSpc>
+                <a:spcPct val="150000"/>
+              </a:lnSpc>
+            </a:pPr>
+            <a:r>
+              <a:rPr lang="en-US" dirty="0"/>
+              <a:t>Help you setup build and release processes</a:t>
             </a:r>
           </a:p>
         </p:txBody>
@@ -4242,7 +5277,7 @@
     </p:spTree>
     <p:extLst>
       <p:ext uri="{BB962C8B-B14F-4D97-AF65-F5344CB8AC3E}">
-        <p14:creationId xmlns:p14="http://schemas.microsoft.com/office/powerpoint/2010/main" val="3476906450"/>
+        <p14:creationId xmlns:p14="http://schemas.microsoft.com/office/powerpoint/2010/main" val="3237551668"/>
       </p:ext>
     </p:extLst>
   </p:cSld>
@@ -4274,7 +5309,7 @@
           <p:cNvPr id="2" name="Title 1">
             <a:extLst>
               <a:ext uri="{FF2B5EF4-FFF2-40B4-BE49-F238E27FC236}">
-                <a16:creationId xmlns:a16="http://schemas.microsoft.com/office/drawing/2014/main" id="{8B1EB113-6772-47FD-B086-3D873CE8642B}"/>
+                <a16:creationId xmlns:a16="http://schemas.microsoft.com/office/drawing/2014/main" id="{A379E64E-A465-4CB2-89C3-BFA874E0AF25}"/>
               </a:ext>
             </a:extLst>
           </p:cNvPr>
@@ -4292,7 +5327,7 @@
           <a:p>
             <a:r>
               <a:rPr lang="en-US" dirty="0"/>
-              <a:t>Handling C++</a:t>
+              <a:t>Exercise 1 : PyCharm Setup</a:t>
             </a:r>
           </a:p>
         </p:txBody>
@@ -4302,7 +5337,7 @@
           <p:cNvPr id="3" name="Content Placeholder 2">
             <a:extLst>
               <a:ext uri="{FF2B5EF4-FFF2-40B4-BE49-F238E27FC236}">
-                <a16:creationId xmlns:a16="http://schemas.microsoft.com/office/drawing/2014/main" id="{39D54DE9-CBB0-4FEC-AB4C-2C31E7FAC625}"/>
+                <a16:creationId xmlns:a16="http://schemas.microsoft.com/office/drawing/2014/main" id="{7A72F666-C529-471D-BCC3-7CE9B9DE1FB3}"/>
               </a:ext>
             </a:extLst>
           </p:cNvPr>
@@ -4313,10 +5348,15 @@
             <p:ph idx="1"/>
           </p:nvPr>
         </p:nvSpPr>
-        <p:spPr/>
+        <p:spPr>
+          <a:xfrm>
+            <a:off x="628650" y="1535722"/>
+            <a:ext cx="8140212" cy="4957151"/>
+          </a:xfrm>
+        </p:spPr>
         <p:txBody>
           <a:bodyPr>
-            <a:normAutofit fontScale="92500" lnSpcReduction="10000"/>
+            <a:normAutofit fontScale="92500" lnSpcReduction="20000"/>
           </a:bodyPr>
           <a:lstStyle/>
           <a:p>
@@ -4327,7 +5367,39 @@
             </a:pPr>
             <a:r>
               <a:rPr lang="en-US" dirty="0"/>
-              <a:t>C++ is somewhat different because it is compiled </a:t>
+              <a:t>Download Python Project:</a:t>
+            </a:r>
+          </a:p>
+          <a:p>
+            <a:pPr lvl="1">
+              <a:lnSpc>
+                <a:spcPct val="150000"/>
+              </a:lnSpc>
+            </a:pPr>
+            <a:r>
+              <a:rPr lang="en-US" dirty="0"/>
+              <a:t>Link: </a:t>
+            </a:r>
+            <a:r>
+              <a:rPr lang="en-US" dirty="0">
+                <a:hlinkClick r:id="rId2"/>
+              </a:rPr>
+              <a:t>https://tinyurl.com/5fc4byb6</a:t>
+            </a:r>
+            <a:r>
+              <a:rPr lang="en-US" dirty="0"/>
+              <a:t>  </a:t>
+            </a:r>
+          </a:p>
+          <a:p>
+            <a:pPr lvl="1">
+              <a:lnSpc>
+                <a:spcPct val="150000"/>
+              </a:lnSpc>
+            </a:pPr>
+            <a:r>
+              <a:rPr lang="en-US" dirty="0"/>
+              <a:t>Download and extract the project directory</a:t>
             </a:r>
           </a:p>
           <a:p>
@@ -4338,7 +5410,48 @@
             </a:pPr>
             <a:r>
               <a:rPr lang="en-US" dirty="0"/>
-              <a:t>Some errors are found much earlier </a:t>
+              <a:t>Start Anaconda Navigator and launch PyCharm</a:t>
+            </a:r>
+          </a:p>
+          <a:p>
+            <a:pPr lvl="1">
+              <a:lnSpc>
+                <a:spcPct val="150000"/>
+              </a:lnSpc>
+            </a:pPr>
+            <a:r>
+              <a:rPr lang="en-US" dirty="0"/>
+              <a:t>Go to File &gt; New Project</a:t>
+            </a:r>
+          </a:p>
+          <a:p>
+            <a:pPr lvl="1">
+              <a:lnSpc>
+                <a:spcPct val="150000"/>
+              </a:lnSpc>
+            </a:pPr>
+            <a:r>
+              <a:rPr lang="en-US" dirty="0"/>
+              <a:t>Navigate to the “</a:t>
+            </a:r>
+            <a:r>
+              <a:rPr lang="en-US" dirty="0" err="1"/>
+              <a:t>python_debug</a:t>
+            </a:r>
+            <a:r>
+              <a:rPr lang="en-US" dirty="0"/>
+              <a:t>” project directory</a:t>
+            </a:r>
+          </a:p>
+          <a:p>
+            <a:pPr lvl="1">
+              <a:lnSpc>
+                <a:spcPct val="150000"/>
+              </a:lnSpc>
+            </a:pPr>
+            <a:r>
+              <a:rPr lang="en-US" b="1" dirty="0"/>
+              <a:t>Create project using existing files</a:t>
             </a:r>
           </a:p>
           <a:p>
@@ -4349,7 +5462,7 @@
             </a:pPr>
             <a:r>
               <a:rPr lang="en-US" dirty="0"/>
-              <a:t>The build process needs to be setup</a:t>
+              <a:t>Understand project structure</a:t>
             </a:r>
           </a:p>
           <a:p>
@@ -4360,40 +5473,15 @@
             </a:pPr>
             <a:r>
               <a:rPr lang="en-US" dirty="0"/>
-              <a:t>Compiler</a:t>
-            </a:r>
-          </a:p>
-          <a:p>
-            <a:pPr lvl="1">
-              <a:lnSpc>
-                <a:spcPct val="150000"/>
-              </a:lnSpc>
-            </a:pPr>
-            <a:r>
-              <a:rPr lang="en-US" dirty="0"/>
-              <a:t>Compiler options</a:t>
-            </a:r>
-          </a:p>
-          <a:p>
-            <a:pPr lvl="1">
-              <a:lnSpc>
-                <a:spcPct val="150000"/>
-              </a:lnSpc>
-            </a:pPr>
-            <a:r>
-              <a:rPr lang="en-US" dirty="0"/>
-              <a:t>Debug/Release builds</a:t>
-            </a:r>
-          </a:p>
-          <a:p>
-            <a:pPr>
-              <a:lnSpc>
-                <a:spcPct val="150000"/>
-              </a:lnSpc>
-            </a:pPr>
-            <a:r>
-              <a:rPr lang="en-US" dirty="0"/>
-              <a:t>Errors messages can be less obvious </a:t>
+              <a:t>Set source root as the “</a:t>
+            </a:r>
+            <a:r>
+              <a:rPr lang="en-US" dirty="0" err="1"/>
+              <a:t>src</a:t>
+            </a:r>
+            <a:r>
+              <a:rPr lang="en-US" dirty="0"/>
+              <a:t>” directory (right click option)</a:t>
             </a:r>
           </a:p>
         </p:txBody>
@@ -4401,7 +5489,7 @@
     </p:spTree>
     <p:extLst>
       <p:ext uri="{BB962C8B-B14F-4D97-AF65-F5344CB8AC3E}">
-        <p14:creationId xmlns:p14="http://schemas.microsoft.com/office/powerpoint/2010/main" val="237925523"/>
+        <p14:creationId xmlns:p14="http://schemas.microsoft.com/office/powerpoint/2010/main" val="3287837250"/>
       </p:ext>
     </p:extLst>
   </p:cSld>
@@ -4433,7 +5521,7 @@
           <p:cNvPr id="2" name="Title 1">
             <a:extLst>
               <a:ext uri="{FF2B5EF4-FFF2-40B4-BE49-F238E27FC236}">
-                <a16:creationId xmlns:a16="http://schemas.microsoft.com/office/drawing/2014/main" id="{E12BE167-F6C9-4FD8-AE90-A43FAAA42A07}"/>
+                <a16:creationId xmlns:a16="http://schemas.microsoft.com/office/drawing/2014/main" id="{2A487E68-2AB4-4828-8937-3390A9A6FDD5}"/>
               </a:ext>
             </a:extLst>
           </p:cNvPr>
@@ -4451,7 +5539,7 @@
           <a:p>
             <a:r>
               <a:rPr lang="en-US" dirty="0"/>
-              <a:t>Exercise 4 : C++ Setup</a:t>
+              <a:t>Exercise 2 : Fix The Tests!</a:t>
             </a:r>
           </a:p>
         </p:txBody>
@@ -4461,7 +5549,7 @@
           <p:cNvPr id="3" name="Content Placeholder 2">
             <a:extLst>
               <a:ext uri="{FF2B5EF4-FFF2-40B4-BE49-F238E27FC236}">
-                <a16:creationId xmlns:a16="http://schemas.microsoft.com/office/drawing/2014/main" id="{6D93E6B7-65B4-4005-895B-4CD959210943}"/>
+                <a16:creationId xmlns:a16="http://schemas.microsoft.com/office/drawing/2014/main" id="{72CEC002-3008-4DC4-A0AF-E385D1339B6B}"/>
               </a:ext>
             </a:extLst>
           </p:cNvPr>
@@ -4474,163 +5562,67 @@
         </p:nvSpPr>
         <p:spPr>
           <a:xfrm>
-            <a:off x="211015" y="1825625"/>
-            <a:ext cx="8745415" cy="4351338"/>
+            <a:off x="628650" y="2728302"/>
+            <a:ext cx="7886700" cy="2183668"/>
           </a:xfrm>
         </p:spPr>
         <p:txBody>
-          <a:bodyPr>
-            <a:normAutofit/>
-          </a:bodyPr>
-          <a:lstStyle/>
-          <a:p>
-            <a:pPr>
-              <a:lnSpc>
-                <a:spcPct val="150000"/>
-              </a:lnSpc>
-            </a:pPr>
-            <a:r>
-              <a:rPr lang="en-US" dirty="0"/>
-              <a:t>Log onto Adroit </a:t>
-            </a:r>
-          </a:p>
-          <a:p>
-            <a:pPr lvl="1">
-              <a:lnSpc>
-                <a:spcPct val="150000"/>
-              </a:lnSpc>
-            </a:pPr>
-            <a:r>
-              <a:rPr lang="en-US" dirty="0" err="1">
-                <a:latin typeface="Courier New" panose="02070309020205020404" pitchFamily="49" charset="0"/>
-                <a:cs typeface="Courier New" panose="02070309020205020404" pitchFamily="49" charset="0"/>
+          <a:bodyPr/>
+          <a:lstStyle/>
+          <a:p>
+            <a:r>
+              <a:rPr lang="en-US" dirty="0"/>
+              <a:t>Fix the failing test cases…</a:t>
+            </a:r>
+          </a:p>
+          <a:p>
+            <a:r>
+              <a:rPr lang="en-US" dirty="0"/>
+              <a:t>Useful links</a:t>
+            </a:r>
+          </a:p>
+          <a:p>
+            <a:pPr lvl="1"/>
+            <a:r>
+              <a:rPr lang="en-US" dirty="0">
+                <a:hlinkClick r:id="rId2"/>
               </a:rPr>
-              <a:t>ssh</a:t>
-            </a:r>
+              <a:t>https://byjus.com/maths/area-of-shapes</a:t>
+            </a:r>
+            <a:endParaRPr lang="en-US" dirty="0"/>
+          </a:p>
+          <a:p>
+            <a:pPr lvl="1"/>
             <a:r>
               <a:rPr lang="en-US" dirty="0">
-                <a:latin typeface="Courier New" panose="02070309020205020404" pitchFamily="49" charset="0"/>
-                <a:cs typeface="Courier New" panose="02070309020205020404" pitchFamily="49" charset="0"/>
+                <a:hlinkClick r:id="rId3"/>
               </a:rPr>
-              <a:t> -X adroit.princeton.edu</a:t>
-            </a:r>
-          </a:p>
-          <a:p>
-            <a:pPr>
-              <a:lnSpc>
-                <a:spcPct val="150000"/>
-              </a:lnSpc>
-            </a:pPr>
-            <a:r>
-              <a:rPr lang="en-US" dirty="0"/>
-              <a:t>Download the C++ code</a:t>
-            </a:r>
-          </a:p>
-          <a:p>
-            <a:pPr lvl="1">
-              <a:lnSpc>
-                <a:spcPct val="150000"/>
-              </a:lnSpc>
-            </a:pPr>
-            <a:r>
-              <a:rPr lang="pt-BR" sz="1800" dirty="0">
-                <a:latin typeface="Courier New" panose="02070309020205020404" pitchFamily="49" charset="0"/>
-                <a:cs typeface="Courier New" panose="02070309020205020404" pitchFamily="49" charset="0"/>
+              <a:t>https://byjus.com/volume-formulas</a:t>
+            </a:r>
+            <a:endParaRPr lang="en-US" dirty="0"/>
+          </a:p>
+          <a:p>
+            <a:pPr lvl="1"/>
+            <a:r>
+              <a:rPr lang="en-US" dirty="0">
+                <a:hlinkClick r:id="rId4"/>
               </a:rPr>
-              <a:t>curl -L -o cpp_debug.zip https://tinyurl.com/y3k73w6y</a:t>
-            </a:r>
-            <a:endParaRPr lang="en-US" sz="1800" dirty="0">
-              <a:latin typeface="Courier New" panose="02070309020205020404" pitchFamily="49" charset="0"/>
-              <a:cs typeface="Courier New" panose="02070309020205020404" pitchFamily="49" charset="0"/>
-            </a:endParaRPr>
-          </a:p>
-          <a:p>
-            <a:pPr lvl="1">
-              <a:lnSpc>
-                <a:spcPct val="150000"/>
-              </a:lnSpc>
-            </a:pPr>
-            <a:r>
-              <a:rPr lang="en-US" dirty="0">
-                <a:latin typeface="Courier New" panose="02070309020205020404" pitchFamily="49" charset="0"/>
-                <a:cs typeface="Courier New" panose="02070309020205020404" pitchFamily="49" charset="0"/>
-              </a:rPr>
-              <a:t>unzip </a:t>
-            </a:r>
-            <a:r>
-              <a:rPr lang="en-US" dirty="0" err="1">
-                <a:latin typeface="Courier New" panose="02070309020205020404" pitchFamily="49" charset="0"/>
-                <a:cs typeface="Courier New" panose="02070309020205020404" pitchFamily="49" charset="0"/>
-              </a:rPr>
-              <a:t>cpp</a:t>
-            </a:r>
-            <a:r>
-              <a:rPr lang="en-US" dirty="0">
-                <a:latin typeface="Courier New" panose="02070309020205020404" pitchFamily="49" charset="0"/>
-                <a:cs typeface="Courier New" panose="02070309020205020404" pitchFamily="49" charset="0"/>
-              </a:rPr>
-              <a:t>_</a:t>
-            </a:r>
-            <a:r>
-              <a:rPr lang="pt-BR" dirty="0">
-                <a:latin typeface="Courier New" panose="02070309020205020404" pitchFamily="49" charset="0"/>
-                <a:cs typeface="Courier New" panose="02070309020205020404" pitchFamily="49" charset="0"/>
-              </a:rPr>
-              <a:t>debug</a:t>
-            </a:r>
-            <a:r>
-              <a:rPr lang="en-US" dirty="0">
-                <a:latin typeface="Courier New" panose="02070309020205020404" pitchFamily="49" charset="0"/>
-                <a:cs typeface="Courier New" panose="02070309020205020404" pitchFamily="49" charset="0"/>
-              </a:rPr>
-              <a:t>.zip </a:t>
-            </a:r>
-          </a:p>
-          <a:p>
-            <a:pPr lvl="1">
-              <a:lnSpc>
-                <a:spcPct val="150000"/>
-              </a:lnSpc>
-            </a:pPr>
-            <a:r>
-              <a:rPr lang="en-US" dirty="0">
-                <a:latin typeface="Courier New" panose="02070309020205020404" pitchFamily="49" charset="0"/>
-                <a:cs typeface="Courier New" panose="02070309020205020404" pitchFamily="49" charset="0"/>
-              </a:rPr>
-              <a:t>cd </a:t>
-            </a:r>
-            <a:r>
-              <a:rPr lang="en-US" dirty="0" err="1">
-                <a:latin typeface="Courier New" panose="02070309020205020404" pitchFamily="49" charset="0"/>
-                <a:cs typeface="Courier New" panose="02070309020205020404" pitchFamily="49" charset="0"/>
-              </a:rPr>
-              <a:t>cpp</a:t>
-            </a:r>
-            <a:r>
-              <a:rPr lang="en-US" dirty="0">
-                <a:latin typeface="Courier New" panose="02070309020205020404" pitchFamily="49" charset="0"/>
-                <a:cs typeface="Courier New" panose="02070309020205020404" pitchFamily="49" charset="0"/>
-              </a:rPr>
-              <a:t>_</a:t>
-            </a:r>
-            <a:r>
-              <a:rPr lang="pt-BR" dirty="0">
-                <a:latin typeface="Courier New" panose="02070309020205020404" pitchFamily="49" charset="0"/>
-                <a:cs typeface="Courier New" panose="02070309020205020404" pitchFamily="49" charset="0"/>
-              </a:rPr>
-              <a:t>debug</a:t>
-            </a:r>
-            <a:endParaRPr lang="en-US" dirty="0">
-              <a:latin typeface="Courier New" panose="02070309020205020404" pitchFamily="49" charset="0"/>
-              <a:cs typeface="Courier New" panose="02070309020205020404" pitchFamily="49" charset="0"/>
-            </a:endParaRPr>
+              <a:t>https://byjus.com/surface-area-formulas</a:t>
+            </a:r>
+            <a:r>
+              <a:rPr lang="en-US" dirty="0"/>
+              <a:t> </a:t>
+            </a:r>
+          </a:p>
+          <a:p>
+            <a:endParaRPr lang="en-US" dirty="0"/>
           </a:p>
         </p:txBody>
       </p:sp>
     </p:spTree>
     <p:extLst>
       <p:ext uri="{BB962C8B-B14F-4D97-AF65-F5344CB8AC3E}">
-        <p14:creationId xmlns:p14="http://schemas.microsoft.com/office/powerpoint/2010/main" val="1010424374"/>
+        <p14:creationId xmlns:p14="http://schemas.microsoft.com/office/powerpoint/2010/main" val="1044877323"/>
       </p:ext>
     </p:extLst>
   </p:cSld>

</xml_diff>

<commit_message>
Made edits to the python debug examples.
</commit_message>
<xml_diff>
--- a/01_overview/Introduction_To_Debugging.pptx
+++ b/01_overview/Introduction_To_Debugging.pptx
@@ -14,13 +14,15 @@
     <p:sldId id="260" r:id="rId8"/>
     <p:sldId id="261" r:id="rId9"/>
     <p:sldId id="264" r:id="rId10"/>
-    <p:sldId id="271" r:id="rId11"/>
-    <p:sldId id="273" r:id="rId12"/>
-    <p:sldId id="272" r:id="rId13"/>
-    <p:sldId id="262" r:id="rId14"/>
-    <p:sldId id="263" r:id="rId15"/>
-    <p:sldId id="265" r:id="rId16"/>
-    <p:sldId id="266" r:id="rId17"/>
+    <p:sldId id="275" r:id="rId11"/>
+    <p:sldId id="271" r:id="rId12"/>
+    <p:sldId id="273" r:id="rId13"/>
+    <p:sldId id="272" r:id="rId14"/>
+    <p:sldId id="274" r:id="rId15"/>
+    <p:sldId id="262" r:id="rId16"/>
+    <p:sldId id="263" r:id="rId17"/>
+    <p:sldId id="265" r:id="rId18"/>
+    <p:sldId id="266" r:id="rId19"/>
   </p:sldIdLst>
   <p:sldSz cx="9144000" cy="6858000" type="screen4x3"/>
   <p:notesSz cx="6858000" cy="9144000"/>
@@ -3074,6 +3076,162 @@
           <p:cNvPr id="2" name="Title 1">
             <a:extLst>
               <a:ext uri="{FF2B5EF4-FFF2-40B4-BE49-F238E27FC236}">
+                <a16:creationId xmlns:a16="http://schemas.microsoft.com/office/drawing/2014/main" id="{5C298627-CFD5-A84F-8C30-6F138E6AD524}"/>
+              </a:ext>
+            </a:extLst>
+          </p:cNvPr>
+          <p:cNvSpPr>
+            <a:spLocks noGrp="1"/>
+          </p:cNvSpPr>
+          <p:nvPr>
+            <p:ph type="title"/>
+          </p:nvPr>
+        </p:nvSpPr>
+        <p:spPr/>
+        <p:txBody>
+          <a:bodyPr/>
+          <a:lstStyle/>
+          <a:p>
+            <a:r>
+              <a:rPr lang="en-US" dirty="0"/>
+              <a:t>Conditional Breakpoints</a:t>
+            </a:r>
+          </a:p>
+        </p:txBody>
+      </p:sp>
+      <p:sp>
+        <p:nvSpPr>
+          <p:cNvPr id="3" name="Content Placeholder 2">
+            <a:extLst>
+              <a:ext uri="{FF2B5EF4-FFF2-40B4-BE49-F238E27FC236}">
+                <a16:creationId xmlns:a16="http://schemas.microsoft.com/office/drawing/2014/main" id="{2BFD590D-9D84-284D-BE51-CE87B2A0EF92}"/>
+              </a:ext>
+            </a:extLst>
+          </p:cNvPr>
+          <p:cNvSpPr>
+            <a:spLocks noGrp="1"/>
+          </p:cNvSpPr>
+          <p:nvPr>
+            <p:ph idx="1"/>
+          </p:nvPr>
+        </p:nvSpPr>
+        <p:spPr/>
+        <p:txBody>
+          <a:bodyPr/>
+          <a:lstStyle/>
+          <a:p>
+            <a:pPr>
+              <a:lnSpc>
+                <a:spcPct val="200000"/>
+              </a:lnSpc>
+            </a:pPr>
+            <a:r>
+              <a:rPr lang="en-US" dirty="0"/>
+              <a:t>Sometimes breakpoints need to be conditional</a:t>
+            </a:r>
+          </a:p>
+          <a:p>
+            <a:pPr lvl="1">
+              <a:lnSpc>
+                <a:spcPct val="200000"/>
+              </a:lnSpc>
+            </a:pPr>
+            <a:r>
+              <a:rPr lang="en-US" dirty="0"/>
+              <a:t>Useful when breaking at a certain iteration</a:t>
+            </a:r>
+          </a:p>
+          <a:p>
+            <a:pPr lvl="1">
+              <a:lnSpc>
+                <a:spcPct val="200000"/>
+              </a:lnSpc>
+            </a:pPr>
+            <a:r>
+              <a:rPr lang="en-US" dirty="0"/>
+              <a:t>Breaking on a certain call of the function </a:t>
+            </a:r>
+          </a:p>
+          <a:p>
+            <a:pPr>
+              <a:lnSpc>
+                <a:spcPct val="200000"/>
+              </a:lnSpc>
+            </a:pPr>
+            <a:r>
+              <a:rPr lang="en-US" dirty="0"/>
+              <a:t>Run the “</a:t>
+            </a:r>
+            <a:r>
+              <a:rPr lang="en-US" dirty="0" err="1"/>
+              <a:t>triangle_area_many.py</a:t>
+            </a:r>
+            <a:r>
+              <a:rPr lang="en-US" dirty="0"/>
+              <a:t>” example</a:t>
+            </a:r>
+          </a:p>
+          <a:p>
+            <a:pPr lvl="1">
+              <a:lnSpc>
+                <a:spcPct val="200000"/>
+              </a:lnSpc>
+            </a:pPr>
+            <a:r>
+              <a:rPr lang="en-US" dirty="0"/>
+              <a:t>Figure out which of the 10000 </a:t>
+            </a:r>
+            <a:r>
+              <a:rPr lang="en-US" dirty="0" err="1"/>
+              <a:t>traingles</a:t>
+            </a:r>
+            <a:r>
+              <a:rPr lang="en-US" dirty="0"/>
+              <a:t> </a:t>
+            </a:r>
+            <a:r>
+              <a:rPr lang="en-US"/>
+              <a:t>is failing!</a:t>
+            </a:r>
+            <a:endParaRPr lang="en-US" dirty="0"/>
+          </a:p>
+        </p:txBody>
+      </p:sp>
+    </p:spTree>
+    <p:extLst>
+      <p:ext uri="{BB962C8B-B14F-4D97-AF65-F5344CB8AC3E}">
+        <p14:creationId xmlns:p14="http://schemas.microsoft.com/office/powerpoint/2010/main" val="3614469301"/>
+      </p:ext>
+    </p:extLst>
+  </p:cSld>
+  <p:clrMapOvr>
+    <a:masterClrMapping/>
+  </p:clrMapOvr>
+</p:sld>
+</file>
+
+<file path=ppt/slides/slide11.xml><?xml version="1.0" encoding="utf-8"?>
+<p:sld xmlns:a="http://schemas.openxmlformats.org/drawingml/2006/main" xmlns:r="http://schemas.openxmlformats.org/officeDocument/2006/relationships" xmlns:p="http://schemas.openxmlformats.org/presentationml/2006/main">
+  <p:cSld>
+    <p:spTree>
+      <p:nvGrpSpPr>
+        <p:cNvPr id="1" name=""/>
+        <p:cNvGrpSpPr/>
+        <p:nvPr/>
+      </p:nvGrpSpPr>
+      <p:grpSpPr>
+        <a:xfrm>
+          <a:off x="0" y="0"/>
+          <a:ext cx="0" cy="0"/>
+          <a:chOff x="0" y="0"/>
+          <a:chExt cx="0" cy="0"/>
+        </a:xfrm>
+      </p:grpSpPr>
+      <p:sp>
+        <p:nvSpPr>
+          <p:cNvPr id="2" name="Title 1">
+            <a:extLst>
+              <a:ext uri="{FF2B5EF4-FFF2-40B4-BE49-F238E27FC236}">
                 <a16:creationId xmlns:a16="http://schemas.microsoft.com/office/drawing/2014/main" id="{1BC26E86-427F-DB4F-9B74-EC48AE4C30A0}"/>
               </a:ext>
             </a:extLst>
@@ -3224,7 +3382,7 @@
             <a:pPr lvl="1"/>
             <a:r>
               <a:rPr lang="en-US" dirty="0"/>
-              <a:t>See what is taking so long? </a:t>
+              <a:t>What is taking so long? </a:t>
             </a:r>
           </a:p>
           <a:p>
@@ -3278,7 +3436,7 @@
 </p:sld>
 </file>
 
-<file path=ppt/slides/slide11.xml><?xml version="1.0" encoding="utf-8"?>
+<file path=ppt/slides/slide12.xml><?xml version="1.0" encoding="utf-8"?>
 <p:sld xmlns:a="http://schemas.openxmlformats.org/drawingml/2006/main" xmlns:r="http://schemas.openxmlformats.org/officeDocument/2006/relationships" xmlns:p="http://schemas.openxmlformats.org/presentationml/2006/main">
   <p:cSld>
     <p:spTree>
@@ -3364,7 +3522,7 @@
 </p:sld>
 </file>
 
-<file path=ppt/slides/slide12.xml><?xml version="1.0" encoding="utf-8"?>
+<file path=ppt/slides/slide13.xml><?xml version="1.0" encoding="utf-8"?>
 <p:sld xmlns:a="http://schemas.openxmlformats.org/drawingml/2006/main" xmlns:r="http://schemas.openxmlformats.org/officeDocument/2006/relationships" xmlns:p="http://schemas.openxmlformats.org/presentationml/2006/main">
   <p:cSld>
     <p:spTree>
@@ -3518,7 +3676,7 @@
 </p:sld>
 </file>
 
-<file path=ppt/slides/slide13.xml><?xml version="1.0" encoding="utf-8"?>
+<file path=ppt/slides/slide14.xml><?xml version="1.0" encoding="utf-8"?>
 <p:sld xmlns:a="http://schemas.openxmlformats.org/drawingml/2006/main" xmlns:r="http://schemas.openxmlformats.org/officeDocument/2006/relationships" xmlns:p="http://schemas.openxmlformats.org/presentationml/2006/main">
   <p:cSld>
     <p:spTree>
@@ -3540,6 +3698,121 @@
           <p:cNvPr id="2" name="Title 1">
             <a:extLst>
               <a:ext uri="{FF2B5EF4-FFF2-40B4-BE49-F238E27FC236}">
+                <a16:creationId xmlns:a16="http://schemas.microsoft.com/office/drawing/2014/main" id="{89D84DEE-AABE-1A40-BDA3-63074BA9A209}"/>
+              </a:ext>
+            </a:extLst>
+          </p:cNvPr>
+          <p:cNvSpPr>
+            <a:spLocks noGrp="1"/>
+          </p:cNvSpPr>
+          <p:nvPr>
+            <p:ph type="title"/>
+          </p:nvPr>
+        </p:nvSpPr>
+        <p:spPr/>
+        <p:txBody>
+          <a:bodyPr/>
+          <a:lstStyle/>
+          <a:p>
+            <a:r>
+              <a:rPr lang="en-US" dirty="0"/>
+              <a:t>Python Memory Profiling</a:t>
+            </a:r>
+          </a:p>
+        </p:txBody>
+      </p:sp>
+      <p:sp>
+        <p:nvSpPr>
+          <p:cNvPr id="3" name="Content Placeholder 2">
+            <a:extLst>
+              <a:ext uri="{FF2B5EF4-FFF2-40B4-BE49-F238E27FC236}">
+                <a16:creationId xmlns:a16="http://schemas.microsoft.com/office/drawing/2014/main" id="{3867BF66-576A-3E45-8486-D41374EF0156}"/>
+              </a:ext>
+            </a:extLst>
+          </p:cNvPr>
+          <p:cNvSpPr>
+            <a:spLocks noGrp="1"/>
+          </p:cNvSpPr>
+          <p:nvPr>
+            <p:ph idx="1"/>
+          </p:nvPr>
+        </p:nvSpPr>
+        <p:spPr/>
+        <p:txBody>
+          <a:bodyPr/>
+          <a:lstStyle/>
+          <a:p>
+            <a:r>
+              <a:rPr lang="en-US" dirty="0"/>
+              <a:t>Memory profiling shows the instruction that significantly increase the memory usage</a:t>
+            </a:r>
+          </a:p>
+          <a:p>
+            <a:endParaRPr lang="en-US" dirty="0"/>
+          </a:p>
+          <a:p>
+            <a:r>
+              <a:rPr lang="en-US" dirty="0" err="1"/>
+              <a:t>memory_profiler</a:t>
+            </a:r>
+            <a:r>
+              <a:rPr lang="en-US" dirty="0"/>
+              <a:t> module allows users to decorate functions </a:t>
+            </a:r>
+          </a:p>
+          <a:p>
+            <a:endParaRPr lang="en-US" dirty="0"/>
+          </a:p>
+          <a:p>
+            <a:r>
+              <a:rPr lang="en-US" dirty="0"/>
+              <a:t>Shows total memory usage and lines that add to me memory footprint</a:t>
+            </a:r>
+          </a:p>
+          <a:p>
+            <a:pPr lvl="1"/>
+            <a:r>
+              <a:rPr lang="en-US" dirty="0"/>
+              <a:t>python </a:t>
+            </a:r>
+          </a:p>
+        </p:txBody>
+      </p:sp>
+    </p:spTree>
+    <p:extLst>
+      <p:ext uri="{BB962C8B-B14F-4D97-AF65-F5344CB8AC3E}">
+        <p14:creationId xmlns:p14="http://schemas.microsoft.com/office/powerpoint/2010/main" val="253782196"/>
+      </p:ext>
+    </p:extLst>
+  </p:cSld>
+  <p:clrMapOvr>
+    <a:masterClrMapping/>
+  </p:clrMapOvr>
+</p:sld>
+</file>
+
+<file path=ppt/slides/slide15.xml><?xml version="1.0" encoding="utf-8"?>
+<p:sld xmlns:a="http://schemas.openxmlformats.org/drawingml/2006/main" xmlns:r="http://schemas.openxmlformats.org/officeDocument/2006/relationships" xmlns:p="http://schemas.openxmlformats.org/presentationml/2006/main">
+  <p:cSld>
+    <p:spTree>
+      <p:nvGrpSpPr>
+        <p:cNvPr id="1" name=""/>
+        <p:cNvGrpSpPr/>
+        <p:nvPr/>
+      </p:nvGrpSpPr>
+      <p:grpSpPr>
+        <a:xfrm>
+          <a:off x="0" y="0"/>
+          <a:ext cx="0" cy="0"/>
+          <a:chOff x="0" y="0"/>
+          <a:chExt cx="0" cy="0"/>
+        </a:xfrm>
+      </p:grpSpPr>
+      <p:sp>
+        <p:nvSpPr>
+          <p:cNvPr id="2" name="Title 1">
+            <a:extLst>
+              <a:ext uri="{FF2B5EF4-FFF2-40B4-BE49-F238E27FC236}">
                 <a16:creationId xmlns:a16="http://schemas.microsoft.com/office/drawing/2014/main" id="{5FD78A33-15E7-4009-995F-02F3FEF2E869}"/>
               </a:ext>
             </a:extLst>
@@ -3644,7 +3917,15 @@
             </a:pPr>
             <a:r>
               <a:rPr lang="en-US" dirty="0"/>
-              <a:t>Click on Source to run the scripts</a:t>
+              <a:t>Click on </a:t>
+            </a:r>
+            <a:r>
+              <a:rPr lang="en-US" b="1" dirty="0"/>
+              <a:t>Source</a:t>
+            </a:r>
+            <a:r>
+              <a:rPr lang="en-US" dirty="0"/>
+              <a:t> button to run the scripts</a:t>
             </a:r>
           </a:p>
         </p:txBody>
@@ -3662,7 +3943,7 @@
 </p:sld>
 </file>
 
-<file path=ppt/slides/slide14.xml><?xml version="1.0" encoding="utf-8"?>
+<file path=ppt/slides/slide16.xml><?xml version="1.0" encoding="utf-8"?>
 <p:sld xmlns:a="http://schemas.openxmlformats.org/drawingml/2006/main" xmlns:r="http://schemas.openxmlformats.org/officeDocument/2006/relationships" xmlns:p="http://schemas.openxmlformats.org/presentationml/2006/main" show="0">
   <p:cSld>
     <p:spTree>
@@ -3821,7 +4102,7 @@
 </p:sld>
 </file>
 
-<file path=ppt/slides/slide15.xml><?xml version="1.0" encoding="utf-8"?>
+<file path=ppt/slides/slide17.xml><?xml version="1.0" encoding="utf-8"?>
 <p:sld xmlns:a="http://schemas.openxmlformats.org/drawingml/2006/main" xmlns:r="http://schemas.openxmlformats.org/officeDocument/2006/relationships" xmlns:p="http://schemas.openxmlformats.org/presentationml/2006/main" show="0">
   <p:cSld>
     <p:spTree>
@@ -4050,7 +4331,7 @@
 </p:sld>
 </file>
 
-<file path=ppt/slides/slide16.xml><?xml version="1.0" encoding="utf-8"?>
+<file path=ppt/slides/slide18.xml><?xml version="1.0" encoding="utf-8"?>
 <p:sld xmlns:a="http://schemas.openxmlformats.org/drawingml/2006/main" xmlns:r="http://schemas.openxmlformats.org/officeDocument/2006/relationships" xmlns:p="http://schemas.openxmlformats.org/presentationml/2006/main" show="0">
   <p:cSld>
     <p:spTree>

</xml_diff>

<commit_message>
Made edits to the R debug and profile examples.
</commit_message>
<xml_diff>
--- a/01_overview/Introduction_To_Debugging.pptx
+++ b/01_overview/Introduction_To_Debugging.pptx
@@ -20,9 +20,10 @@
     <p:sldId id="272" r:id="rId14"/>
     <p:sldId id="274" r:id="rId15"/>
     <p:sldId id="262" r:id="rId16"/>
-    <p:sldId id="263" r:id="rId17"/>
-    <p:sldId id="265" r:id="rId18"/>
-    <p:sldId id="266" r:id="rId19"/>
+    <p:sldId id="277" r:id="rId17"/>
+    <p:sldId id="263" r:id="rId18"/>
+    <p:sldId id="265" r:id="rId19"/>
+    <p:sldId id="266" r:id="rId20"/>
   </p:sldIdLst>
   <p:sldSz cx="9144000" cy="6858000" type="screen4x3"/>
   <p:notesSz cx="6858000" cy="9144000"/>
@@ -3187,13 +3188,8 @@
             </a:r>
             <a:r>
               <a:rPr lang="en-US" dirty="0"/>
-              <a:t> </a:t>
-            </a:r>
-            <a:r>
-              <a:rPr lang="en-US"/>
-              <a:t>is failing!</a:t>
-            </a:r>
-            <a:endParaRPr lang="en-US" dirty="0"/>
+              <a:t> is failing!</a:t>
+            </a:r>
           </a:p>
         </p:txBody>
       </p:sp>
@@ -3831,7 +3827,15 @@
           <a:p>
             <a:r>
               <a:rPr lang="en-US" dirty="0"/>
-              <a:t>Exercise 3 : RStudio</a:t>
+              <a:t>Exercise 3 : </a:t>
+            </a:r>
+            <a:r>
+              <a:rPr lang="en-US" dirty="0" err="1"/>
+              <a:t>Rstudio</a:t>
+            </a:r>
+            <a:r>
+              <a:rPr lang="en-US" dirty="0"/>
+              <a:t> Debugging</a:t>
             </a:r>
           </a:p>
         </p:txBody>
@@ -3927,6 +3931,29 @@
               <a:rPr lang="en-US" dirty="0"/>
               <a:t> button to run the scripts</a:t>
             </a:r>
+          </a:p>
+          <a:p>
+            <a:pPr>
+              <a:lnSpc>
+                <a:spcPct val="150000"/>
+              </a:lnSpc>
+            </a:pPr>
+            <a:r>
+              <a:rPr lang="en-US" dirty="0"/>
+              <a:t>Try to fix the infinite loop!</a:t>
+            </a:r>
+          </a:p>
+          <a:p>
+            <a:pPr lvl="1">
+              <a:lnSpc>
+                <a:spcPct val="150000"/>
+              </a:lnSpc>
+            </a:pPr>
+            <a:r>
+              <a:rPr lang="en-US" dirty="0" err="1"/>
+              <a:t>random_debug.R</a:t>
+            </a:r>
+            <a:endParaRPr lang="en-US" dirty="0"/>
           </a:p>
         </p:txBody>
       </p:sp>
@@ -3944,7 +3971,7 @@
 </file>
 
 <file path=ppt/slides/slide16.xml><?xml version="1.0" encoding="utf-8"?>
-<p:sld xmlns:a="http://schemas.openxmlformats.org/drawingml/2006/main" xmlns:r="http://schemas.openxmlformats.org/officeDocument/2006/relationships" xmlns:p="http://schemas.openxmlformats.org/presentationml/2006/main" show="0">
+<p:sld xmlns:a="http://schemas.openxmlformats.org/drawingml/2006/main" xmlns:r="http://schemas.openxmlformats.org/officeDocument/2006/relationships" xmlns:p="http://schemas.openxmlformats.org/presentationml/2006/main">
   <p:cSld>
     <p:spTree>
       <p:nvGrpSpPr>
@@ -3965,7 +3992,7 @@
           <p:cNvPr id="2" name="Title 1">
             <a:extLst>
               <a:ext uri="{FF2B5EF4-FFF2-40B4-BE49-F238E27FC236}">
-                <a16:creationId xmlns:a16="http://schemas.microsoft.com/office/drawing/2014/main" id="{8B1EB113-6772-47FD-B086-3D873CE8642B}"/>
+                <a16:creationId xmlns:a16="http://schemas.microsoft.com/office/drawing/2014/main" id="{5FD78A33-15E7-4009-995F-02F3FEF2E869}"/>
               </a:ext>
             </a:extLst>
           </p:cNvPr>
@@ -3983,7 +4010,15 @@
           <a:p>
             <a:r>
               <a:rPr lang="en-US" dirty="0"/>
-              <a:t>Handling C++</a:t>
+              <a:t>Exercise 3 : </a:t>
+            </a:r>
+            <a:r>
+              <a:rPr lang="en-US" dirty="0" err="1"/>
+              <a:t>Rstudio</a:t>
+            </a:r>
+            <a:r>
+              <a:rPr lang="en-US" dirty="0"/>
+              <a:t> Profiling</a:t>
             </a:r>
           </a:p>
         </p:txBody>
@@ -3993,7 +4028,7 @@
           <p:cNvPr id="3" name="Content Placeholder 2">
             <a:extLst>
               <a:ext uri="{FF2B5EF4-FFF2-40B4-BE49-F238E27FC236}">
-                <a16:creationId xmlns:a16="http://schemas.microsoft.com/office/drawing/2014/main" id="{39D54DE9-CBB0-4FEC-AB4C-2C31E7FAC625}"/>
+                <a16:creationId xmlns:a16="http://schemas.microsoft.com/office/drawing/2014/main" id="{8B7DDB34-81CC-4A34-9EC4-2E3400B990B8}"/>
               </a:ext>
             </a:extLst>
           </p:cNvPr>
@@ -4004,10 +4039,15 @@
             <p:ph idx="1"/>
           </p:nvPr>
         </p:nvSpPr>
-        <p:spPr/>
+        <p:spPr>
+          <a:xfrm>
+            <a:off x="628650" y="1825625"/>
+            <a:ext cx="8022981" cy="4351338"/>
+          </a:xfrm>
+        </p:spPr>
         <p:txBody>
           <a:bodyPr>
-            <a:normAutofit fontScale="92500" lnSpcReduction="10000"/>
+            <a:normAutofit/>
           </a:bodyPr>
           <a:lstStyle/>
           <a:p>
@@ -4018,7 +4058,26 @@
             </a:pPr>
             <a:r>
               <a:rPr lang="en-US" dirty="0"/>
-              <a:t>C++ is somewhat different because it is compiled </a:t>
+              <a:t>Download the file:</a:t>
+            </a:r>
+          </a:p>
+          <a:p>
+            <a:pPr lvl="1">
+              <a:lnSpc>
+                <a:spcPct val="150000"/>
+              </a:lnSpc>
+            </a:pPr>
+            <a:r>
+              <a:rPr lang="en-US" dirty="0"/>
+              <a:t>Navigate to the </a:t>
+            </a:r>
+            <a:r>
+              <a:rPr lang="en-US" dirty="0" err="1"/>
+              <a:t>R_profile</a:t>
+            </a:r>
+            <a:r>
+              <a:rPr lang="en-US" dirty="0"/>
+              <a:t> folder</a:t>
             </a:r>
           </a:p>
           <a:p>
@@ -4029,7 +4088,31 @@
             </a:pPr>
             <a:r>
               <a:rPr lang="en-US" dirty="0"/>
-              <a:t>Some errors are found much earlier </a:t>
+              <a:t>Click on the files to open </a:t>
+            </a:r>
+            <a:r>
+              <a:rPr lang="en-US" dirty="0" err="1"/>
+              <a:t>Rstudio</a:t>
+            </a:r>
+            <a:endParaRPr lang="en-US" dirty="0"/>
+          </a:p>
+          <a:p>
+            <a:pPr lvl="1">
+              <a:lnSpc>
+                <a:spcPct val="150000"/>
+              </a:lnSpc>
+            </a:pPr>
+            <a:r>
+              <a:rPr lang="en-US" dirty="0"/>
+              <a:t>Click on </a:t>
+            </a:r>
+            <a:r>
+              <a:rPr lang="en-US" b="1" dirty="0"/>
+              <a:t>Source</a:t>
+            </a:r>
+            <a:r>
+              <a:rPr lang="en-US" dirty="0"/>
+              <a:t> button to run the scripts</a:t>
             </a:r>
           </a:p>
           <a:p>
@@ -4040,51 +4123,15 @@
             </a:pPr>
             <a:r>
               <a:rPr lang="en-US" dirty="0"/>
-              <a:t>The build process needs to be setup</a:t>
-            </a:r>
-          </a:p>
-          <a:p>
-            <a:pPr lvl="1">
-              <a:lnSpc>
-                <a:spcPct val="150000"/>
-              </a:lnSpc>
-            </a:pPr>
-            <a:r>
-              <a:rPr lang="en-US" dirty="0"/>
-              <a:t>Compiler</a:t>
-            </a:r>
-          </a:p>
-          <a:p>
-            <a:pPr lvl="1">
-              <a:lnSpc>
-                <a:spcPct val="150000"/>
-              </a:lnSpc>
-            </a:pPr>
-            <a:r>
-              <a:rPr lang="en-US" dirty="0"/>
-              <a:t>Compiler options</a:t>
-            </a:r>
-          </a:p>
-          <a:p>
-            <a:pPr lvl="1">
-              <a:lnSpc>
-                <a:spcPct val="150000"/>
-              </a:lnSpc>
-            </a:pPr>
-            <a:r>
-              <a:rPr lang="en-US" dirty="0"/>
-              <a:t>Debug/Release builds</a:t>
-            </a:r>
-          </a:p>
-          <a:p>
-            <a:pPr>
-              <a:lnSpc>
-                <a:spcPct val="150000"/>
-              </a:lnSpc>
-            </a:pPr>
-            <a:r>
-              <a:rPr lang="en-US" dirty="0"/>
-              <a:t>Errors messages can be less obvious </a:t>
+              <a:t>Let’s benchmark some sorting and </a:t>
+            </a:r>
+            <a:r>
+              <a:rPr lang="en-US" dirty="0" err="1"/>
+              <a:t>dataframe</a:t>
+            </a:r>
+            <a:r>
+              <a:rPr lang="en-US" dirty="0"/>
+              <a:t> operations</a:t>
             </a:r>
           </a:p>
         </p:txBody>
@@ -4092,7 +4139,7 @@
     </p:spTree>
     <p:extLst>
       <p:ext uri="{BB962C8B-B14F-4D97-AF65-F5344CB8AC3E}">
-        <p14:creationId xmlns:p14="http://schemas.microsoft.com/office/powerpoint/2010/main" val="237925523"/>
+        <p14:creationId xmlns:p14="http://schemas.microsoft.com/office/powerpoint/2010/main" val="4280221917"/>
       </p:ext>
     </p:extLst>
   </p:cSld>
@@ -4124,6 +4171,165 @@
           <p:cNvPr id="2" name="Title 1">
             <a:extLst>
               <a:ext uri="{FF2B5EF4-FFF2-40B4-BE49-F238E27FC236}">
+                <a16:creationId xmlns:a16="http://schemas.microsoft.com/office/drawing/2014/main" id="{8B1EB113-6772-47FD-B086-3D873CE8642B}"/>
+              </a:ext>
+            </a:extLst>
+          </p:cNvPr>
+          <p:cNvSpPr>
+            <a:spLocks noGrp="1"/>
+          </p:cNvSpPr>
+          <p:nvPr>
+            <p:ph type="title"/>
+          </p:nvPr>
+        </p:nvSpPr>
+        <p:spPr/>
+        <p:txBody>
+          <a:bodyPr/>
+          <a:lstStyle/>
+          <a:p>
+            <a:r>
+              <a:rPr lang="en-US" dirty="0"/>
+              <a:t>Handling C++</a:t>
+            </a:r>
+          </a:p>
+        </p:txBody>
+      </p:sp>
+      <p:sp>
+        <p:nvSpPr>
+          <p:cNvPr id="3" name="Content Placeholder 2">
+            <a:extLst>
+              <a:ext uri="{FF2B5EF4-FFF2-40B4-BE49-F238E27FC236}">
+                <a16:creationId xmlns:a16="http://schemas.microsoft.com/office/drawing/2014/main" id="{39D54DE9-CBB0-4FEC-AB4C-2C31E7FAC625}"/>
+              </a:ext>
+            </a:extLst>
+          </p:cNvPr>
+          <p:cNvSpPr>
+            <a:spLocks noGrp="1"/>
+          </p:cNvSpPr>
+          <p:nvPr>
+            <p:ph idx="1"/>
+          </p:nvPr>
+        </p:nvSpPr>
+        <p:spPr/>
+        <p:txBody>
+          <a:bodyPr>
+            <a:normAutofit fontScale="92500" lnSpcReduction="10000"/>
+          </a:bodyPr>
+          <a:lstStyle/>
+          <a:p>
+            <a:pPr>
+              <a:lnSpc>
+                <a:spcPct val="150000"/>
+              </a:lnSpc>
+            </a:pPr>
+            <a:r>
+              <a:rPr lang="en-US" dirty="0"/>
+              <a:t>C++ is somewhat different because it is compiled </a:t>
+            </a:r>
+          </a:p>
+          <a:p>
+            <a:pPr>
+              <a:lnSpc>
+                <a:spcPct val="150000"/>
+              </a:lnSpc>
+            </a:pPr>
+            <a:r>
+              <a:rPr lang="en-US" dirty="0"/>
+              <a:t>Some errors are found much earlier </a:t>
+            </a:r>
+          </a:p>
+          <a:p>
+            <a:pPr>
+              <a:lnSpc>
+                <a:spcPct val="150000"/>
+              </a:lnSpc>
+            </a:pPr>
+            <a:r>
+              <a:rPr lang="en-US" dirty="0"/>
+              <a:t>The build process needs to be setup</a:t>
+            </a:r>
+          </a:p>
+          <a:p>
+            <a:pPr lvl="1">
+              <a:lnSpc>
+                <a:spcPct val="150000"/>
+              </a:lnSpc>
+            </a:pPr>
+            <a:r>
+              <a:rPr lang="en-US" dirty="0"/>
+              <a:t>Compiler</a:t>
+            </a:r>
+          </a:p>
+          <a:p>
+            <a:pPr lvl="1">
+              <a:lnSpc>
+                <a:spcPct val="150000"/>
+              </a:lnSpc>
+            </a:pPr>
+            <a:r>
+              <a:rPr lang="en-US" dirty="0"/>
+              <a:t>Compiler options</a:t>
+            </a:r>
+          </a:p>
+          <a:p>
+            <a:pPr lvl="1">
+              <a:lnSpc>
+                <a:spcPct val="150000"/>
+              </a:lnSpc>
+            </a:pPr>
+            <a:r>
+              <a:rPr lang="en-US" dirty="0"/>
+              <a:t>Debug/Release builds</a:t>
+            </a:r>
+          </a:p>
+          <a:p>
+            <a:pPr>
+              <a:lnSpc>
+                <a:spcPct val="150000"/>
+              </a:lnSpc>
+            </a:pPr>
+            <a:r>
+              <a:rPr lang="en-US" dirty="0"/>
+              <a:t>Errors messages can be less obvious </a:t>
+            </a:r>
+          </a:p>
+        </p:txBody>
+      </p:sp>
+    </p:spTree>
+    <p:extLst>
+      <p:ext uri="{BB962C8B-B14F-4D97-AF65-F5344CB8AC3E}">
+        <p14:creationId xmlns:p14="http://schemas.microsoft.com/office/powerpoint/2010/main" val="237925523"/>
+      </p:ext>
+    </p:extLst>
+  </p:cSld>
+  <p:clrMapOvr>
+    <a:masterClrMapping/>
+  </p:clrMapOvr>
+</p:sld>
+</file>
+
+<file path=ppt/slides/slide18.xml><?xml version="1.0" encoding="utf-8"?>
+<p:sld xmlns:a="http://schemas.openxmlformats.org/drawingml/2006/main" xmlns:r="http://schemas.openxmlformats.org/officeDocument/2006/relationships" xmlns:p="http://schemas.openxmlformats.org/presentationml/2006/main" show="0">
+  <p:cSld>
+    <p:spTree>
+      <p:nvGrpSpPr>
+        <p:cNvPr id="1" name=""/>
+        <p:cNvGrpSpPr/>
+        <p:nvPr/>
+      </p:nvGrpSpPr>
+      <p:grpSpPr>
+        <a:xfrm>
+          <a:off x="0" y="0"/>
+          <a:ext cx="0" cy="0"/>
+          <a:chOff x="0" y="0"/>
+          <a:chExt cx="0" cy="0"/>
+        </a:xfrm>
+      </p:grpSpPr>
+      <p:sp>
+        <p:nvSpPr>
+          <p:cNvPr id="2" name="Title 1">
+            <a:extLst>
+              <a:ext uri="{FF2B5EF4-FFF2-40B4-BE49-F238E27FC236}">
                 <a16:creationId xmlns:a16="http://schemas.microsoft.com/office/drawing/2014/main" id="{E12BE167-F6C9-4FD8-AE90-A43FAAA42A07}"/>
               </a:ext>
             </a:extLst>
@@ -4331,7 +4537,7 @@
 </p:sld>
 </file>
 
-<file path=ppt/slides/slide18.xml><?xml version="1.0" encoding="utf-8"?>
+<file path=ppt/slides/slide19.xml><?xml version="1.0" encoding="utf-8"?>
 <p:sld xmlns:a="http://schemas.openxmlformats.org/drawingml/2006/main" xmlns:r="http://schemas.openxmlformats.org/officeDocument/2006/relationships" xmlns:p="http://schemas.openxmlformats.org/presentationml/2006/main" show="0">
   <p:cSld>
     <p:spTree>

</xml_diff>

<commit_message>
Added a slide on profvis and another example.
</commit_message>
<xml_diff>
--- a/01_overview/Introduction_To_Debugging.pptx
+++ b/01_overview/Introduction_To_Debugging.pptx
@@ -21,9 +21,10 @@
     <p:sldId id="274" r:id="rId15"/>
     <p:sldId id="262" r:id="rId16"/>
     <p:sldId id="277" r:id="rId17"/>
-    <p:sldId id="263" r:id="rId18"/>
-    <p:sldId id="265" r:id="rId19"/>
-    <p:sldId id="266" r:id="rId20"/>
+    <p:sldId id="278" r:id="rId18"/>
+    <p:sldId id="263" r:id="rId19"/>
+    <p:sldId id="265" r:id="rId20"/>
+    <p:sldId id="266" r:id="rId21"/>
   </p:sldIdLst>
   <p:sldSz cx="9144000" cy="6858000" type="screen4x3"/>
   <p:notesSz cx="6858000" cy="9144000"/>
@@ -3451,7 +3452,7 @@
         </p:blipFill>
         <p:spPr>
           <a:xfrm>
-            <a:off x="6869793" y="1146402"/>
+            <a:off x="6837136" y="1325563"/>
             <a:ext cx="2165350" cy="5167311"/>
           </a:xfrm>
           <a:prstGeom prst="rect">
@@ -3780,7 +3781,7 @@
           <a:p>
             <a:r>
               <a:rPr lang="en-US" dirty="0"/>
-              <a:t>Memory profiling shows the instruction that significantly increase the memory usage</a:t>
+              <a:t>Memory profiling show the instructions that significantly increase the memory usage</a:t>
             </a:r>
           </a:p>
           <a:p>
@@ -3802,7 +3803,7 @@
           <a:p>
             <a:r>
               <a:rPr lang="en-US" dirty="0"/>
-              <a:t>Shows total memory usage and lines that add to me memory footprint</a:t>
+              <a:t>Shows total memory usage and lines that add to memory footprint</a:t>
             </a:r>
           </a:p>
           <a:p>
@@ -3811,6 +3812,11 @@
               <a:rPr lang="en-US" dirty="0"/>
               <a:t>python </a:t>
             </a:r>
+            <a:r>
+              <a:rPr lang="en-US" dirty="0" err="1"/>
+              <a:t>mem_profile.py</a:t>
+            </a:r>
+            <a:endParaRPr lang="en-US" dirty="0"/>
           </a:p>
         </p:txBody>
       </p:sp>
@@ -4190,7 +4196,7 @@
 </file>
 
 <file path=ppt/slides/slide17.xml><?xml version="1.0" encoding="utf-8"?>
-<p:sld xmlns:a="http://schemas.openxmlformats.org/drawingml/2006/main" xmlns:r="http://schemas.openxmlformats.org/officeDocument/2006/relationships" xmlns:p="http://schemas.openxmlformats.org/presentationml/2006/main" show="0">
+<p:sld xmlns:a="http://schemas.openxmlformats.org/drawingml/2006/main" xmlns:r="http://schemas.openxmlformats.org/officeDocument/2006/relationships" xmlns:p="http://schemas.openxmlformats.org/presentationml/2006/main">
   <p:cSld>
     <p:spTree>
       <p:nvGrpSpPr>
@@ -4211,7 +4217,7 @@
           <p:cNvPr id="2" name="Title 1">
             <a:extLst>
               <a:ext uri="{FF2B5EF4-FFF2-40B4-BE49-F238E27FC236}">
-                <a16:creationId xmlns:a16="http://schemas.microsoft.com/office/drawing/2014/main" id="{8B1EB113-6772-47FD-B086-3D873CE8642B}"/>
+                <a16:creationId xmlns:a16="http://schemas.microsoft.com/office/drawing/2014/main" id="{382E9FAD-7489-8246-AB49-9038C2DC9DB9}"/>
               </a:ext>
             </a:extLst>
           </p:cNvPr>
@@ -4228,8 +4234,12 @@
           <a:lstStyle/>
           <a:p>
             <a:r>
-              <a:rPr lang="en-US" dirty="0"/>
-              <a:t>Handling C++</a:t>
+              <a:rPr lang="en-US" dirty="0" err="1"/>
+              <a:t>Profvis</a:t>
+            </a:r>
+            <a:r>
+              <a:rPr lang="en-US" dirty="0"/>
+              <a:t> Interactive Profiling </a:t>
             </a:r>
           </a:p>
         </p:txBody>
@@ -4239,7 +4249,7 @@
           <p:cNvPr id="3" name="Content Placeholder 2">
             <a:extLst>
               <a:ext uri="{FF2B5EF4-FFF2-40B4-BE49-F238E27FC236}">
-                <a16:creationId xmlns:a16="http://schemas.microsoft.com/office/drawing/2014/main" id="{39D54DE9-CBB0-4FEC-AB4C-2C31E7FAC625}"/>
+                <a16:creationId xmlns:a16="http://schemas.microsoft.com/office/drawing/2014/main" id="{BC1D1B41-1D1E-D140-8A40-75139359D97F}"/>
               </a:ext>
             </a:extLst>
           </p:cNvPr>
@@ -4252,85 +4262,43 @@
         </p:nvSpPr>
         <p:spPr/>
         <p:txBody>
-          <a:bodyPr>
-            <a:normAutofit fontScale="92500" lnSpcReduction="10000"/>
-          </a:bodyPr>
-          <a:lstStyle/>
-          <a:p>
-            <a:pPr>
-              <a:lnSpc>
-                <a:spcPct val="150000"/>
-              </a:lnSpc>
-            </a:pPr>
-            <a:r>
-              <a:rPr lang="en-US" dirty="0"/>
-              <a:t>C++ is somewhat different because it is compiled </a:t>
-            </a:r>
-          </a:p>
-          <a:p>
-            <a:pPr>
-              <a:lnSpc>
-                <a:spcPct val="150000"/>
-              </a:lnSpc>
-            </a:pPr>
-            <a:r>
-              <a:rPr lang="en-US" dirty="0"/>
-              <a:t>Some errors are found much earlier </a:t>
-            </a:r>
-          </a:p>
-          <a:p>
-            <a:pPr>
-              <a:lnSpc>
-                <a:spcPct val="150000"/>
-              </a:lnSpc>
-            </a:pPr>
-            <a:r>
-              <a:rPr lang="en-US" dirty="0"/>
-              <a:t>The build process needs to be setup</a:t>
-            </a:r>
-          </a:p>
-          <a:p>
-            <a:pPr lvl="1">
-              <a:lnSpc>
-                <a:spcPct val="150000"/>
-              </a:lnSpc>
-            </a:pPr>
-            <a:r>
-              <a:rPr lang="en-US" dirty="0"/>
-              <a:t>Compiler</a:t>
-            </a:r>
-          </a:p>
-          <a:p>
-            <a:pPr lvl="1">
-              <a:lnSpc>
-                <a:spcPct val="150000"/>
-              </a:lnSpc>
-            </a:pPr>
-            <a:r>
-              <a:rPr lang="en-US" dirty="0"/>
-              <a:t>Compiler options</a:t>
-            </a:r>
-          </a:p>
-          <a:p>
-            <a:pPr lvl="1">
-              <a:lnSpc>
-                <a:spcPct val="150000"/>
-              </a:lnSpc>
-            </a:pPr>
-            <a:r>
-              <a:rPr lang="en-US" dirty="0"/>
-              <a:t>Debug/Release builds</a:t>
-            </a:r>
-          </a:p>
-          <a:p>
-            <a:pPr>
-              <a:lnSpc>
-                <a:spcPct val="150000"/>
-              </a:lnSpc>
-            </a:pPr>
-            <a:r>
-              <a:rPr lang="en-US" dirty="0"/>
-              <a:t>Errors messages can be less obvious </a:t>
+          <a:bodyPr/>
+          <a:lstStyle/>
+          <a:p>
+            <a:r>
+              <a:rPr lang="en-US" dirty="0"/>
+              <a:t>Produces an interactive graph</a:t>
+            </a:r>
+          </a:p>
+          <a:p>
+            <a:endParaRPr lang="en-US" dirty="0"/>
+          </a:p>
+          <a:p>
+            <a:r>
+              <a:rPr lang="en-US" dirty="0"/>
+              <a:t>Statistical profiling using </a:t>
+            </a:r>
+            <a:r>
+              <a:rPr lang="en-US" dirty="0" err="1"/>
+              <a:t>Rprof</a:t>
+            </a:r>
+            <a:endParaRPr lang="en-US" dirty="0"/>
+          </a:p>
+          <a:p>
+            <a:pPr lvl="1"/>
+            <a:r>
+              <a:rPr lang="en-US" dirty="0"/>
+              <a:t>10ms intervals</a:t>
+            </a:r>
+          </a:p>
+          <a:p>
+            <a:pPr lvl="1"/>
+            <a:endParaRPr lang="en-US" dirty="0"/>
+          </a:p>
+          <a:p>
+            <a:r>
+              <a:rPr lang="en-US" dirty="0"/>
+              <a:t>The flame graph shows the lines of code where time was spent</a:t>
             </a:r>
           </a:p>
         </p:txBody>
@@ -4338,7 +4306,7 @@
     </p:spTree>
     <p:extLst>
       <p:ext uri="{BB962C8B-B14F-4D97-AF65-F5344CB8AC3E}">
-        <p14:creationId xmlns:p14="http://schemas.microsoft.com/office/powerpoint/2010/main" val="237925523"/>
+        <p14:creationId xmlns:p14="http://schemas.microsoft.com/office/powerpoint/2010/main" val="382755255"/>
       </p:ext>
     </p:extLst>
   </p:cSld>
@@ -4370,7 +4338,7 @@
           <p:cNvPr id="2" name="Title 1">
             <a:extLst>
               <a:ext uri="{FF2B5EF4-FFF2-40B4-BE49-F238E27FC236}">
-                <a16:creationId xmlns:a16="http://schemas.microsoft.com/office/drawing/2014/main" id="{E12BE167-F6C9-4FD8-AE90-A43FAAA42A07}"/>
+                <a16:creationId xmlns:a16="http://schemas.microsoft.com/office/drawing/2014/main" id="{8B1EB113-6772-47FD-B086-3D873CE8642B}"/>
               </a:ext>
             </a:extLst>
           </p:cNvPr>
@@ -4388,7 +4356,7 @@
           <a:p>
             <a:r>
               <a:rPr lang="en-US" dirty="0"/>
-              <a:t>Exercise 4 : C++ Setup</a:t>
+              <a:t>Handling C++</a:t>
             </a:r>
           </a:p>
         </p:txBody>
@@ -4398,7 +4366,7 @@
           <p:cNvPr id="3" name="Content Placeholder 2">
             <a:extLst>
               <a:ext uri="{FF2B5EF4-FFF2-40B4-BE49-F238E27FC236}">
-                <a16:creationId xmlns:a16="http://schemas.microsoft.com/office/drawing/2014/main" id="{6D93E6B7-65B4-4005-895B-4CD959210943}"/>
+                <a16:creationId xmlns:a16="http://schemas.microsoft.com/office/drawing/2014/main" id="{39D54DE9-CBB0-4FEC-AB4C-2C31E7FAC625}"/>
               </a:ext>
             </a:extLst>
           </p:cNvPr>
@@ -4409,15 +4377,10 @@
             <p:ph idx="1"/>
           </p:nvPr>
         </p:nvSpPr>
-        <p:spPr>
-          <a:xfrm>
-            <a:off x="211015" y="1825625"/>
-            <a:ext cx="8745415" cy="4351338"/>
-          </a:xfrm>
-        </p:spPr>
+        <p:spPr/>
         <p:txBody>
           <a:bodyPr>
-            <a:normAutofit/>
+            <a:normAutofit fontScale="92500" lnSpcReduction="10000"/>
           </a:bodyPr>
           <a:lstStyle/>
           <a:p>
@@ -4428,7 +4391,29 @@
             </a:pPr>
             <a:r>
               <a:rPr lang="en-US" dirty="0"/>
-              <a:t>Log onto Adroit </a:t>
+              <a:t>C++ is somewhat different because it is compiled </a:t>
+            </a:r>
+          </a:p>
+          <a:p>
+            <a:pPr>
+              <a:lnSpc>
+                <a:spcPct val="150000"/>
+              </a:lnSpc>
+            </a:pPr>
+            <a:r>
+              <a:rPr lang="en-US" dirty="0"/>
+              <a:t>Some errors are found much earlier </a:t>
+            </a:r>
+          </a:p>
+          <a:p>
+            <a:pPr>
+              <a:lnSpc>
+                <a:spcPct val="150000"/>
+              </a:lnSpc>
+            </a:pPr>
+            <a:r>
+              <a:rPr lang="en-US" dirty="0"/>
+              <a:t>The build process needs to be setup</a:t>
             </a:r>
           </a:p>
           <a:p>
@@ -4438,18 +4423,30 @@
               </a:lnSpc>
             </a:pPr>
             <a:r>
-              <a:rPr lang="en-US" dirty="0" err="1">
-                <a:latin typeface="Courier New" panose="02070309020205020404" pitchFamily="49" charset="0"/>
-                <a:cs typeface="Courier New" panose="02070309020205020404" pitchFamily="49" charset="0"/>
-              </a:rPr>
-              <a:t>ssh</a:t>
-            </a:r>
-            <a:r>
-              <a:rPr lang="en-US" dirty="0">
-                <a:latin typeface="Courier New" panose="02070309020205020404" pitchFamily="49" charset="0"/>
-                <a:cs typeface="Courier New" panose="02070309020205020404" pitchFamily="49" charset="0"/>
-              </a:rPr>
-              <a:t> -X adroit.princeton.edu</a:t>
+              <a:rPr lang="en-US" dirty="0"/>
+              <a:t>Compiler</a:t>
+            </a:r>
+          </a:p>
+          <a:p>
+            <a:pPr lvl="1">
+              <a:lnSpc>
+                <a:spcPct val="150000"/>
+              </a:lnSpc>
+            </a:pPr>
+            <a:r>
+              <a:rPr lang="en-US" dirty="0"/>
+              <a:t>Compiler options</a:t>
+            </a:r>
+          </a:p>
+          <a:p>
+            <a:pPr lvl="1">
+              <a:lnSpc>
+                <a:spcPct val="150000"/>
+              </a:lnSpc>
+            </a:pPr>
+            <a:r>
+              <a:rPr lang="en-US" dirty="0"/>
+              <a:t>Debug/Release builds</a:t>
             </a:r>
           </a:p>
           <a:p>
@@ -4460,114 +4457,15 @@
             </a:pPr>
             <a:r>
               <a:rPr lang="en-US" dirty="0"/>
-              <a:t>Download the C++ code</a:t>
-            </a:r>
-          </a:p>
-          <a:p>
-            <a:pPr lvl="1">
-              <a:lnSpc>
-                <a:spcPct val="150000"/>
-              </a:lnSpc>
-            </a:pPr>
-            <a:r>
-              <a:rPr lang="pt-BR" sz="1800" dirty="0">
-                <a:latin typeface="Courier New" panose="02070309020205020404" pitchFamily="49" charset="0"/>
-                <a:cs typeface="Courier New" panose="02070309020205020404" pitchFamily="49" charset="0"/>
-              </a:rPr>
-              <a:t>curl -L -o cpp_debug.zip https://tinyurl.com/y3k73w6y</a:t>
-            </a:r>
-            <a:endParaRPr lang="en-US" sz="1800" dirty="0">
-              <a:latin typeface="Courier New" panose="02070309020205020404" pitchFamily="49" charset="0"/>
-              <a:cs typeface="Courier New" panose="02070309020205020404" pitchFamily="49" charset="0"/>
-            </a:endParaRPr>
-          </a:p>
-          <a:p>
-            <a:pPr lvl="1">
-              <a:lnSpc>
-                <a:spcPct val="150000"/>
-              </a:lnSpc>
-            </a:pPr>
-            <a:r>
-              <a:rPr lang="en-US" dirty="0">
-                <a:latin typeface="Courier New" panose="02070309020205020404" pitchFamily="49" charset="0"/>
-                <a:cs typeface="Courier New" panose="02070309020205020404" pitchFamily="49" charset="0"/>
-              </a:rPr>
-              <a:t>unzip </a:t>
-            </a:r>
-            <a:r>
-              <a:rPr lang="en-US" dirty="0" err="1">
-                <a:latin typeface="Courier New" panose="02070309020205020404" pitchFamily="49" charset="0"/>
-                <a:cs typeface="Courier New" panose="02070309020205020404" pitchFamily="49" charset="0"/>
-              </a:rPr>
-              <a:t>cpp</a:t>
-            </a:r>
-            <a:r>
-              <a:rPr lang="en-US" dirty="0">
-                <a:latin typeface="Courier New" panose="02070309020205020404" pitchFamily="49" charset="0"/>
-                <a:cs typeface="Courier New" panose="02070309020205020404" pitchFamily="49" charset="0"/>
-              </a:rPr>
-              <a:t>_</a:t>
-            </a:r>
-            <a:r>
-              <a:rPr lang="pt-BR" dirty="0">
-                <a:latin typeface="Courier New" panose="02070309020205020404" pitchFamily="49" charset="0"/>
-                <a:cs typeface="Courier New" panose="02070309020205020404" pitchFamily="49" charset="0"/>
-              </a:rPr>
-              <a:t>debug</a:t>
-            </a:r>
-            <a:r>
-              <a:rPr lang="en-US" dirty="0">
-                <a:latin typeface="Courier New" panose="02070309020205020404" pitchFamily="49" charset="0"/>
-                <a:cs typeface="Courier New" panose="02070309020205020404" pitchFamily="49" charset="0"/>
-              </a:rPr>
-              <a:t>.zip </a:t>
-            </a:r>
-          </a:p>
-          <a:p>
-            <a:pPr lvl="1">
-              <a:lnSpc>
-                <a:spcPct val="150000"/>
-              </a:lnSpc>
-            </a:pPr>
-            <a:r>
-              <a:rPr lang="en-US" dirty="0">
-                <a:latin typeface="Courier New" panose="02070309020205020404" pitchFamily="49" charset="0"/>
-                <a:cs typeface="Courier New" panose="02070309020205020404" pitchFamily="49" charset="0"/>
-              </a:rPr>
-              <a:t>cd </a:t>
-            </a:r>
-            <a:r>
-              <a:rPr lang="en-US" dirty="0" err="1">
-                <a:latin typeface="Courier New" panose="02070309020205020404" pitchFamily="49" charset="0"/>
-                <a:cs typeface="Courier New" panose="02070309020205020404" pitchFamily="49" charset="0"/>
-              </a:rPr>
-              <a:t>cpp</a:t>
-            </a:r>
-            <a:r>
-              <a:rPr lang="en-US" dirty="0">
-                <a:latin typeface="Courier New" panose="02070309020205020404" pitchFamily="49" charset="0"/>
-                <a:cs typeface="Courier New" panose="02070309020205020404" pitchFamily="49" charset="0"/>
-              </a:rPr>
-              <a:t>_</a:t>
-            </a:r>
-            <a:r>
-              <a:rPr lang="pt-BR" dirty="0">
-                <a:latin typeface="Courier New" panose="02070309020205020404" pitchFamily="49" charset="0"/>
-                <a:cs typeface="Courier New" panose="02070309020205020404" pitchFamily="49" charset="0"/>
-              </a:rPr>
-              <a:t>debug</a:t>
-            </a:r>
-            <a:endParaRPr lang="en-US" dirty="0">
-              <a:latin typeface="Courier New" panose="02070309020205020404" pitchFamily="49" charset="0"/>
-              <a:cs typeface="Courier New" panose="02070309020205020404" pitchFamily="49" charset="0"/>
-            </a:endParaRPr>
+              <a:t>Errors messages can be less obvious </a:t>
+            </a:r>
           </a:p>
         </p:txBody>
       </p:sp>
     </p:spTree>
     <p:extLst>
       <p:ext uri="{BB962C8B-B14F-4D97-AF65-F5344CB8AC3E}">
-        <p14:creationId xmlns:p14="http://schemas.microsoft.com/office/powerpoint/2010/main" val="1010424374"/>
+        <p14:creationId xmlns:p14="http://schemas.microsoft.com/office/powerpoint/2010/main" val="237925523"/>
       </p:ext>
     </p:extLst>
   </p:cSld>
@@ -4599,7 +4497,7 @@
           <p:cNvPr id="2" name="Title 1">
             <a:extLst>
               <a:ext uri="{FF2B5EF4-FFF2-40B4-BE49-F238E27FC236}">
-                <a16:creationId xmlns:a16="http://schemas.microsoft.com/office/drawing/2014/main" id="{0A2DA531-92ED-4623-A4B8-90CE8F756834}"/>
+                <a16:creationId xmlns:a16="http://schemas.microsoft.com/office/drawing/2014/main" id="{E12BE167-F6C9-4FD8-AE90-A43FAAA42A07}"/>
               </a:ext>
             </a:extLst>
           </p:cNvPr>
@@ -4617,7 +4515,7 @@
           <a:p>
             <a:r>
               <a:rPr lang="en-US" dirty="0"/>
-              <a:t>Exercise 4 : C++ Compile and Run </a:t>
+              <a:t>Exercise 4 : C++ Setup</a:t>
             </a:r>
           </a:p>
         </p:txBody>
@@ -4627,7 +4525,7 @@
           <p:cNvPr id="3" name="Content Placeholder 2">
             <a:extLst>
               <a:ext uri="{FF2B5EF4-FFF2-40B4-BE49-F238E27FC236}">
-                <a16:creationId xmlns:a16="http://schemas.microsoft.com/office/drawing/2014/main" id="{D1BF4B0F-0AD3-470A-B163-9EDCD95D5A97}"/>
+                <a16:creationId xmlns:a16="http://schemas.microsoft.com/office/drawing/2014/main" id="{6D93E6B7-65B4-4005-895B-4CD959210943}"/>
               </a:ext>
             </a:extLst>
           </p:cNvPr>
@@ -4638,10 +4536,15 @@
             <p:ph idx="1"/>
           </p:nvPr>
         </p:nvSpPr>
-        <p:spPr/>
+        <p:spPr>
+          <a:xfrm>
+            <a:off x="211015" y="1825625"/>
+            <a:ext cx="8745415" cy="4351338"/>
+          </a:xfrm>
+        </p:spPr>
         <p:txBody>
           <a:bodyPr>
-            <a:normAutofit fontScale="92500" lnSpcReduction="20000"/>
+            <a:normAutofit/>
           </a:bodyPr>
           <a:lstStyle/>
           <a:p>
@@ -4652,7 +4555,7 @@
             </a:pPr>
             <a:r>
               <a:rPr lang="en-US" dirty="0"/>
-              <a:t>Compile the code</a:t>
+              <a:t>Log onto Adroit </a:t>
             </a:r>
           </a:p>
           <a:p>
@@ -4661,23 +4564,90 @@
                 <a:spcPct val="150000"/>
               </a:lnSpc>
             </a:pPr>
+            <a:r>
+              <a:rPr lang="en-US" dirty="0" err="1">
+                <a:latin typeface="Courier New" panose="02070309020205020404" pitchFamily="49" charset="0"/>
+                <a:cs typeface="Courier New" panose="02070309020205020404" pitchFamily="49" charset="0"/>
+              </a:rPr>
+              <a:t>ssh</a:t>
+            </a:r>
+            <a:r>
+              <a:rPr lang="en-US" dirty="0">
+                <a:latin typeface="Courier New" panose="02070309020205020404" pitchFamily="49" charset="0"/>
+                <a:cs typeface="Courier New" panose="02070309020205020404" pitchFamily="49" charset="0"/>
+              </a:rPr>
+              <a:t> -X adroit.princeton.edu</a:t>
+            </a:r>
+          </a:p>
+          <a:p>
+            <a:pPr>
+              <a:lnSpc>
+                <a:spcPct val="150000"/>
+              </a:lnSpc>
+            </a:pPr>
+            <a:r>
+              <a:rPr lang="en-US" dirty="0"/>
+              <a:t>Download the C++ code</a:t>
+            </a:r>
+          </a:p>
+          <a:p>
+            <a:pPr lvl="1">
+              <a:lnSpc>
+                <a:spcPct val="150000"/>
+              </a:lnSpc>
+            </a:pPr>
+            <a:r>
+              <a:rPr lang="pt-BR" sz="1800" dirty="0">
+                <a:latin typeface="Courier New" panose="02070309020205020404" pitchFamily="49" charset="0"/>
+                <a:cs typeface="Courier New" panose="02070309020205020404" pitchFamily="49" charset="0"/>
+              </a:rPr>
+              <a:t>curl -L -o cpp_debug.zip https://tinyurl.com/y3k73w6y</a:t>
+            </a:r>
+            <a:endParaRPr lang="en-US" sz="1800" dirty="0">
+              <a:latin typeface="Courier New" panose="02070309020205020404" pitchFamily="49" charset="0"/>
+              <a:cs typeface="Courier New" panose="02070309020205020404" pitchFamily="49" charset="0"/>
+            </a:endParaRPr>
+          </a:p>
+          <a:p>
+            <a:pPr lvl="1">
+              <a:lnSpc>
+                <a:spcPct val="150000"/>
+              </a:lnSpc>
+            </a:pPr>
+            <a:r>
+              <a:rPr lang="en-US" dirty="0">
+                <a:latin typeface="Courier New" panose="02070309020205020404" pitchFamily="49" charset="0"/>
+                <a:cs typeface="Courier New" panose="02070309020205020404" pitchFamily="49" charset="0"/>
+              </a:rPr>
+              <a:t>unzip </a:t>
+            </a:r>
+            <a:r>
+              <a:rPr lang="en-US" dirty="0" err="1">
+                <a:latin typeface="Courier New" panose="02070309020205020404" pitchFamily="49" charset="0"/>
+                <a:cs typeface="Courier New" panose="02070309020205020404" pitchFamily="49" charset="0"/>
+              </a:rPr>
+              <a:t>cpp</a:t>
+            </a:r>
+            <a:r>
+              <a:rPr lang="en-US" dirty="0">
+                <a:latin typeface="Courier New" panose="02070309020205020404" pitchFamily="49" charset="0"/>
+                <a:cs typeface="Courier New" panose="02070309020205020404" pitchFamily="49" charset="0"/>
+              </a:rPr>
+              <a:t>_</a:t>
+            </a:r>
             <a:r>
               <a:rPr lang="pt-BR" dirty="0">
                 <a:latin typeface="Courier New" panose="02070309020205020404" pitchFamily="49" charset="0"/>
                 <a:cs typeface="Courier New" panose="02070309020205020404" pitchFamily="49" charset="0"/>
               </a:rPr>
-              <a:t>g++ -g -O0 -o serial_cpp serial.cpp</a:t>
-            </a:r>
-          </a:p>
-          <a:p>
-            <a:pPr>
-              <a:lnSpc>
-                <a:spcPct val="150000"/>
-              </a:lnSpc>
-            </a:pPr>
-            <a:r>
-              <a:rPr lang="pt-BR" dirty="0"/>
-              <a:t>Request a task node on Adroit</a:t>
+              <a:t>debug</a:t>
+            </a:r>
+            <a:r>
+              <a:rPr lang="en-US" dirty="0">
+                <a:latin typeface="Courier New" panose="02070309020205020404" pitchFamily="49" charset="0"/>
+                <a:cs typeface="Courier New" panose="02070309020205020404" pitchFamily="49" charset="0"/>
+              </a:rPr>
+              <a:t>.zip </a:t>
             </a:r>
           </a:p>
           <a:p>
@@ -4686,86 +4656,33 @@
                 <a:spcPct val="150000"/>
               </a:lnSpc>
             </a:pPr>
+            <a:r>
+              <a:rPr lang="en-US" dirty="0">
+                <a:latin typeface="Courier New" panose="02070309020205020404" pitchFamily="49" charset="0"/>
+                <a:cs typeface="Courier New" panose="02070309020205020404" pitchFamily="49" charset="0"/>
+              </a:rPr>
+              <a:t>cd </a:t>
+            </a:r>
             <a:r>
               <a:rPr lang="en-US" dirty="0" err="1">
                 <a:latin typeface="Courier New" panose="02070309020205020404" pitchFamily="49" charset="0"/>
                 <a:cs typeface="Courier New" panose="02070309020205020404" pitchFamily="49" charset="0"/>
               </a:rPr>
-              <a:t>salloc</a:t>
+              <a:t>cpp</a:t>
             </a:r>
             <a:r>
               <a:rPr lang="en-US" dirty="0">
                 <a:latin typeface="Courier New" panose="02070309020205020404" pitchFamily="49" charset="0"/>
                 <a:cs typeface="Courier New" panose="02070309020205020404" pitchFamily="49" charset="0"/>
               </a:rPr>
-              <a:t> --nodes=1 --</a:t>
-            </a:r>
-            <a:r>
-              <a:rPr lang="en-US" dirty="0" err="1">
+              <a:t>_</a:t>
+            </a:r>
+            <a:r>
+              <a:rPr lang="pt-BR" dirty="0">
                 <a:latin typeface="Courier New" panose="02070309020205020404" pitchFamily="49" charset="0"/>
                 <a:cs typeface="Courier New" panose="02070309020205020404" pitchFamily="49" charset="0"/>
               </a:rPr>
-              <a:t>ntasks</a:t>
-            </a:r>
-            <a:r>
-              <a:rPr lang="en-US" dirty="0">
-                <a:latin typeface="Courier New" panose="02070309020205020404" pitchFamily="49" charset="0"/>
-                <a:cs typeface="Courier New" panose="02070309020205020404" pitchFamily="49" charset="0"/>
-              </a:rPr>
-              <a:t>=1 --time=05:00 --x11</a:t>
-            </a:r>
-          </a:p>
-          <a:p>
-            <a:pPr>
-              <a:lnSpc>
-                <a:spcPct val="150000"/>
-              </a:lnSpc>
-            </a:pPr>
-            <a:r>
-              <a:rPr lang="en-US" dirty="0"/>
-              <a:t>Load the Arm DDT debugger </a:t>
-            </a:r>
-          </a:p>
-          <a:p>
-            <a:pPr lvl="1">
-              <a:lnSpc>
-                <a:spcPct val="150000"/>
-              </a:lnSpc>
-            </a:pPr>
-            <a:r>
-              <a:rPr lang="en-US" dirty="0">
-                <a:latin typeface="Courier New" panose="02070309020205020404" pitchFamily="49" charset="0"/>
-                <a:cs typeface="Courier New" panose="02070309020205020404" pitchFamily="49" charset="0"/>
-              </a:rPr>
-              <a:t>module load </a:t>
-            </a:r>
-            <a:r>
-              <a:rPr lang="en-US" dirty="0" err="1">
-                <a:latin typeface="Courier New" panose="02070309020205020404" pitchFamily="49" charset="0"/>
-                <a:cs typeface="Courier New" panose="02070309020205020404" pitchFamily="49" charset="0"/>
-              </a:rPr>
-              <a:t>ddt</a:t>
-            </a:r>
-            <a:r>
-              <a:rPr lang="en-US" dirty="0">
-                <a:latin typeface="Courier New" panose="02070309020205020404" pitchFamily="49" charset="0"/>
-                <a:cs typeface="Courier New" panose="02070309020205020404" pitchFamily="49" charset="0"/>
-              </a:rPr>
-              <a:t>/20.0.1</a:t>
-            </a:r>
-          </a:p>
-          <a:p>
-            <a:pPr lvl="1">
-              <a:lnSpc>
-                <a:spcPct val="150000"/>
-              </a:lnSpc>
-            </a:pPr>
-            <a:r>
-              <a:rPr lang="en-US" dirty="0" err="1">
-                <a:latin typeface="Courier New" panose="02070309020205020404" pitchFamily="49" charset="0"/>
-                <a:cs typeface="Courier New" panose="02070309020205020404" pitchFamily="49" charset="0"/>
-              </a:rPr>
-              <a:t>ddt</a:t>
+              <a:t>debug</a:t>
             </a:r>
             <a:endParaRPr lang="en-US" dirty="0">
               <a:latin typeface="Courier New" panose="02070309020205020404" pitchFamily="49" charset="0"/>
@@ -4777,7 +4694,7 @@
     </p:spTree>
     <p:extLst>
       <p:ext uri="{BB962C8B-B14F-4D97-AF65-F5344CB8AC3E}">
-        <p14:creationId xmlns:p14="http://schemas.microsoft.com/office/powerpoint/2010/main" val="3956143696"/>
+        <p14:creationId xmlns:p14="http://schemas.microsoft.com/office/powerpoint/2010/main" val="1010424374"/>
       </p:ext>
     </p:extLst>
   </p:cSld>
@@ -4958,6 +4875,216 @@
     <p:extLst>
       <p:ext uri="{BB962C8B-B14F-4D97-AF65-F5344CB8AC3E}">
         <p14:creationId xmlns:p14="http://schemas.microsoft.com/office/powerpoint/2010/main" val="1628838780"/>
+      </p:ext>
+    </p:extLst>
+  </p:cSld>
+  <p:clrMapOvr>
+    <a:masterClrMapping/>
+  </p:clrMapOvr>
+</p:sld>
+</file>
+
+<file path=ppt/slides/slide20.xml><?xml version="1.0" encoding="utf-8"?>
+<p:sld xmlns:a="http://schemas.openxmlformats.org/drawingml/2006/main" xmlns:r="http://schemas.openxmlformats.org/officeDocument/2006/relationships" xmlns:p="http://schemas.openxmlformats.org/presentationml/2006/main" show="0">
+  <p:cSld>
+    <p:spTree>
+      <p:nvGrpSpPr>
+        <p:cNvPr id="1" name=""/>
+        <p:cNvGrpSpPr/>
+        <p:nvPr/>
+      </p:nvGrpSpPr>
+      <p:grpSpPr>
+        <a:xfrm>
+          <a:off x="0" y="0"/>
+          <a:ext cx="0" cy="0"/>
+          <a:chOff x="0" y="0"/>
+          <a:chExt cx="0" cy="0"/>
+        </a:xfrm>
+      </p:grpSpPr>
+      <p:sp>
+        <p:nvSpPr>
+          <p:cNvPr id="2" name="Title 1">
+            <a:extLst>
+              <a:ext uri="{FF2B5EF4-FFF2-40B4-BE49-F238E27FC236}">
+                <a16:creationId xmlns:a16="http://schemas.microsoft.com/office/drawing/2014/main" id="{0A2DA531-92ED-4623-A4B8-90CE8F756834}"/>
+              </a:ext>
+            </a:extLst>
+          </p:cNvPr>
+          <p:cNvSpPr>
+            <a:spLocks noGrp="1"/>
+          </p:cNvSpPr>
+          <p:nvPr>
+            <p:ph type="title"/>
+          </p:nvPr>
+        </p:nvSpPr>
+        <p:spPr/>
+        <p:txBody>
+          <a:bodyPr/>
+          <a:lstStyle/>
+          <a:p>
+            <a:r>
+              <a:rPr lang="en-US" dirty="0"/>
+              <a:t>Exercise 4 : C++ Compile and Run </a:t>
+            </a:r>
+          </a:p>
+        </p:txBody>
+      </p:sp>
+      <p:sp>
+        <p:nvSpPr>
+          <p:cNvPr id="3" name="Content Placeholder 2">
+            <a:extLst>
+              <a:ext uri="{FF2B5EF4-FFF2-40B4-BE49-F238E27FC236}">
+                <a16:creationId xmlns:a16="http://schemas.microsoft.com/office/drawing/2014/main" id="{D1BF4B0F-0AD3-470A-B163-9EDCD95D5A97}"/>
+              </a:ext>
+            </a:extLst>
+          </p:cNvPr>
+          <p:cNvSpPr>
+            <a:spLocks noGrp="1"/>
+          </p:cNvSpPr>
+          <p:nvPr>
+            <p:ph idx="1"/>
+          </p:nvPr>
+        </p:nvSpPr>
+        <p:spPr/>
+        <p:txBody>
+          <a:bodyPr>
+            <a:normAutofit fontScale="92500" lnSpcReduction="20000"/>
+          </a:bodyPr>
+          <a:lstStyle/>
+          <a:p>
+            <a:pPr>
+              <a:lnSpc>
+                <a:spcPct val="150000"/>
+              </a:lnSpc>
+            </a:pPr>
+            <a:r>
+              <a:rPr lang="en-US" dirty="0"/>
+              <a:t>Compile the code</a:t>
+            </a:r>
+          </a:p>
+          <a:p>
+            <a:pPr lvl="1">
+              <a:lnSpc>
+                <a:spcPct val="150000"/>
+              </a:lnSpc>
+            </a:pPr>
+            <a:r>
+              <a:rPr lang="pt-BR" dirty="0">
+                <a:latin typeface="Courier New" panose="02070309020205020404" pitchFamily="49" charset="0"/>
+                <a:cs typeface="Courier New" panose="02070309020205020404" pitchFamily="49" charset="0"/>
+              </a:rPr>
+              <a:t>g++ -g -O0 -o serial_cpp serial.cpp</a:t>
+            </a:r>
+          </a:p>
+          <a:p>
+            <a:pPr>
+              <a:lnSpc>
+                <a:spcPct val="150000"/>
+              </a:lnSpc>
+            </a:pPr>
+            <a:r>
+              <a:rPr lang="pt-BR" dirty="0"/>
+              <a:t>Request a task node on Adroit</a:t>
+            </a:r>
+          </a:p>
+          <a:p>
+            <a:pPr lvl="1">
+              <a:lnSpc>
+                <a:spcPct val="150000"/>
+              </a:lnSpc>
+            </a:pPr>
+            <a:r>
+              <a:rPr lang="en-US" dirty="0" err="1">
+                <a:latin typeface="Courier New" panose="02070309020205020404" pitchFamily="49" charset="0"/>
+                <a:cs typeface="Courier New" panose="02070309020205020404" pitchFamily="49" charset="0"/>
+              </a:rPr>
+              <a:t>salloc</a:t>
+            </a:r>
+            <a:r>
+              <a:rPr lang="en-US" dirty="0">
+                <a:latin typeface="Courier New" panose="02070309020205020404" pitchFamily="49" charset="0"/>
+                <a:cs typeface="Courier New" panose="02070309020205020404" pitchFamily="49" charset="0"/>
+              </a:rPr>
+              <a:t> --nodes=1 --</a:t>
+            </a:r>
+            <a:r>
+              <a:rPr lang="en-US" dirty="0" err="1">
+                <a:latin typeface="Courier New" panose="02070309020205020404" pitchFamily="49" charset="0"/>
+                <a:cs typeface="Courier New" panose="02070309020205020404" pitchFamily="49" charset="0"/>
+              </a:rPr>
+              <a:t>ntasks</a:t>
+            </a:r>
+            <a:r>
+              <a:rPr lang="en-US" dirty="0">
+                <a:latin typeface="Courier New" panose="02070309020205020404" pitchFamily="49" charset="0"/>
+                <a:cs typeface="Courier New" panose="02070309020205020404" pitchFamily="49" charset="0"/>
+              </a:rPr>
+              <a:t>=1 --time=05:00 --x11</a:t>
+            </a:r>
+          </a:p>
+          <a:p>
+            <a:pPr>
+              <a:lnSpc>
+                <a:spcPct val="150000"/>
+              </a:lnSpc>
+            </a:pPr>
+            <a:r>
+              <a:rPr lang="en-US" dirty="0"/>
+              <a:t>Load the Arm DDT debugger </a:t>
+            </a:r>
+          </a:p>
+          <a:p>
+            <a:pPr lvl="1">
+              <a:lnSpc>
+                <a:spcPct val="150000"/>
+              </a:lnSpc>
+            </a:pPr>
+            <a:r>
+              <a:rPr lang="en-US" dirty="0">
+                <a:latin typeface="Courier New" panose="02070309020205020404" pitchFamily="49" charset="0"/>
+                <a:cs typeface="Courier New" panose="02070309020205020404" pitchFamily="49" charset="0"/>
+              </a:rPr>
+              <a:t>module load </a:t>
+            </a:r>
+            <a:r>
+              <a:rPr lang="en-US" dirty="0" err="1">
+                <a:latin typeface="Courier New" panose="02070309020205020404" pitchFamily="49" charset="0"/>
+                <a:cs typeface="Courier New" panose="02070309020205020404" pitchFamily="49" charset="0"/>
+              </a:rPr>
+              <a:t>ddt</a:t>
+            </a:r>
+            <a:r>
+              <a:rPr lang="en-US" dirty="0">
+                <a:latin typeface="Courier New" panose="02070309020205020404" pitchFamily="49" charset="0"/>
+                <a:cs typeface="Courier New" panose="02070309020205020404" pitchFamily="49" charset="0"/>
+              </a:rPr>
+              <a:t>/20.0.1</a:t>
+            </a:r>
+          </a:p>
+          <a:p>
+            <a:pPr lvl="1">
+              <a:lnSpc>
+                <a:spcPct val="150000"/>
+              </a:lnSpc>
+            </a:pPr>
+            <a:r>
+              <a:rPr lang="en-US" dirty="0" err="1">
+                <a:latin typeface="Courier New" panose="02070309020205020404" pitchFamily="49" charset="0"/>
+                <a:cs typeface="Courier New" panose="02070309020205020404" pitchFamily="49" charset="0"/>
+              </a:rPr>
+              <a:t>ddt</a:t>
+            </a:r>
+            <a:endParaRPr lang="en-US" dirty="0">
+              <a:latin typeface="Courier New" panose="02070309020205020404" pitchFamily="49" charset="0"/>
+              <a:cs typeface="Courier New" panose="02070309020205020404" pitchFamily="49" charset="0"/>
+            </a:endParaRPr>
+          </a:p>
+        </p:txBody>
+      </p:sp>
+    </p:spTree>
+    <p:extLst>
+      <p:ext uri="{BB962C8B-B14F-4D97-AF65-F5344CB8AC3E}">
+        <p14:creationId xmlns:p14="http://schemas.microsoft.com/office/powerpoint/2010/main" val="3956143696"/>
       </p:ext>
     </p:extLst>
   </p:cSld>

</xml_diff>

<commit_message>
Better conditional breakpoint example.
</commit_message>
<xml_diff>
--- a/01_overview/Introduction_To_Debugging.pptx
+++ b/01_overview/Introduction_To_Debugging.pptx
@@ -22,9 +22,10 @@
     <p:sldId id="262" r:id="rId16"/>
     <p:sldId id="277" r:id="rId17"/>
     <p:sldId id="278" r:id="rId18"/>
-    <p:sldId id="263" r:id="rId19"/>
-    <p:sldId id="265" r:id="rId20"/>
-    <p:sldId id="266" r:id="rId21"/>
+    <p:sldId id="279" r:id="rId19"/>
+    <p:sldId id="263" r:id="rId20"/>
+    <p:sldId id="265" r:id="rId21"/>
+    <p:sldId id="266" r:id="rId22"/>
   </p:sldIdLst>
   <p:sldSz cx="9144000" cy="6858000" type="screen4x3"/>
   <p:notesSz cx="6858000" cy="9144000"/>
@@ -2995,7 +2996,7 @@
           <a:lstStyle/>
           <a:p>
             <a:r>
-              <a:rPr lang="en-US" sz="1400" dirty="0"/>
+              <a:rPr lang="en-US" sz="1800" dirty="0"/>
               <a:t>Abhishek Biswas</a:t>
             </a:r>
           </a:p>
@@ -3016,26 +3017,20 @@
           </a:p>
           <a:p>
             <a:r>
-              <a:rPr lang="en-US" sz="1400" dirty="0" err="1"/>
+              <a:rPr lang="en-US" sz="1800" dirty="0" err="1"/>
               <a:t>Wintersession</a:t>
             </a:r>
             <a:r>
-              <a:rPr lang="en-US" sz="1400" dirty="0"/>
+              <a:rPr lang="en-US" sz="1800" dirty="0"/>
               <a:t> / </a:t>
             </a:r>
             <a:r>
-              <a:rPr lang="en-US" sz="1400" dirty="0" err="1"/>
+              <a:rPr lang="en-US" sz="1800" dirty="0" err="1"/>
               <a:t>PICSciE</a:t>
             </a:r>
             <a:r>
-              <a:rPr lang="en-US" sz="1400" dirty="0"/>
+              <a:rPr lang="en-US" sz="1800" dirty="0"/>
               <a:t> Training Workshops </a:t>
-            </a:r>
-          </a:p>
-          <a:p>
-            <a:r>
-              <a:rPr lang="en-US" sz="1400" dirty="0"/>
-              <a:t>January 2022</a:t>
             </a:r>
           </a:p>
           <a:p>
@@ -3221,15 +3216,7 @@
             </a:pPr>
             <a:r>
               <a:rPr lang="en-US" dirty="0"/>
-              <a:t>Figure out which of the 10000 </a:t>
-            </a:r>
-            <a:r>
-              <a:rPr lang="en-US" dirty="0" err="1"/>
-              <a:t>traingles</a:t>
-            </a:r>
-            <a:r>
-              <a:rPr lang="en-US" dirty="0"/>
-              <a:t> is failing!</a:t>
+              <a:t>Figure out which of the 10000 triangles is failing!</a:t>
             </a:r>
           </a:p>
         </p:txBody>
@@ -4317,7 +4304,7 @@
 </file>
 
 <file path=ppt/slides/slide18.xml><?xml version="1.0" encoding="utf-8"?>
-<p:sld xmlns:a="http://schemas.openxmlformats.org/drawingml/2006/main" xmlns:r="http://schemas.openxmlformats.org/officeDocument/2006/relationships" xmlns:p="http://schemas.openxmlformats.org/presentationml/2006/main" show="0">
+<p:sld xmlns:a="http://schemas.openxmlformats.org/drawingml/2006/main" xmlns:r="http://schemas.openxmlformats.org/officeDocument/2006/relationships" xmlns:p="http://schemas.openxmlformats.org/presentationml/2006/main">
   <p:cSld>
     <p:spTree>
       <p:nvGrpSpPr>
@@ -4335,10 +4322,10 @@
       </p:grpSpPr>
       <p:sp>
         <p:nvSpPr>
-          <p:cNvPr id="2" name="Title 1">
+          <p:cNvPr id="5" name="Title 4">
             <a:extLst>
               <a:ext uri="{FF2B5EF4-FFF2-40B4-BE49-F238E27FC236}">
-                <a16:creationId xmlns:a16="http://schemas.microsoft.com/office/drawing/2014/main" id="{8B1EB113-6772-47FD-B086-3D873CE8642B}"/>
+                <a16:creationId xmlns:a16="http://schemas.microsoft.com/office/drawing/2014/main" id="{B36DB535-B2B8-DD49-916C-2B38FCB0595F}"/>
               </a:ext>
             </a:extLst>
           </p:cNvPr>
@@ -4346,118 +4333,17 @@
             <a:spLocks noGrp="1"/>
           </p:cNvSpPr>
           <p:nvPr>
-            <p:ph type="title"/>
-          </p:nvPr>
-        </p:nvSpPr>
-        <p:spPr/>
-        <p:txBody>
-          <a:bodyPr/>
-          <a:lstStyle/>
-          <a:p>
-            <a:r>
-              <a:rPr lang="en-US" dirty="0"/>
-              <a:t>Handling C++</a:t>
-            </a:r>
-          </a:p>
-        </p:txBody>
-      </p:sp>
-      <p:sp>
-        <p:nvSpPr>
-          <p:cNvPr id="3" name="Content Placeholder 2">
-            <a:extLst>
-              <a:ext uri="{FF2B5EF4-FFF2-40B4-BE49-F238E27FC236}">
-                <a16:creationId xmlns:a16="http://schemas.microsoft.com/office/drawing/2014/main" id="{39D54DE9-CBB0-4FEC-AB4C-2C31E7FAC625}"/>
-              </a:ext>
-            </a:extLst>
-          </p:cNvPr>
-          <p:cNvSpPr>
-            <a:spLocks noGrp="1"/>
-          </p:cNvSpPr>
-          <p:nvPr>
-            <p:ph idx="1"/>
-          </p:nvPr>
-        </p:nvSpPr>
-        <p:spPr/>
-        <p:txBody>
-          <a:bodyPr>
-            <a:normAutofit fontScale="92500" lnSpcReduction="10000"/>
-          </a:bodyPr>
-          <a:lstStyle/>
-          <a:p>
-            <a:pPr>
-              <a:lnSpc>
-                <a:spcPct val="150000"/>
-              </a:lnSpc>
-            </a:pPr>
-            <a:r>
-              <a:rPr lang="en-US" dirty="0"/>
-              <a:t>C++ is somewhat different because it is compiled </a:t>
-            </a:r>
-          </a:p>
-          <a:p>
-            <a:pPr>
-              <a:lnSpc>
-                <a:spcPct val="150000"/>
-              </a:lnSpc>
-            </a:pPr>
-            <a:r>
-              <a:rPr lang="en-US" dirty="0"/>
-              <a:t>Some errors are found much earlier </a:t>
-            </a:r>
-          </a:p>
-          <a:p>
-            <a:pPr>
-              <a:lnSpc>
-                <a:spcPct val="150000"/>
-              </a:lnSpc>
-            </a:pPr>
-            <a:r>
-              <a:rPr lang="en-US" dirty="0"/>
-              <a:t>The build process needs to be setup</a:t>
-            </a:r>
-          </a:p>
-          <a:p>
-            <a:pPr lvl="1">
-              <a:lnSpc>
-                <a:spcPct val="150000"/>
-              </a:lnSpc>
-            </a:pPr>
-            <a:r>
-              <a:rPr lang="en-US" dirty="0"/>
-              <a:t>Compiler</a:t>
-            </a:r>
-          </a:p>
-          <a:p>
-            <a:pPr lvl="1">
-              <a:lnSpc>
-                <a:spcPct val="150000"/>
-              </a:lnSpc>
-            </a:pPr>
-            <a:r>
-              <a:rPr lang="en-US" dirty="0"/>
-              <a:t>Compiler options</a:t>
-            </a:r>
-          </a:p>
-          <a:p>
-            <a:pPr lvl="1">
-              <a:lnSpc>
-                <a:spcPct val="150000"/>
-              </a:lnSpc>
-            </a:pPr>
-            <a:r>
-              <a:rPr lang="en-US" dirty="0"/>
-              <a:t>Debug/Release builds</a:t>
-            </a:r>
-          </a:p>
-          <a:p>
-            <a:pPr>
-              <a:lnSpc>
-                <a:spcPct val="150000"/>
-              </a:lnSpc>
-            </a:pPr>
-            <a:r>
-              <a:rPr lang="en-US" dirty="0"/>
-              <a:t>Errors messages can be less obvious </a:t>
+            <p:ph type="ctrTitle"/>
+          </p:nvPr>
+        </p:nvSpPr>
+        <p:spPr/>
+        <p:txBody>
+          <a:bodyPr/>
+          <a:lstStyle/>
+          <a:p>
+            <a:r>
+              <a:rPr lang="en-US" dirty="0"/>
+              <a:t>Have a great weekend!</a:t>
             </a:r>
           </a:p>
         </p:txBody>
@@ -4465,7 +4351,7 @@
     </p:spTree>
     <p:extLst>
       <p:ext uri="{BB962C8B-B14F-4D97-AF65-F5344CB8AC3E}">
-        <p14:creationId xmlns:p14="http://schemas.microsoft.com/office/powerpoint/2010/main" val="237925523"/>
+        <p14:creationId xmlns:p14="http://schemas.microsoft.com/office/powerpoint/2010/main" val="3182097241"/>
       </p:ext>
     </p:extLst>
   </p:cSld>
@@ -4497,7 +4383,7 @@
           <p:cNvPr id="2" name="Title 1">
             <a:extLst>
               <a:ext uri="{FF2B5EF4-FFF2-40B4-BE49-F238E27FC236}">
-                <a16:creationId xmlns:a16="http://schemas.microsoft.com/office/drawing/2014/main" id="{E12BE167-F6C9-4FD8-AE90-A43FAAA42A07}"/>
+                <a16:creationId xmlns:a16="http://schemas.microsoft.com/office/drawing/2014/main" id="{8B1EB113-6772-47FD-B086-3D873CE8642B}"/>
               </a:ext>
             </a:extLst>
           </p:cNvPr>
@@ -4515,7 +4401,7 @@
           <a:p>
             <a:r>
               <a:rPr lang="en-US" dirty="0"/>
-              <a:t>Exercise 4 : C++ Setup</a:t>
+              <a:t>Handling C++</a:t>
             </a:r>
           </a:p>
         </p:txBody>
@@ -4525,7 +4411,7 @@
           <p:cNvPr id="3" name="Content Placeholder 2">
             <a:extLst>
               <a:ext uri="{FF2B5EF4-FFF2-40B4-BE49-F238E27FC236}">
-                <a16:creationId xmlns:a16="http://schemas.microsoft.com/office/drawing/2014/main" id="{6D93E6B7-65B4-4005-895B-4CD959210943}"/>
+                <a16:creationId xmlns:a16="http://schemas.microsoft.com/office/drawing/2014/main" id="{39D54DE9-CBB0-4FEC-AB4C-2C31E7FAC625}"/>
               </a:ext>
             </a:extLst>
           </p:cNvPr>
@@ -4536,15 +4422,10 @@
             <p:ph idx="1"/>
           </p:nvPr>
         </p:nvSpPr>
-        <p:spPr>
-          <a:xfrm>
-            <a:off x="211015" y="1825625"/>
-            <a:ext cx="8745415" cy="4351338"/>
-          </a:xfrm>
-        </p:spPr>
+        <p:spPr/>
         <p:txBody>
           <a:bodyPr>
-            <a:normAutofit/>
+            <a:normAutofit fontScale="92500" lnSpcReduction="10000"/>
           </a:bodyPr>
           <a:lstStyle/>
           <a:p>
@@ -4555,7 +4436,29 @@
             </a:pPr>
             <a:r>
               <a:rPr lang="en-US" dirty="0"/>
-              <a:t>Log onto Adroit </a:t>
+              <a:t>C++ is somewhat different because it is compiled </a:t>
+            </a:r>
+          </a:p>
+          <a:p>
+            <a:pPr>
+              <a:lnSpc>
+                <a:spcPct val="150000"/>
+              </a:lnSpc>
+            </a:pPr>
+            <a:r>
+              <a:rPr lang="en-US" dirty="0"/>
+              <a:t>Some errors are found much earlier </a:t>
+            </a:r>
+          </a:p>
+          <a:p>
+            <a:pPr>
+              <a:lnSpc>
+                <a:spcPct val="150000"/>
+              </a:lnSpc>
+            </a:pPr>
+            <a:r>
+              <a:rPr lang="en-US" dirty="0"/>
+              <a:t>The build process needs to be setup</a:t>
             </a:r>
           </a:p>
           <a:p>
@@ -4565,18 +4468,30 @@
               </a:lnSpc>
             </a:pPr>
             <a:r>
-              <a:rPr lang="en-US" dirty="0" err="1">
-                <a:latin typeface="Courier New" panose="02070309020205020404" pitchFamily="49" charset="0"/>
-                <a:cs typeface="Courier New" panose="02070309020205020404" pitchFamily="49" charset="0"/>
-              </a:rPr>
-              <a:t>ssh</a:t>
-            </a:r>
-            <a:r>
-              <a:rPr lang="en-US" dirty="0">
-                <a:latin typeface="Courier New" panose="02070309020205020404" pitchFamily="49" charset="0"/>
-                <a:cs typeface="Courier New" panose="02070309020205020404" pitchFamily="49" charset="0"/>
-              </a:rPr>
-              <a:t> -X adroit.princeton.edu</a:t>
+              <a:rPr lang="en-US" dirty="0"/>
+              <a:t>Compiler</a:t>
+            </a:r>
+          </a:p>
+          <a:p>
+            <a:pPr lvl="1">
+              <a:lnSpc>
+                <a:spcPct val="150000"/>
+              </a:lnSpc>
+            </a:pPr>
+            <a:r>
+              <a:rPr lang="en-US" dirty="0"/>
+              <a:t>Compiler options</a:t>
+            </a:r>
+          </a:p>
+          <a:p>
+            <a:pPr lvl="1">
+              <a:lnSpc>
+                <a:spcPct val="150000"/>
+              </a:lnSpc>
+            </a:pPr>
+            <a:r>
+              <a:rPr lang="en-US" dirty="0"/>
+              <a:t>Debug/Release builds</a:t>
             </a:r>
           </a:p>
           <a:p>
@@ -4587,114 +4502,15 @@
             </a:pPr>
             <a:r>
               <a:rPr lang="en-US" dirty="0"/>
-              <a:t>Download the C++ code</a:t>
-            </a:r>
-          </a:p>
-          <a:p>
-            <a:pPr lvl="1">
-              <a:lnSpc>
-                <a:spcPct val="150000"/>
-              </a:lnSpc>
-            </a:pPr>
-            <a:r>
-              <a:rPr lang="pt-BR" sz="1800" dirty="0">
-                <a:latin typeface="Courier New" panose="02070309020205020404" pitchFamily="49" charset="0"/>
-                <a:cs typeface="Courier New" panose="02070309020205020404" pitchFamily="49" charset="0"/>
-              </a:rPr>
-              <a:t>curl -L -o cpp_debug.zip https://tinyurl.com/y3k73w6y</a:t>
-            </a:r>
-            <a:endParaRPr lang="en-US" sz="1800" dirty="0">
-              <a:latin typeface="Courier New" panose="02070309020205020404" pitchFamily="49" charset="0"/>
-              <a:cs typeface="Courier New" panose="02070309020205020404" pitchFamily="49" charset="0"/>
-            </a:endParaRPr>
-          </a:p>
-          <a:p>
-            <a:pPr lvl="1">
-              <a:lnSpc>
-                <a:spcPct val="150000"/>
-              </a:lnSpc>
-            </a:pPr>
-            <a:r>
-              <a:rPr lang="en-US" dirty="0">
-                <a:latin typeface="Courier New" panose="02070309020205020404" pitchFamily="49" charset="0"/>
-                <a:cs typeface="Courier New" panose="02070309020205020404" pitchFamily="49" charset="0"/>
-              </a:rPr>
-              <a:t>unzip </a:t>
-            </a:r>
-            <a:r>
-              <a:rPr lang="en-US" dirty="0" err="1">
-                <a:latin typeface="Courier New" panose="02070309020205020404" pitchFamily="49" charset="0"/>
-                <a:cs typeface="Courier New" panose="02070309020205020404" pitchFamily="49" charset="0"/>
-              </a:rPr>
-              <a:t>cpp</a:t>
-            </a:r>
-            <a:r>
-              <a:rPr lang="en-US" dirty="0">
-                <a:latin typeface="Courier New" panose="02070309020205020404" pitchFamily="49" charset="0"/>
-                <a:cs typeface="Courier New" panose="02070309020205020404" pitchFamily="49" charset="0"/>
-              </a:rPr>
-              <a:t>_</a:t>
-            </a:r>
-            <a:r>
-              <a:rPr lang="pt-BR" dirty="0">
-                <a:latin typeface="Courier New" panose="02070309020205020404" pitchFamily="49" charset="0"/>
-                <a:cs typeface="Courier New" panose="02070309020205020404" pitchFamily="49" charset="0"/>
-              </a:rPr>
-              <a:t>debug</a:t>
-            </a:r>
-            <a:r>
-              <a:rPr lang="en-US" dirty="0">
-                <a:latin typeface="Courier New" panose="02070309020205020404" pitchFamily="49" charset="0"/>
-                <a:cs typeface="Courier New" panose="02070309020205020404" pitchFamily="49" charset="0"/>
-              </a:rPr>
-              <a:t>.zip </a:t>
-            </a:r>
-          </a:p>
-          <a:p>
-            <a:pPr lvl="1">
-              <a:lnSpc>
-                <a:spcPct val="150000"/>
-              </a:lnSpc>
-            </a:pPr>
-            <a:r>
-              <a:rPr lang="en-US" dirty="0">
-                <a:latin typeface="Courier New" panose="02070309020205020404" pitchFamily="49" charset="0"/>
-                <a:cs typeface="Courier New" panose="02070309020205020404" pitchFamily="49" charset="0"/>
-              </a:rPr>
-              <a:t>cd </a:t>
-            </a:r>
-            <a:r>
-              <a:rPr lang="en-US" dirty="0" err="1">
-                <a:latin typeface="Courier New" panose="02070309020205020404" pitchFamily="49" charset="0"/>
-                <a:cs typeface="Courier New" panose="02070309020205020404" pitchFamily="49" charset="0"/>
-              </a:rPr>
-              <a:t>cpp</a:t>
-            </a:r>
-            <a:r>
-              <a:rPr lang="en-US" dirty="0">
-                <a:latin typeface="Courier New" panose="02070309020205020404" pitchFamily="49" charset="0"/>
-                <a:cs typeface="Courier New" panose="02070309020205020404" pitchFamily="49" charset="0"/>
-              </a:rPr>
-              <a:t>_</a:t>
-            </a:r>
-            <a:r>
-              <a:rPr lang="pt-BR" dirty="0">
-                <a:latin typeface="Courier New" panose="02070309020205020404" pitchFamily="49" charset="0"/>
-                <a:cs typeface="Courier New" panose="02070309020205020404" pitchFamily="49" charset="0"/>
-              </a:rPr>
-              <a:t>debug</a:t>
-            </a:r>
-            <a:endParaRPr lang="en-US" dirty="0">
-              <a:latin typeface="Courier New" panose="02070309020205020404" pitchFamily="49" charset="0"/>
-              <a:cs typeface="Courier New" panose="02070309020205020404" pitchFamily="49" charset="0"/>
-            </a:endParaRPr>
+              <a:t>Errors messages can be less obvious </a:t>
+            </a:r>
           </a:p>
         </p:txBody>
       </p:sp>
     </p:spTree>
     <p:extLst>
       <p:ext uri="{BB962C8B-B14F-4D97-AF65-F5344CB8AC3E}">
-        <p14:creationId xmlns:p14="http://schemas.microsoft.com/office/powerpoint/2010/main" val="1010424374"/>
+        <p14:creationId xmlns:p14="http://schemas.microsoft.com/office/powerpoint/2010/main" val="237925523"/>
       </p:ext>
     </p:extLst>
   </p:cSld>
@@ -4906,6 +4722,235 @@
           <p:cNvPr id="2" name="Title 1">
             <a:extLst>
               <a:ext uri="{FF2B5EF4-FFF2-40B4-BE49-F238E27FC236}">
+                <a16:creationId xmlns:a16="http://schemas.microsoft.com/office/drawing/2014/main" id="{E12BE167-F6C9-4FD8-AE90-A43FAAA42A07}"/>
+              </a:ext>
+            </a:extLst>
+          </p:cNvPr>
+          <p:cNvSpPr>
+            <a:spLocks noGrp="1"/>
+          </p:cNvSpPr>
+          <p:nvPr>
+            <p:ph type="title"/>
+          </p:nvPr>
+        </p:nvSpPr>
+        <p:spPr/>
+        <p:txBody>
+          <a:bodyPr/>
+          <a:lstStyle/>
+          <a:p>
+            <a:r>
+              <a:rPr lang="en-US" dirty="0"/>
+              <a:t>Exercise 4 : C++ Setup</a:t>
+            </a:r>
+          </a:p>
+        </p:txBody>
+      </p:sp>
+      <p:sp>
+        <p:nvSpPr>
+          <p:cNvPr id="3" name="Content Placeholder 2">
+            <a:extLst>
+              <a:ext uri="{FF2B5EF4-FFF2-40B4-BE49-F238E27FC236}">
+                <a16:creationId xmlns:a16="http://schemas.microsoft.com/office/drawing/2014/main" id="{6D93E6B7-65B4-4005-895B-4CD959210943}"/>
+              </a:ext>
+            </a:extLst>
+          </p:cNvPr>
+          <p:cNvSpPr>
+            <a:spLocks noGrp="1"/>
+          </p:cNvSpPr>
+          <p:nvPr>
+            <p:ph idx="1"/>
+          </p:nvPr>
+        </p:nvSpPr>
+        <p:spPr>
+          <a:xfrm>
+            <a:off x="211015" y="1825625"/>
+            <a:ext cx="8745415" cy="4351338"/>
+          </a:xfrm>
+        </p:spPr>
+        <p:txBody>
+          <a:bodyPr>
+            <a:normAutofit/>
+          </a:bodyPr>
+          <a:lstStyle/>
+          <a:p>
+            <a:pPr>
+              <a:lnSpc>
+                <a:spcPct val="150000"/>
+              </a:lnSpc>
+            </a:pPr>
+            <a:r>
+              <a:rPr lang="en-US" dirty="0"/>
+              <a:t>Log onto Adroit </a:t>
+            </a:r>
+          </a:p>
+          <a:p>
+            <a:pPr lvl="1">
+              <a:lnSpc>
+                <a:spcPct val="150000"/>
+              </a:lnSpc>
+            </a:pPr>
+            <a:r>
+              <a:rPr lang="en-US" dirty="0" err="1">
+                <a:latin typeface="Courier New" panose="02070309020205020404" pitchFamily="49" charset="0"/>
+                <a:cs typeface="Courier New" panose="02070309020205020404" pitchFamily="49" charset="0"/>
+              </a:rPr>
+              <a:t>ssh</a:t>
+            </a:r>
+            <a:r>
+              <a:rPr lang="en-US" dirty="0">
+                <a:latin typeface="Courier New" panose="02070309020205020404" pitchFamily="49" charset="0"/>
+                <a:cs typeface="Courier New" panose="02070309020205020404" pitchFamily="49" charset="0"/>
+              </a:rPr>
+              <a:t> -X adroit.princeton.edu</a:t>
+            </a:r>
+          </a:p>
+          <a:p>
+            <a:pPr>
+              <a:lnSpc>
+                <a:spcPct val="150000"/>
+              </a:lnSpc>
+            </a:pPr>
+            <a:r>
+              <a:rPr lang="en-US" dirty="0"/>
+              <a:t>Download the C++ code</a:t>
+            </a:r>
+          </a:p>
+          <a:p>
+            <a:pPr lvl="1">
+              <a:lnSpc>
+                <a:spcPct val="150000"/>
+              </a:lnSpc>
+            </a:pPr>
+            <a:r>
+              <a:rPr lang="pt-BR" sz="1800" dirty="0">
+                <a:latin typeface="Courier New" panose="02070309020205020404" pitchFamily="49" charset="0"/>
+                <a:cs typeface="Courier New" panose="02070309020205020404" pitchFamily="49" charset="0"/>
+              </a:rPr>
+              <a:t>curl -L -o cpp_debug.zip https://tinyurl.com/y3k73w6y</a:t>
+            </a:r>
+            <a:endParaRPr lang="en-US" sz="1800" dirty="0">
+              <a:latin typeface="Courier New" panose="02070309020205020404" pitchFamily="49" charset="0"/>
+              <a:cs typeface="Courier New" panose="02070309020205020404" pitchFamily="49" charset="0"/>
+            </a:endParaRPr>
+          </a:p>
+          <a:p>
+            <a:pPr lvl="1">
+              <a:lnSpc>
+                <a:spcPct val="150000"/>
+              </a:lnSpc>
+            </a:pPr>
+            <a:r>
+              <a:rPr lang="en-US" dirty="0">
+                <a:latin typeface="Courier New" panose="02070309020205020404" pitchFamily="49" charset="0"/>
+                <a:cs typeface="Courier New" panose="02070309020205020404" pitchFamily="49" charset="0"/>
+              </a:rPr>
+              <a:t>unzip </a:t>
+            </a:r>
+            <a:r>
+              <a:rPr lang="en-US" dirty="0" err="1">
+                <a:latin typeface="Courier New" panose="02070309020205020404" pitchFamily="49" charset="0"/>
+                <a:cs typeface="Courier New" panose="02070309020205020404" pitchFamily="49" charset="0"/>
+              </a:rPr>
+              <a:t>cpp</a:t>
+            </a:r>
+            <a:r>
+              <a:rPr lang="en-US" dirty="0">
+                <a:latin typeface="Courier New" panose="02070309020205020404" pitchFamily="49" charset="0"/>
+                <a:cs typeface="Courier New" panose="02070309020205020404" pitchFamily="49" charset="0"/>
+              </a:rPr>
+              <a:t>_</a:t>
+            </a:r>
+            <a:r>
+              <a:rPr lang="pt-BR" dirty="0">
+                <a:latin typeface="Courier New" panose="02070309020205020404" pitchFamily="49" charset="0"/>
+                <a:cs typeface="Courier New" panose="02070309020205020404" pitchFamily="49" charset="0"/>
+              </a:rPr>
+              <a:t>debug</a:t>
+            </a:r>
+            <a:r>
+              <a:rPr lang="en-US" dirty="0">
+                <a:latin typeface="Courier New" panose="02070309020205020404" pitchFamily="49" charset="0"/>
+                <a:cs typeface="Courier New" panose="02070309020205020404" pitchFamily="49" charset="0"/>
+              </a:rPr>
+              <a:t>.zip </a:t>
+            </a:r>
+          </a:p>
+          <a:p>
+            <a:pPr lvl="1">
+              <a:lnSpc>
+                <a:spcPct val="150000"/>
+              </a:lnSpc>
+            </a:pPr>
+            <a:r>
+              <a:rPr lang="en-US" dirty="0">
+                <a:latin typeface="Courier New" panose="02070309020205020404" pitchFamily="49" charset="0"/>
+                <a:cs typeface="Courier New" panose="02070309020205020404" pitchFamily="49" charset="0"/>
+              </a:rPr>
+              <a:t>cd </a:t>
+            </a:r>
+            <a:r>
+              <a:rPr lang="en-US" dirty="0" err="1">
+                <a:latin typeface="Courier New" panose="02070309020205020404" pitchFamily="49" charset="0"/>
+                <a:cs typeface="Courier New" panose="02070309020205020404" pitchFamily="49" charset="0"/>
+              </a:rPr>
+              <a:t>cpp</a:t>
+            </a:r>
+            <a:r>
+              <a:rPr lang="en-US" dirty="0">
+                <a:latin typeface="Courier New" panose="02070309020205020404" pitchFamily="49" charset="0"/>
+                <a:cs typeface="Courier New" panose="02070309020205020404" pitchFamily="49" charset="0"/>
+              </a:rPr>
+              <a:t>_</a:t>
+            </a:r>
+            <a:r>
+              <a:rPr lang="pt-BR" dirty="0">
+                <a:latin typeface="Courier New" panose="02070309020205020404" pitchFamily="49" charset="0"/>
+                <a:cs typeface="Courier New" panose="02070309020205020404" pitchFamily="49" charset="0"/>
+              </a:rPr>
+              <a:t>debug</a:t>
+            </a:r>
+            <a:endParaRPr lang="en-US" dirty="0">
+              <a:latin typeface="Courier New" panose="02070309020205020404" pitchFamily="49" charset="0"/>
+              <a:cs typeface="Courier New" panose="02070309020205020404" pitchFamily="49" charset="0"/>
+            </a:endParaRPr>
+          </a:p>
+        </p:txBody>
+      </p:sp>
+    </p:spTree>
+    <p:extLst>
+      <p:ext uri="{BB962C8B-B14F-4D97-AF65-F5344CB8AC3E}">
+        <p14:creationId xmlns:p14="http://schemas.microsoft.com/office/powerpoint/2010/main" val="1010424374"/>
+      </p:ext>
+    </p:extLst>
+  </p:cSld>
+  <p:clrMapOvr>
+    <a:masterClrMapping/>
+  </p:clrMapOvr>
+</p:sld>
+</file>
+
+<file path=ppt/slides/slide21.xml><?xml version="1.0" encoding="utf-8"?>
+<p:sld xmlns:a="http://schemas.openxmlformats.org/drawingml/2006/main" xmlns:r="http://schemas.openxmlformats.org/officeDocument/2006/relationships" xmlns:p="http://schemas.openxmlformats.org/presentationml/2006/main" show="0">
+  <p:cSld>
+    <p:spTree>
+      <p:nvGrpSpPr>
+        <p:cNvPr id="1" name=""/>
+        <p:cNvGrpSpPr/>
+        <p:nvPr/>
+      </p:nvGrpSpPr>
+      <p:grpSpPr>
+        <a:xfrm>
+          <a:off x="0" y="0"/>
+          <a:ext cx="0" cy="0"/>
+          <a:chOff x="0" y="0"/>
+          <a:chExt cx="0" cy="0"/>
+        </a:xfrm>
+      </p:grpSpPr>
+      <p:sp>
+        <p:nvSpPr>
+          <p:cNvPr id="2" name="Title 1">
+            <a:extLst>
+              <a:ext uri="{FF2B5EF4-FFF2-40B4-BE49-F238E27FC236}">
                 <a16:creationId xmlns:a16="http://schemas.microsoft.com/office/drawing/2014/main" id="{0A2DA531-92ED-4623-A4B8-90CE8F756834}"/>
               </a:ext>
             </a:extLst>
@@ -6053,8 +6098,13 @@
             </a:pPr>
             <a:r>
               <a:rPr lang="en-US" dirty="0"/>
-              <a:t>Download and extract the project directory</a:t>
-            </a:r>
+              <a:t>Download and extract the </a:t>
+            </a:r>
+            <a:r>
+              <a:rPr lang="en-US"/>
+              <a:t>project directories</a:t>
+            </a:r>
+            <a:endParaRPr lang="en-US" dirty="0"/>
           </a:p>
           <a:p>
             <a:pPr>

</xml_diff>